<commit_message>
Add tips for setting to take data
git-svn-id: https://belle2.cc.kek.jp/svn/trunk/software@11857 b38c6c8f-bee8-465d-8448-9abe6915d496
</commit_message>
<xml_diff>
--- a/daq/copper/doc/SetupPocketDAQ_4_DAQsoftware.pptx
+++ b/daq/copper/doc/SetupPocketDAQ_4_DAQsoftware.pptx
@@ -20,9 +20,13 @@
     <p:sldId id="259" r:id="rId14"/>
     <p:sldId id="260" r:id="rId15"/>
     <p:sldId id="266" r:id="rId16"/>
-    <p:sldId id="267" r:id="rId17"/>
-    <p:sldId id="274" r:id="rId18"/>
-    <p:sldId id="268" r:id="rId19"/>
+    <p:sldId id="274" r:id="rId17"/>
+    <p:sldId id="267" r:id="rId18"/>
+    <p:sldId id="282" r:id="rId19"/>
+    <p:sldId id="279" r:id="rId20"/>
+    <p:sldId id="280" r:id="rId21"/>
+    <p:sldId id="281" r:id="rId22"/>
+    <p:sldId id="268" r:id="rId23"/>
   </p:sldIdLst>
   <p:sldSz cx="12192000" cy="6858000"/>
   <p:notesSz cx="6858000" cy="9144000"/>
@@ -260,7 +264,7 @@
           <a:p>
             <a:fld id="{1A984C01-8EE0-44F4-B595-752AEE56780B}" type="datetimeFigureOut">
               <a:rPr kumimoji="1" lang="ja-JP" altLang="en-US" smtClean="0"/>
-              <a:t>2014/7/19</a:t>
+              <a:t>2014/7/28</a:t>
             </a:fld>
             <a:endParaRPr kumimoji="1" lang="ja-JP" altLang="en-US"/>
           </a:p>
@@ -462,7 +466,7 @@
           <a:p>
             <a:fld id="{1A984C01-8EE0-44F4-B595-752AEE56780B}" type="datetimeFigureOut">
               <a:rPr kumimoji="1" lang="ja-JP" altLang="en-US" smtClean="0"/>
-              <a:t>2014/7/19</a:t>
+              <a:t>2014/7/28</a:t>
             </a:fld>
             <a:endParaRPr kumimoji="1" lang="ja-JP" altLang="en-US"/>
           </a:p>
@@ -674,7 +678,7 @@
           <a:p>
             <a:fld id="{1A984C01-8EE0-44F4-B595-752AEE56780B}" type="datetimeFigureOut">
               <a:rPr kumimoji="1" lang="ja-JP" altLang="en-US" smtClean="0"/>
-              <a:t>2014/7/19</a:t>
+              <a:t>2014/7/28</a:t>
             </a:fld>
             <a:endParaRPr kumimoji="1" lang="ja-JP" altLang="en-US"/>
           </a:p>
@@ -876,7 +880,7 @@
           <a:p>
             <a:fld id="{1A984C01-8EE0-44F4-B595-752AEE56780B}" type="datetimeFigureOut">
               <a:rPr kumimoji="1" lang="ja-JP" altLang="en-US" smtClean="0"/>
-              <a:t>2014/7/19</a:t>
+              <a:t>2014/7/28</a:t>
             </a:fld>
             <a:endParaRPr kumimoji="1" lang="ja-JP" altLang="en-US"/>
           </a:p>
@@ -1122,7 +1126,7 @@
           <a:p>
             <a:fld id="{1A984C01-8EE0-44F4-B595-752AEE56780B}" type="datetimeFigureOut">
               <a:rPr kumimoji="1" lang="ja-JP" altLang="en-US" smtClean="0"/>
-              <a:t>2014/7/19</a:t>
+              <a:t>2014/7/28</a:t>
             </a:fld>
             <a:endParaRPr kumimoji="1" lang="ja-JP" altLang="en-US"/>
           </a:p>
@@ -1418,7 +1422,7 @@
           <a:p>
             <a:fld id="{1A984C01-8EE0-44F4-B595-752AEE56780B}" type="datetimeFigureOut">
               <a:rPr kumimoji="1" lang="ja-JP" altLang="en-US" smtClean="0"/>
-              <a:t>2014/7/19</a:t>
+              <a:t>2014/7/28</a:t>
             </a:fld>
             <a:endParaRPr kumimoji="1" lang="ja-JP" altLang="en-US"/>
           </a:p>
@@ -1849,7 +1853,7 @@
           <a:p>
             <a:fld id="{1A984C01-8EE0-44F4-B595-752AEE56780B}" type="datetimeFigureOut">
               <a:rPr kumimoji="1" lang="ja-JP" altLang="en-US" smtClean="0"/>
-              <a:t>2014/7/19</a:t>
+              <a:t>2014/7/28</a:t>
             </a:fld>
             <a:endParaRPr kumimoji="1" lang="ja-JP" altLang="en-US"/>
           </a:p>
@@ -1967,7 +1971,7 @@
           <a:p>
             <a:fld id="{1A984C01-8EE0-44F4-B595-752AEE56780B}" type="datetimeFigureOut">
               <a:rPr kumimoji="1" lang="ja-JP" altLang="en-US" smtClean="0"/>
-              <a:t>2014/7/19</a:t>
+              <a:t>2014/7/28</a:t>
             </a:fld>
             <a:endParaRPr kumimoji="1" lang="ja-JP" altLang="en-US"/>
           </a:p>
@@ -2062,7 +2066,7 @@
           <a:p>
             <a:fld id="{1A984C01-8EE0-44F4-B595-752AEE56780B}" type="datetimeFigureOut">
               <a:rPr kumimoji="1" lang="ja-JP" altLang="en-US" smtClean="0"/>
-              <a:t>2014/7/19</a:t>
+              <a:t>2014/7/28</a:t>
             </a:fld>
             <a:endParaRPr kumimoji="1" lang="ja-JP" altLang="en-US"/>
           </a:p>
@@ -2371,7 +2375,7 @@
           <a:p>
             <a:fld id="{1A984C01-8EE0-44F4-B595-752AEE56780B}" type="datetimeFigureOut">
               <a:rPr kumimoji="1" lang="ja-JP" altLang="en-US" smtClean="0"/>
-              <a:t>2014/7/19</a:t>
+              <a:t>2014/7/28</a:t>
             </a:fld>
             <a:endParaRPr kumimoji="1" lang="ja-JP" altLang="en-US"/>
           </a:p>
@@ -2624,7 +2628,7 @@
           <a:p>
             <a:fld id="{1A984C01-8EE0-44F4-B595-752AEE56780B}" type="datetimeFigureOut">
               <a:rPr kumimoji="1" lang="ja-JP" altLang="en-US" smtClean="0"/>
-              <a:t>2014/7/19</a:t>
+              <a:t>2014/7/28</a:t>
             </a:fld>
             <a:endParaRPr kumimoji="1" lang="ja-JP" altLang="en-US"/>
           </a:p>
@@ -2869,7 +2873,7 @@
           <a:p>
             <a:fld id="{1A984C01-8EE0-44F4-B595-752AEE56780B}" type="datetimeFigureOut">
               <a:rPr kumimoji="1" lang="ja-JP" altLang="en-US" smtClean="0"/>
-              <a:t>2014/7/19</a:t>
+              <a:t>2014/7/28</a:t>
             </a:fld>
             <a:endParaRPr kumimoji="1" lang="ja-JP" altLang="en-US"/>
           </a:p>
@@ -3298,15 +3302,7 @@
             </a:br>
             <a:r>
               <a:rPr lang="en-US" altLang="ja-JP" dirty="0" smtClean="0"/>
-              <a:t>(</a:t>
-            </a:r>
-            <a:r>
-              <a:rPr lang="en-US" altLang="ja-JP" dirty="0" smtClean="0"/>
-              <a:t>2014.7.19) </a:t>
-            </a:r>
-            <a:r>
-              <a:rPr lang="en-US" altLang="ja-JP" dirty="0" smtClean="0"/>
-              <a:t>rev.11654</a:t>
+              <a:t>(2014.7.19) rev.11654</a:t>
             </a:r>
             <a:endParaRPr kumimoji="1" lang="ja-JP" altLang="en-US" dirty="0"/>
           </a:p>
@@ -5100,6 +5096,194 @@
             <p:ph type="title"/>
           </p:nvPr>
         </p:nvSpPr>
+        <p:spPr/>
+        <p:txBody>
+          <a:bodyPr/>
+          <a:lstStyle/>
+          <a:p>
+            <a:r>
+              <a:rPr kumimoji="1" lang="en-US" altLang="ja-JP" dirty="0" smtClean="0"/>
+              <a:t>Revision history</a:t>
+            </a:r>
+            <a:endParaRPr kumimoji="1" lang="ja-JP" altLang="en-US" dirty="0"/>
+          </a:p>
+        </p:txBody>
+      </p:sp>
+      <p:sp>
+        <p:nvSpPr>
+          <p:cNvPr id="3" name="コンテンツ プレースホルダー 2"/>
+          <p:cNvSpPr>
+            <a:spLocks noGrp="1"/>
+          </p:cNvSpPr>
+          <p:nvPr>
+            <p:ph idx="1"/>
+          </p:nvPr>
+        </p:nvSpPr>
+        <p:spPr/>
+        <p:txBody>
+          <a:bodyPr>
+            <a:normAutofit/>
+          </a:bodyPr>
+          <a:lstStyle/>
+          <a:p>
+            <a:r>
+              <a:rPr kumimoji="1" lang="en-US" altLang="ja-JP" sz="1400" dirty="0" smtClean="0"/>
+              <a:t>2013/10/16 </a:t>
+            </a:r>
+          </a:p>
+          <a:p>
+            <a:pPr lvl="1"/>
+            <a:r>
+              <a:rPr lang="en-US" altLang="ja-JP" sz="1400" dirty="0" smtClean="0"/>
+              <a:t>Change explanation about option of run_start.sh script</a:t>
+            </a:r>
+          </a:p>
+          <a:p>
+            <a:r>
+              <a:rPr kumimoji="1" lang="en-US" altLang="ja-JP" sz="1400" dirty="0" smtClean="0"/>
+              <a:t>2014/7/15 (rev. 11619)</a:t>
+            </a:r>
+          </a:p>
+          <a:p>
+            <a:pPr lvl="1"/>
+            <a:r>
+              <a:rPr lang="en-US" altLang="ja-JP" sz="1400" dirty="0" smtClean="0"/>
+              <a:t>To specify FINESSE bit field, you need to use decimal value ( not hexadecimal ).</a:t>
+            </a:r>
+          </a:p>
+          <a:p>
+            <a:pPr lvl="1"/>
+            <a:r>
+              <a:rPr lang="en-US" altLang="ja-JP" sz="1400" dirty="0" smtClean="0"/>
+              <a:t>Add an argument of RecvSenDCOPPER.py</a:t>
+            </a:r>
+          </a:p>
+          <a:p>
+            <a:pPr lvl="1"/>
+            <a:r>
+              <a:rPr kumimoji="1" lang="en-US" altLang="ja-JP" sz="1400" dirty="0" smtClean="0"/>
+              <a:t>Update eb</a:t>
+            </a:r>
+            <a:r>
+              <a:rPr lang="en-US" altLang="ja-JP" sz="1400" dirty="0" smtClean="0"/>
+              <a:t>0 related issues. </a:t>
+            </a:r>
+          </a:p>
+          <a:p>
+            <a:pPr lvl="2"/>
+            <a:r>
+              <a:rPr lang="en-US" altLang="ja-JP" sz="1400" dirty="0" smtClean="0"/>
+              <a:t>About </a:t>
+            </a:r>
+            <a:r>
+              <a:rPr kumimoji="1" lang="en-US" altLang="ja-JP" sz="1400" dirty="0" smtClean="0"/>
+              <a:t>eb0.sh</a:t>
+            </a:r>
+          </a:p>
+          <a:p>
+            <a:pPr lvl="2"/>
+            <a:r>
+              <a:rPr lang="en-US" altLang="ja-JP" sz="1400" dirty="0" smtClean="0"/>
+              <a:t>About eb0-xinted</a:t>
+            </a:r>
+          </a:p>
+          <a:p>
+            <a:r>
+              <a:rPr kumimoji="1" lang="en-US" altLang="ja-JP" sz="1400" dirty="0" smtClean="0"/>
+              <a:t>2014/7/16(rev. 11654)</a:t>
+            </a:r>
+          </a:p>
+          <a:p>
+            <a:pPr lvl="1"/>
+            <a:r>
+              <a:rPr lang="en-US" altLang="ja-JP" sz="1400" dirty="0"/>
+              <a:t>e</a:t>
+            </a:r>
+            <a:r>
+              <a:rPr lang="en-US" altLang="ja-JP" sz="1400" dirty="0" smtClean="0"/>
+              <a:t>b0.sh and </a:t>
+            </a:r>
+            <a:r>
+              <a:rPr lang="en-US" altLang="ja-JP" sz="1400" dirty="0" err="1" smtClean="0"/>
+              <a:t>eb-xinetd</a:t>
+            </a:r>
+            <a:r>
+              <a:rPr lang="en-US" altLang="ja-JP" sz="1400" dirty="0" smtClean="0"/>
+              <a:t> need more modification </a:t>
+            </a:r>
+          </a:p>
+          <a:p>
+            <a:r>
+              <a:rPr kumimoji="1" lang="en-US" altLang="ja-JP" sz="1800" dirty="0" smtClean="0"/>
+              <a:t>2014/7/19 </a:t>
+            </a:r>
+          </a:p>
+          <a:p>
+            <a:pPr lvl="1"/>
+            <a:r>
+              <a:rPr lang="en-US" altLang="ja-JP" sz="1400" dirty="0" smtClean="0"/>
+              <a:t>Add a comment about “</a:t>
+            </a:r>
+            <a:r>
+              <a:rPr lang="en-US" altLang="ja-JP" sz="1400" dirty="0" err="1" smtClean="0"/>
+              <a:t>addpkg</a:t>
+            </a:r>
+            <a:r>
+              <a:rPr lang="en-US" altLang="ja-JP" sz="1400" dirty="0" smtClean="0"/>
+              <a:t> </a:t>
+            </a:r>
+            <a:r>
+              <a:rPr lang="en-US" altLang="ja-JP" sz="1400" dirty="0" err="1" smtClean="0"/>
+              <a:t>daq</a:t>
+            </a:r>
+            <a:r>
+              <a:rPr lang="en-US" altLang="ja-JP" sz="1400" dirty="0" smtClean="0"/>
+              <a:t>”</a:t>
+            </a:r>
+            <a:endParaRPr kumimoji="1" lang="ja-JP" altLang="en-US" sz="1400" dirty="0"/>
+          </a:p>
+        </p:txBody>
+      </p:sp>
+    </p:spTree>
+    <p:extLst>
+      <p:ext uri="{BB962C8B-B14F-4D97-AF65-F5344CB8AC3E}">
+        <p14:creationId xmlns:p14="http://schemas.microsoft.com/office/powerpoint/2010/main" val="3008952633"/>
+      </p:ext>
+    </p:extLst>
+  </p:cSld>
+  <p:clrMapOvr>
+    <a:masterClrMapping/>
+  </p:clrMapOvr>
+</p:sld>
+</file>
+
+<file path=ppt/slides/slide17.xml><?xml version="1.0" encoding="utf-8"?>
+<p:sld xmlns:a="http://schemas.openxmlformats.org/drawingml/2006/main" xmlns:r="http://schemas.openxmlformats.org/officeDocument/2006/relationships" xmlns:p="http://schemas.openxmlformats.org/presentationml/2006/main">
+  <p:cSld>
+    <p:spTree>
+      <p:nvGrpSpPr>
+        <p:cNvPr id="1" name=""/>
+        <p:cNvGrpSpPr/>
+        <p:nvPr/>
+      </p:nvGrpSpPr>
+      <p:grpSpPr>
+        <a:xfrm>
+          <a:off x="0" y="0"/>
+          <a:ext cx="0" cy="0"/>
+          <a:chOff x="0" y="0"/>
+          <a:chExt cx="0" cy="0"/>
+        </a:xfrm>
+      </p:grpSpPr>
+      <p:sp>
+        <p:nvSpPr>
+          <p:cNvPr id="2" name="タイトル 1"/>
+          <p:cNvSpPr>
+            <a:spLocks noGrp="1"/>
+          </p:cNvSpPr>
+          <p:nvPr>
+            <p:ph type="title"/>
+          </p:nvPr>
+        </p:nvSpPr>
         <p:spPr>
           <a:xfrm>
             <a:off x="5338948" y="2633313"/>
@@ -5112,7 +5296,7 @@
           <a:p>
             <a:r>
               <a:rPr kumimoji="1" lang="en-US" altLang="ja-JP" dirty="0" smtClean="0"/>
-              <a:t>End</a:t>
+              <a:t>Appendix</a:t>
             </a:r>
             <a:endParaRPr kumimoji="1" lang="ja-JP" altLang="en-US" dirty="0"/>
           </a:p>
@@ -5138,7 +5322,7 @@
 </p:sld>
 </file>
 
-<file path=ppt/slides/slide17.xml><?xml version="1.0" encoding="utf-8"?>
+<file path=ppt/slides/slide18.xml><?xml version="1.0" encoding="utf-8"?>
 <p:sld xmlns:a="http://schemas.openxmlformats.org/drawingml/2006/main" xmlns:r="http://schemas.openxmlformats.org/officeDocument/2006/relationships" xmlns:p="http://schemas.openxmlformats.org/presentationml/2006/main">
   <p:cSld>
     <p:spTree>
@@ -5165,16 +5349,21 @@
             <p:ph type="title"/>
           </p:nvPr>
         </p:nvSpPr>
-        <p:spPr/>
+        <p:spPr>
+          <a:xfrm>
+            <a:off x="0" y="0"/>
+            <a:ext cx="10515600" cy="1325563"/>
+          </a:xfrm>
+        </p:spPr>
         <p:txBody>
           <a:bodyPr/>
           <a:lstStyle/>
           <a:p>
             <a:r>
-              <a:rPr kumimoji="1" lang="en-US" altLang="ja-JP" dirty="0" smtClean="0"/>
-              <a:t>Revision history</a:t>
-            </a:r>
-            <a:endParaRPr kumimoji="1" lang="ja-JP" altLang="en-US" dirty="0"/>
+              <a:rPr kumimoji="1" lang="en-US" altLang="ja-JP" u="sng" dirty="0" smtClean="0"/>
+              <a:t>A-1, yum setting for COPPER</a:t>
+            </a:r>
+            <a:endParaRPr kumimoji="1" lang="ja-JP" altLang="en-US" u="sng" dirty="0"/>
           </a:p>
         </p:txBody>
       </p:sp>
@@ -5188,136 +5377,229 @@
             <p:ph idx="1"/>
           </p:nvPr>
         </p:nvSpPr>
-        <p:spPr/>
-        <p:txBody>
-          <a:bodyPr>
-            <a:normAutofit/>
-          </a:bodyPr>
+        <p:spPr>
+          <a:xfrm>
+            <a:off x="705853" y="1524836"/>
+            <a:ext cx="10515600" cy="4351338"/>
+          </a:xfrm>
+        </p:spPr>
+        <p:txBody>
+          <a:bodyPr/>
           <a:lstStyle/>
           <a:p>
-            <a:r>
-              <a:rPr kumimoji="1" lang="en-US" altLang="ja-JP" sz="1400" dirty="0" smtClean="0"/>
-              <a:t>2013/10/16 </a:t>
-            </a:r>
-          </a:p>
-          <a:p>
-            <a:pPr lvl="1"/>
-            <a:r>
-              <a:rPr lang="en-US" altLang="ja-JP" sz="1400" dirty="0" smtClean="0"/>
-              <a:t>Change explanation about option of run_start.sh script</a:t>
-            </a:r>
-          </a:p>
-          <a:p>
-            <a:r>
-              <a:rPr kumimoji="1" lang="en-US" altLang="ja-JP" sz="1400" dirty="0" smtClean="0"/>
-              <a:t>2014/7/15 (rev. 11619)</a:t>
-            </a:r>
-          </a:p>
-          <a:p>
-            <a:pPr lvl="1"/>
-            <a:r>
-              <a:rPr lang="en-US" altLang="ja-JP" sz="1400" dirty="0" smtClean="0"/>
-              <a:t>To specify FINESSE bit field, you need to use decimal value ( not hexadecimal ).</a:t>
-            </a:r>
-          </a:p>
-          <a:p>
-            <a:pPr lvl="1"/>
-            <a:r>
-              <a:rPr lang="en-US" altLang="ja-JP" sz="1400" dirty="0" smtClean="0"/>
-              <a:t>Add an argument of RecvSenDCOPPER.py</a:t>
-            </a:r>
-          </a:p>
-          <a:p>
-            <a:pPr lvl="1"/>
-            <a:r>
-              <a:rPr kumimoji="1" lang="en-US" altLang="ja-JP" sz="1400" dirty="0" smtClean="0"/>
-              <a:t>Update eb</a:t>
-            </a:r>
-            <a:r>
-              <a:rPr lang="en-US" altLang="ja-JP" sz="1400" dirty="0" smtClean="0"/>
-              <a:t>0 related issues. </a:t>
-            </a:r>
-          </a:p>
-          <a:p>
-            <a:pPr lvl="2"/>
-            <a:r>
-              <a:rPr lang="en-US" altLang="ja-JP" sz="1400" dirty="0" smtClean="0"/>
-              <a:t>About </a:t>
-            </a:r>
-            <a:r>
-              <a:rPr kumimoji="1" lang="en-US" altLang="ja-JP" sz="1400" dirty="0" smtClean="0"/>
-              <a:t>eb0.sh</a:t>
-            </a:r>
-          </a:p>
-          <a:p>
-            <a:pPr lvl="2"/>
-            <a:r>
-              <a:rPr lang="en-US" altLang="ja-JP" sz="1400" dirty="0" smtClean="0"/>
-              <a:t>About eb0-xinted</a:t>
-            </a:r>
-          </a:p>
-          <a:p>
-            <a:r>
-              <a:rPr kumimoji="1" lang="en-US" altLang="ja-JP" sz="1400" dirty="0" smtClean="0"/>
-              <a:t>2014/7/16(rev. 11654)</a:t>
-            </a:r>
-          </a:p>
-          <a:p>
-            <a:pPr lvl="1"/>
-            <a:r>
-              <a:rPr lang="en-US" altLang="ja-JP" sz="1400" dirty="0"/>
-              <a:t>e</a:t>
-            </a:r>
-            <a:r>
-              <a:rPr lang="en-US" altLang="ja-JP" sz="1400" dirty="0" smtClean="0"/>
-              <a:t>b0.sh and </a:t>
-            </a:r>
-            <a:r>
-              <a:rPr lang="en-US" altLang="ja-JP" sz="1400" dirty="0" err="1" smtClean="0"/>
-              <a:t>eb-xinetd</a:t>
-            </a:r>
-            <a:r>
-              <a:rPr lang="en-US" altLang="ja-JP" sz="1400" dirty="0" smtClean="0"/>
-              <a:t> need more modification </a:t>
-            </a:r>
-            <a:endParaRPr lang="en-US" altLang="ja-JP" sz="1400" dirty="0" smtClean="0"/>
-          </a:p>
-          <a:p>
-            <a:r>
-              <a:rPr kumimoji="1" lang="en-US" altLang="ja-JP" sz="1800" dirty="0" smtClean="0"/>
-              <a:t>2014/7/19 </a:t>
-            </a:r>
-          </a:p>
-          <a:p>
-            <a:pPr lvl="1"/>
-            <a:r>
-              <a:rPr lang="en-US" altLang="ja-JP" sz="1400" dirty="0" smtClean="0"/>
-              <a:t>Add a comment about “</a:t>
-            </a:r>
-            <a:r>
-              <a:rPr lang="en-US" altLang="ja-JP" sz="1400" dirty="0" err="1" smtClean="0"/>
-              <a:t>addpkg</a:t>
-            </a:r>
-            <a:r>
-              <a:rPr lang="en-US" altLang="ja-JP" sz="1400" dirty="0" smtClean="0"/>
+            <a:pPr marL="0" indent="0">
+              <a:buNone/>
+            </a:pPr>
+            <a:r>
+              <a:rPr kumimoji="1" lang="en-US" altLang="ja-JP" sz="2400" dirty="0" smtClean="0"/>
+              <a:t>Sometime yum fails when you try to install software to COPPER directory;</a:t>
+            </a:r>
+          </a:p>
+          <a:p>
+            <a:pPr marL="0" indent="0">
+              <a:buNone/>
+            </a:pPr>
+            <a:r>
+              <a:rPr lang="en-US" altLang="ja-JP" sz="2400" dirty="0" err="1" smtClean="0"/>
+              <a:t>readoutPC</a:t>
+            </a:r>
+            <a:r>
+              <a:rPr lang="en-US" altLang="ja-JP" sz="2400" dirty="0" smtClean="0"/>
+              <a:t> # yum install **** --</a:t>
+            </a:r>
+            <a:r>
+              <a:rPr lang="en-US" altLang="ja-JP" sz="2400" dirty="0" err="1" smtClean="0"/>
+              <a:t>installroot</a:t>
+            </a:r>
+            <a:r>
+              <a:rPr lang="en-US" altLang="ja-JP" sz="2400" dirty="0" smtClean="0"/>
+              <a:t>=/</a:t>
+            </a:r>
+            <a:r>
+              <a:rPr lang="en-US" altLang="ja-JP" sz="2400" dirty="0" err="1" smtClean="0"/>
+              <a:t>tftpboot</a:t>
+            </a:r>
+            <a:r>
+              <a:rPr lang="en-US" altLang="ja-JP" sz="2400" dirty="0" smtClean="0"/>
+              <a:t>/copper/root</a:t>
+            </a:r>
+          </a:p>
+          <a:p>
+            <a:pPr marL="0" indent="0">
+              <a:buNone/>
+            </a:pPr>
+            <a:endParaRPr kumimoji="1" lang="en-US" altLang="ja-JP" sz="1800" dirty="0" smtClean="0"/>
+          </a:p>
+          <a:p>
+            <a:pPr marL="0" indent="0">
+              <a:buNone/>
+            </a:pPr>
+            <a:r>
+              <a:rPr lang="en-US" altLang="ja-JP" sz="1800" dirty="0" smtClean="0"/>
+              <a:t>In that case, you need to change yum setting for COPPER host:</a:t>
+            </a:r>
+            <a:endParaRPr kumimoji="1" lang="en-US" altLang="ja-JP" sz="1800" dirty="0"/>
+          </a:p>
+          <a:p>
+            <a:pPr marL="0" indent="0">
+              <a:buNone/>
+            </a:pPr>
+            <a:r>
+              <a:rPr lang="en-US" altLang="ja-JP" sz="1800" dirty="0"/>
+              <a:t>1, Copy yum repository files. </a:t>
+            </a:r>
+            <a:br>
+              <a:rPr lang="en-US" altLang="ja-JP" sz="1800" dirty="0"/>
+            </a:br>
+            <a:r>
+              <a:rPr lang="en-US" altLang="ja-JP" sz="1800" dirty="0" err="1" smtClean="0"/>
+              <a:t>readoutPC</a:t>
+            </a:r>
+            <a:r>
+              <a:rPr lang="en-US" altLang="ja-JP" sz="1800" dirty="0" smtClean="0"/>
+              <a:t> # </a:t>
+            </a:r>
+            <a:r>
+              <a:rPr lang="en-US" altLang="ja-JP" sz="1800" dirty="0" err="1"/>
+              <a:t>cp</a:t>
+            </a:r>
+            <a:r>
+              <a:rPr lang="en-US" altLang="ja-JP" sz="1800" dirty="0"/>
               <a:t> </a:t>
             </a:r>
             <a:r>
-              <a:rPr lang="en-US" altLang="ja-JP" sz="1400" dirty="0" err="1" smtClean="0"/>
-              <a:t>daq</a:t>
-            </a:r>
-            <a:r>
-              <a:rPr lang="en-US" altLang="ja-JP" sz="1400" dirty="0" smtClean="0"/>
-              <a:t>”</a:t>
-            </a:r>
-            <a:endParaRPr kumimoji="1" lang="ja-JP" altLang="en-US" sz="1400" dirty="0"/>
+              <a:rPr lang="en-US" altLang="ja-JP" sz="1800" i="1" dirty="0"/>
+              <a:t>/</a:t>
+            </a:r>
+            <a:r>
+              <a:rPr lang="en-US" altLang="ja-JP" sz="1800" i="1" dirty="0" err="1"/>
+              <a:t>etc</a:t>
+            </a:r>
+            <a:r>
+              <a:rPr lang="en-US" altLang="ja-JP" sz="1800" i="1" dirty="0"/>
+              <a:t>/</a:t>
+            </a:r>
+            <a:r>
+              <a:rPr lang="en-US" altLang="ja-JP" sz="1800" i="1" dirty="0" err="1"/>
+              <a:t>yum.repo.d</a:t>
+            </a:r>
+            <a:r>
+              <a:rPr lang="en-US" altLang="ja-JP" sz="1800" i="1" dirty="0"/>
+              <a:t>/</a:t>
+            </a:r>
+            <a:r>
+              <a:rPr lang="en-US" altLang="ja-JP" sz="1800" dirty="0"/>
+              <a:t>* </a:t>
+            </a:r>
+            <a:r>
+              <a:rPr lang="en-US" altLang="ja-JP" sz="1800" i="1" dirty="0"/>
+              <a:t>/</a:t>
+            </a:r>
+            <a:r>
+              <a:rPr lang="en-US" altLang="ja-JP" sz="1800" i="1" dirty="0" err="1"/>
+              <a:t>tftpboot</a:t>
+            </a:r>
+            <a:r>
+              <a:rPr lang="en-US" altLang="ja-JP" sz="1800" i="1" dirty="0"/>
+              <a:t>/copper/root/</a:t>
+            </a:r>
+            <a:r>
+              <a:rPr lang="en-US" altLang="ja-JP" sz="1800" i="1" dirty="0" err="1"/>
+              <a:t>etc</a:t>
+            </a:r>
+            <a:r>
+              <a:rPr lang="en-US" altLang="ja-JP" sz="1800" i="1" dirty="0"/>
+              <a:t>/</a:t>
+            </a:r>
+            <a:r>
+              <a:rPr lang="en-US" altLang="ja-JP" sz="1800" i="1" dirty="0" err="1"/>
+              <a:t>yum.repo.d</a:t>
+            </a:r>
+            <a:r>
+              <a:rPr lang="en-US" altLang="ja-JP" sz="1800" i="1" dirty="0"/>
+              <a:t>/</a:t>
+            </a:r>
+            <a:r>
+              <a:rPr lang="en-US" altLang="ja-JP" sz="1800" dirty="0"/>
+              <a:t>* </a:t>
+            </a:r>
+            <a:endParaRPr lang="en-US" altLang="ja-JP" sz="1800" dirty="0" smtClean="0"/>
+          </a:p>
+          <a:p>
+            <a:pPr marL="0" indent="0">
+              <a:buNone/>
+            </a:pPr>
+            <a:r>
+              <a:rPr lang="en-US" altLang="ja-JP" sz="1800" dirty="0"/>
+              <a:t/>
+            </a:r>
+            <a:br>
+              <a:rPr lang="en-US" altLang="ja-JP" sz="1800" dirty="0"/>
+            </a:br>
+            <a:r>
+              <a:rPr lang="en-US" altLang="ja-JP" sz="1800" dirty="0"/>
+              <a:t>2, Set a proxy server in /</a:t>
+            </a:r>
+            <a:r>
+              <a:rPr lang="en-US" altLang="ja-JP" sz="1800" dirty="0" err="1"/>
+              <a:t>tftpboot</a:t>
+            </a:r>
+            <a:r>
+              <a:rPr lang="en-US" altLang="ja-JP" sz="1800" dirty="0"/>
+              <a:t>/copper/root/</a:t>
+            </a:r>
+            <a:r>
+              <a:rPr lang="en-US" altLang="ja-JP" sz="1800" dirty="0" err="1"/>
+              <a:t>etc</a:t>
+            </a:r>
+            <a:r>
+              <a:rPr lang="en-US" altLang="ja-JP" sz="1800" dirty="0"/>
+              <a:t>/</a:t>
+            </a:r>
+            <a:r>
+              <a:rPr lang="en-US" altLang="ja-JP" sz="1800" dirty="0" err="1"/>
+              <a:t>yum.conf</a:t>
+            </a:r>
+            <a:r>
+              <a:rPr lang="en-US" altLang="ja-JP" sz="1800" dirty="0"/>
+              <a:t> </a:t>
+            </a:r>
+            <a:r>
+              <a:rPr lang="en-US" altLang="ja-JP" sz="1800" b="1" dirty="0" smtClean="0"/>
+              <a:t>same as</a:t>
+            </a:r>
+            <a:r>
+              <a:rPr lang="en-US" altLang="ja-JP" sz="1800" dirty="0" smtClean="0"/>
+              <a:t> </a:t>
+            </a:r>
+            <a:r>
+              <a:rPr lang="en-US" altLang="ja-JP" sz="1800" dirty="0" err="1" smtClean="0"/>
+              <a:t>readoutPC</a:t>
+            </a:r>
+            <a:r>
+              <a:rPr lang="en-US" altLang="ja-JP" sz="1800" dirty="0" smtClean="0"/>
+              <a:t>:/</a:t>
+            </a:r>
+            <a:r>
+              <a:rPr lang="en-US" altLang="ja-JP" sz="1800" dirty="0" err="1"/>
+              <a:t>etc</a:t>
+            </a:r>
+            <a:r>
+              <a:rPr lang="en-US" altLang="ja-JP" sz="1800" dirty="0"/>
+              <a:t>/</a:t>
+            </a:r>
+            <a:r>
+              <a:rPr lang="en-US" altLang="ja-JP" sz="1800" dirty="0" err="1"/>
+              <a:t>yum.conf</a:t>
+            </a:r>
+            <a:endParaRPr kumimoji="1" lang="ja-JP" altLang="en-US" sz="1800" dirty="0"/>
           </a:p>
         </p:txBody>
       </p:sp>
     </p:spTree>
     <p:extLst>
       <p:ext uri="{BB962C8B-B14F-4D97-AF65-F5344CB8AC3E}">
-        <p14:creationId xmlns:p14="http://schemas.microsoft.com/office/powerpoint/2010/main" val="3008952633"/>
+        <p14:creationId xmlns:p14="http://schemas.microsoft.com/office/powerpoint/2010/main" val="3862598893"/>
       </p:ext>
     </p:extLst>
   </p:cSld>
@@ -5327,7 +5609,2269 @@
 </p:sld>
 </file>
 
-<file path=ppt/slides/slide18.xml><?xml version="1.0" encoding="utf-8"?>
+<file path=ppt/slides/slide19.xml><?xml version="1.0" encoding="utf-8"?>
+<p:sld xmlns:a="http://schemas.openxmlformats.org/drawingml/2006/main" xmlns:r="http://schemas.openxmlformats.org/officeDocument/2006/relationships" xmlns:p="http://schemas.openxmlformats.org/presentationml/2006/main">
+  <p:cSld>
+    <p:spTree>
+      <p:nvGrpSpPr>
+        <p:cNvPr id="1" name=""/>
+        <p:cNvGrpSpPr/>
+        <p:nvPr/>
+      </p:nvGrpSpPr>
+      <p:grpSpPr>
+        <a:xfrm>
+          <a:off x="0" y="0"/>
+          <a:ext cx="0" cy="0"/>
+          <a:chOff x="0" y="0"/>
+          <a:chExt cx="0" cy="0"/>
+        </a:xfrm>
+      </p:grpSpPr>
+      <p:sp>
+        <p:nvSpPr>
+          <p:cNvPr id="2" name="タイトル 1"/>
+          <p:cNvSpPr>
+            <a:spLocks noGrp="1"/>
+          </p:cNvSpPr>
+          <p:nvPr>
+            <p:ph type="title"/>
+          </p:nvPr>
+        </p:nvSpPr>
+        <p:spPr>
+          <a:xfrm>
+            <a:off x="397526" y="122754"/>
+            <a:ext cx="10515600" cy="1325563"/>
+          </a:xfrm>
+        </p:spPr>
+        <p:txBody>
+          <a:bodyPr>
+            <a:normAutofit/>
+          </a:bodyPr>
+          <a:lstStyle/>
+          <a:p>
+            <a:r>
+              <a:rPr kumimoji="1" lang="en-US" altLang="ja-JP" sz="3600" u="sng" dirty="0" smtClean="0"/>
+              <a:t>A-2, </a:t>
+            </a:r>
+            <a:r>
+              <a:rPr lang="en-US" altLang="ja-JP" sz="3600" u="sng" dirty="0" smtClean="0"/>
+              <a:t>Socket </a:t>
+            </a:r>
+            <a:r>
+              <a:rPr kumimoji="1" lang="en-US" altLang="ja-JP" sz="3600" u="sng" dirty="0" smtClean="0"/>
+              <a:t>parameters on COPPER, readout PC and etc..</a:t>
+            </a:r>
+            <a:endParaRPr kumimoji="1" lang="ja-JP" altLang="en-US" sz="3600" u="sng" dirty="0"/>
+          </a:p>
+        </p:txBody>
+      </p:sp>
+      <p:sp>
+        <p:nvSpPr>
+          <p:cNvPr id="4" name="正方形/長方形 3"/>
+          <p:cNvSpPr/>
+          <p:nvPr/>
+        </p:nvSpPr>
+        <p:spPr>
+          <a:xfrm>
+            <a:off x="697832" y="1267844"/>
+            <a:ext cx="9152021" cy="4801314"/>
+          </a:xfrm>
+          <a:prstGeom prst="rect">
+            <a:avLst/>
+          </a:prstGeom>
+        </p:spPr>
+        <p:txBody>
+          <a:bodyPr wrap="square">
+            <a:spAutoFit/>
+          </a:bodyPr>
+          <a:lstStyle/>
+          <a:p>
+            <a:r>
+              <a:rPr lang="en-US" altLang="ja-JP" dirty="0" smtClean="0"/>
+              <a:t>1, Enable </a:t>
+            </a:r>
+            <a:r>
+              <a:rPr lang="en-US" altLang="ja-JP" dirty="0"/>
+              <a:t>“Jumbo Frame” in network switch’s </a:t>
+            </a:r>
+            <a:r>
+              <a:rPr lang="en-US" altLang="ja-JP" dirty="0" smtClean="0"/>
+              <a:t>setting, if necessary (e.g. HP1810-24G)</a:t>
+            </a:r>
+            <a:endParaRPr lang="ja-JP" altLang="en-US" dirty="0"/>
+          </a:p>
+          <a:p>
+            <a:r>
+              <a:rPr lang="en-US" altLang="ja-JP" dirty="0" smtClean="0">
+                <a:solidFill>
+                  <a:srgbClr val="FF0000"/>
+                </a:solidFill>
+              </a:rPr>
+              <a:t>If the switch does not support Jumbo frame, setting MTU a large value may cause a problem.</a:t>
+            </a:r>
+          </a:p>
+          <a:p>
+            <a:endParaRPr lang="en-US" altLang="ja-JP" dirty="0" smtClean="0"/>
+          </a:p>
+          <a:p>
+            <a:r>
+              <a:rPr lang="en-US" altLang="ja-JP" dirty="0" smtClean="0"/>
+              <a:t>2, Change socket parameters</a:t>
+            </a:r>
+          </a:p>
+          <a:p>
+            <a:endParaRPr lang="en-US" altLang="ja-JP" dirty="0"/>
+          </a:p>
+          <a:p>
+            <a:r>
+              <a:rPr lang="en-US" altLang="ja-JP" dirty="0" smtClean="0"/>
+              <a:t># </a:t>
+            </a:r>
+            <a:r>
+              <a:rPr lang="ja-JP" altLang="en-US" dirty="0" smtClean="0"/>
+              <a:t>/</a:t>
+            </a:r>
+            <a:r>
+              <a:rPr lang="ja-JP" altLang="en-US" dirty="0"/>
+              <a:t>sbin/ifconfig </a:t>
+            </a:r>
+            <a:r>
+              <a:rPr lang="ja-JP" altLang="en-US" dirty="0" smtClean="0">
+                <a:solidFill>
+                  <a:srgbClr val="FF0000"/>
+                </a:solidFill>
+              </a:rPr>
+              <a:t>eth</a:t>
+            </a:r>
+            <a:r>
+              <a:rPr lang="en-US" altLang="ja-JP" dirty="0">
+                <a:solidFill>
+                  <a:srgbClr val="FF0000"/>
+                </a:solidFill>
+              </a:rPr>
+              <a:t>?</a:t>
+            </a:r>
+            <a:r>
+              <a:rPr lang="ja-JP" altLang="en-US" dirty="0" smtClean="0">
+                <a:solidFill>
+                  <a:srgbClr val="FF0000"/>
+                </a:solidFill>
+              </a:rPr>
+              <a:t> </a:t>
+            </a:r>
+            <a:r>
+              <a:rPr lang="ja-JP" altLang="en-US" dirty="0"/>
+              <a:t>mtu </a:t>
+            </a:r>
+            <a:r>
+              <a:rPr lang="ja-JP" altLang="en-US" dirty="0" smtClean="0"/>
+              <a:t>9000</a:t>
+            </a:r>
+            <a:endParaRPr lang="en-US" altLang="ja-JP" dirty="0" smtClean="0"/>
+          </a:p>
+          <a:p>
+            <a:endParaRPr lang="ja-JP" altLang="en-US" dirty="0"/>
+          </a:p>
+          <a:p>
+            <a:r>
+              <a:rPr lang="en-US" altLang="ja-JP" dirty="0"/>
+              <a:t># </a:t>
+            </a:r>
+            <a:r>
+              <a:rPr lang="ja-JP" altLang="en-US" dirty="0" smtClean="0"/>
+              <a:t>/</a:t>
+            </a:r>
+            <a:r>
+              <a:rPr lang="ja-JP" altLang="en-US" dirty="0"/>
+              <a:t>sbin/sysctl -w net.ipv4.tcp_rmem="8388608 8388608 8388608"</a:t>
+            </a:r>
+          </a:p>
+          <a:p>
+            <a:r>
+              <a:rPr lang="en-US" altLang="ja-JP" dirty="0"/>
+              <a:t># </a:t>
+            </a:r>
+            <a:r>
+              <a:rPr lang="ja-JP" altLang="en-US" dirty="0" smtClean="0"/>
+              <a:t>/</a:t>
+            </a:r>
+            <a:r>
+              <a:rPr lang="ja-JP" altLang="en-US" dirty="0"/>
+              <a:t>sbin/sysctl -w net.ipv4.tcp_wmem="8388608 8388608 8388608"</a:t>
+            </a:r>
+          </a:p>
+          <a:p>
+            <a:r>
+              <a:rPr lang="en-US" altLang="ja-JP" dirty="0"/>
+              <a:t># </a:t>
+            </a:r>
+            <a:r>
+              <a:rPr lang="ja-JP" altLang="en-US" dirty="0" smtClean="0"/>
+              <a:t>/</a:t>
+            </a:r>
+            <a:r>
+              <a:rPr lang="ja-JP" altLang="en-US" dirty="0"/>
+              <a:t>sbin/sysctl -w net.ipv4.tcp_mem="9000000 9000000 9000000"</a:t>
+            </a:r>
+          </a:p>
+          <a:p>
+            <a:r>
+              <a:rPr lang="en-US" altLang="ja-JP" dirty="0"/>
+              <a:t># </a:t>
+            </a:r>
+            <a:r>
+              <a:rPr lang="ja-JP" altLang="en-US" dirty="0" smtClean="0"/>
+              <a:t>/</a:t>
+            </a:r>
+            <a:r>
+              <a:rPr lang="ja-JP" altLang="en-US" dirty="0"/>
+              <a:t>sbin/sysctl -w net.core.rmem_default=8388608</a:t>
+            </a:r>
+          </a:p>
+          <a:p>
+            <a:r>
+              <a:rPr lang="en-US" altLang="ja-JP" dirty="0"/>
+              <a:t># </a:t>
+            </a:r>
+            <a:r>
+              <a:rPr lang="ja-JP" altLang="en-US" dirty="0" smtClean="0"/>
+              <a:t>/</a:t>
+            </a:r>
+            <a:r>
+              <a:rPr lang="ja-JP" altLang="en-US" dirty="0"/>
+              <a:t>sbin/sysctl -w net.core.wmem_default=8388608</a:t>
+            </a:r>
+          </a:p>
+          <a:p>
+            <a:r>
+              <a:rPr lang="en-US" altLang="ja-JP" dirty="0"/>
+              <a:t># </a:t>
+            </a:r>
+            <a:r>
+              <a:rPr lang="ja-JP" altLang="en-US" dirty="0" smtClean="0"/>
+              <a:t>/</a:t>
+            </a:r>
+            <a:r>
+              <a:rPr lang="ja-JP" altLang="en-US" dirty="0"/>
+              <a:t>sbin/sysctl -w net.core.rmem_max=8388608</a:t>
+            </a:r>
+          </a:p>
+          <a:p>
+            <a:r>
+              <a:rPr lang="en-US" altLang="ja-JP" dirty="0"/>
+              <a:t># </a:t>
+            </a:r>
+            <a:r>
+              <a:rPr lang="ja-JP" altLang="en-US" dirty="0" smtClean="0"/>
+              <a:t>/</a:t>
+            </a:r>
+            <a:r>
+              <a:rPr lang="ja-JP" altLang="en-US" dirty="0"/>
+              <a:t>sbin/sysctl -w net.core.wmem_max=</a:t>
+            </a:r>
+            <a:r>
+              <a:rPr lang="ja-JP" altLang="en-US" dirty="0" smtClean="0"/>
+              <a:t>8388608</a:t>
+            </a:r>
+            <a:endParaRPr lang="en-US" altLang="ja-JP" dirty="0" smtClean="0"/>
+          </a:p>
+          <a:p>
+            <a:endParaRPr lang="en-US" altLang="ja-JP" dirty="0"/>
+          </a:p>
+          <a:p>
+            <a:r>
+              <a:rPr lang="en-US" altLang="ja-JP" dirty="0" smtClean="0"/>
+              <a:t>3, edit /</a:t>
+            </a:r>
+            <a:r>
+              <a:rPr lang="en-US" altLang="ja-JP" dirty="0" err="1" smtClean="0"/>
+              <a:t>etc</a:t>
+            </a:r>
+            <a:r>
+              <a:rPr lang="en-US" altLang="ja-JP" dirty="0" smtClean="0"/>
+              <a:t>/</a:t>
+            </a:r>
+            <a:r>
+              <a:rPr lang="en-US" altLang="ja-JP" dirty="0" err="1" smtClean="0"/>
+              <a:t>rc.local</a:t>
+            </a:r>
+            <a:r>
+              <a:rPr lang="en-US" altLang="ja-JP" dirty="0" smtClean="0"/>
+              <a:t>(or /</a:t>
+            </a:r>
+            <a:r>
+              <a:rPr lang="en-US" altLang="ja-JP" dirty="0" err="1" smtClean="0"/>
+              <a:t>tftpboot</a:t>
+            </a:r>
+            <a:r>
+              <a:rPr lang="en-US" altLang="ja-JP" dirty="0" smtClean="0"/>
+              <a:t>/copper/root/</a:t>
+            </a:r>
+            <a:r>
+              <a:rPr lang="en-US" altLang="ja-JP" dirty="0" err="1" smtClean="0"/>
+              <a:t>etc</a:t>
+            </a:r>
+            <a:r>
+              <a:rPr lang="en-US" altLang="ja-JP" dirty="0" smtClean="0"/>
+              <a:t>/</a:t>
+            </a:r>
+            <a:r>
+              <a:rPr lang="en-US" altLang="ja-JP" dirty="0" err="1" smtClean="0"/>
+              <a:t>rc.local</a:t>
+            </a:r>
+            <a:r>
+              <a:rPr lang="en-US" altLang="ja-JP" dirty="0" smtClean="0"/>
+              <a:t> ) if you want the parameters automatically set at boot time </a:t>
+            </a:r>
+          </a:p>
+        </p:txBody>
+      </p:sp>
+    </p:spTree>
+    <p:extLst>
+      <p:ext uri="{BB962C8B-B14F-4D97-AF65-F5344CB8AC3E}">
+        <p14:creationId xmlns:p14="http://schemas.microsoft.com/office/powerpoint/2010/main" val="4286146674"/>
+      </p:ext>
+    </p:extLst>
+  </p:cSld>
+  <p:clrMapOvr>
+    <a:masterClrMapping/>
+  </p:clrMapOvr>
+</p:sld>
+</file>
+
+<file path=ppt/slides/slide2.xml><?xml version="1.0" encoding="utf-8"?>
+<p:sld xmlns:a="http://schemas.openxmlformats.org/drawingml/2006/main" xmlns:r="http://schemas.openxmlformats.org/officeDocument/2006/relationships" xmlns:p="http://schemas.openxmlformats.org/presentationml/2006/main">
+  <p:cSld>
+    <p:spTree>
+      <p:nvGrpSpPr>
+        <p:cNvPr id="1" name=""/>
+        <p:cNvGrpSpPr/>
+        <p:nvPr/>
+      </p:nvGrpSpPr>
+      <p:grpSpPr>
+        <a:xfrm>
+          <a:off x="0" y="0"/>
+          <a:ext cx="0" cy="0"/>
+          <a:chOff x="0" y="0"/>
+          <a:chExt cx="0" cy="0"/>
+        </a:xfrm>
+      </p:grpSpPr>
+      <p:sp>
+        <p:nvSpPr>
+          <p:cNvPr id="5" name="正方形/長方形 4"/>
+          <p:cNvSpPr/>
+          <p:nvPr/>
+        </p:nvSpPr>
+        <p:spPr>
+          <a:xfrm>
+            <a:off x="3638144" y="3540869"/>
+            <a:ext cx="3492230" cy="2305455"/>
+          </a:xfrm>
+          <a:prstGeom prst="rect">
+            <a:avLst/>
+          </a:prstGeom>
+        </p:spPr>
+        <p:style>
+          <a:lnRef idx="2">
+            <a:schemeClr val="accent1">
+              <a:shade val="50000"/>
+            </a:schemeClr>
+          </a:lnRef>
+          <a:fillRef idx="1">
+            <a:schemeClr val="accent1"/>
+          </a:fillRef>
+          <a:effectRef idx="0">
+            <a:schemeClr val="accent1"/>
+          </a:effectRef>
+          <a:fontRef idx="minor">
+            <a:schemeClr val="lt1"/>
+          </a:fontRef>
+        </p:style>
+        <p:txBody>
+          <a:bodyPr rtlCol="0" anchor="ctr"/>
+          <a:lstStyle/>
+          <a:p>
+            <a:pPr algn="ctr"/>
+            <a:endParaRPr kumimoji="1" lang="ja-JP" altLang="en-US" dirty="0"/>
+          </a:p>
+        </p:txBody>
+      </p:sp>
+      <p:sp>
+        <p:nvSpPr>
+          <p:cNvPr id="6" name="テキスト ボックス 5"/>
+          <p:cNvSpPr txBox="1"/>
+          <p:nvPr/>
+        </p:nvSpPr>
+        <p:spPr>
+          <a:xfrm>
+            <a:off x="3696511" y="3200401"/>
+            <a:ext cx="932819" cy="369332"/>
+          </a:xfrm>
+          <a:prstGeom prst="rect">
+            <a:avLst/>
+          </a:prstGeom>
+          <a:noFill/>
+        </p:spPr>
+        <p:txBody>
+          <a:bodyPr wrap="none" rtlCol="0">
+            <a:spAutoFit/>
+          </a:bodyPr>
+          <a:lstStyle/>
+          <a:p>
+            <a:r>
+              <a:rPr kumimoji="1" lang="en-US" altLang="ja-JP" dirty="0" smtClean="0"/>
+              <a:t>COPPER</a:t>
+            </a:r>
+            <a:endParaRPr kumimoji="1" lang="ja-JP" altLang="en-US" dirty="0"/>
+          </a:p>
+        </p:txBody>
+      </p:sp>
+      <p:sp>
+        <p:nvSpPr>
+          <p:cNvPr id="7" name="正方形/長方形 6"/>
+          <p:cNvSpPr/>
+          <p:nvPr/>
+        </p:nvSpPr>
+        <p:spPr>
+          <a:xfrm>
+            <a:off x="3713307" y="3600298"/>
+            <a:ext cx="1832043" cy="434661"/>
+          </a:xfrm>
+          <a:prstGeom prst="rect">
+            <a:avLst/>
+          </a:prstGeom>
+          <a:solidFill>
+            <a:srgbClr val="92D050"/>
+          </a:solidFill>
+        </p:spPr>
+        <p:style>
+          <a:lnRef idx="2">
+            <a:schemeClr val="accent1">
+              <a:shade val="50000"/>
+            </a:schemeClr>
+          </a:lnRef>
+          <a:fillRef idx="1">
+            <a:schemeClr val="accent1"/>
+          </a:fillRef>
+          <a:effectRef idx="0">
+            <a:schemeClr val="accent1"/>
+          </a:effectRef>
+          <a:fontRef idx="minor">
+            <a:schemeClr val="lt1"/>
+          </a:fontRef>
+        </p:style>
+        <p:txBody>
+          <a:bodyPr rtlCol="0" anchor="ctr"/>
+          <a:lstStyle/>
+          <a:p>
+            <a:pPr algn="ctr"/>
+            <a:r>
+              <a:rPr lang="en-US" altLang="ja-JP" dirty="0" smtClean="0"/>
+              <a:t>HSLB</a:t>
+            </a:r>
+            <a:endParaRPr kumimoji="1" lang="ja-JP" altLang="en-US" dirty="0"/>
+          </a:p>
+        </p:txBody>
+      </p:sp>
+      <p:sp>
+        <p:nvSpPr>
+          <p:cNvPr id="8" name="正方形/長方形 7"/>
+          <p:cNvSpPr/>
+          <p:nvPr/>
+        </p:nvSpPr>
+        <p:spPr>
+          <a:xfrm>
+            <a:off x="3713307" y="4112249"/>
+            <a:ext cx="1832043" cy="401386"/>
+          </a:xfrm>
+          <a:prstGeom prst="rect">
+            <a:avLst/>
+          </a:prstGeom>
+          <a:solidFill>
+            <a:srgbClr val="92D050"/>
+          </a:solidFill>
+        </p:spPr>
+        <p:style>
+          <a:lnRef idx="2">
+            <a:schemeClr val="accent1">
+              <a:shade val="50000"/>
+            </a:schemeClr>
+          </a:lnRef>
+          <a:fillRef idx="1">
+            <a:schemeClr val="accent1"/>
+          </a:fillRef>
+          <a:effectRef idx="0">
+            <a:schemeClr val="accent1"/>
+          </a:effectRef>
+          <a:fontRef idx="minor">
+            <a:schemeClr val="lt1"/>
+          </a:fontRef>
+        </p:style>
+        <p:txBody>
+          <a:bodyPr rtlCol="0" anchor="ctr"/>
+          <a:lstStyle/>
+          <a:p>
+            <a:pPr algn="ctr"/>
+            <a:r>
+              <a:rPr lang="en-US" altLang="ja-JP" dirty="0" smtClean="0"/>
+              <a:t>HSLB</a:t>
+            </a:r>
+            <a:endParaRPr kumimoji="1" lang="ja-JP" altLang="en-US" dirty="0"/>
+          </a:p>
+        </p:txBody>
+      </p:sp>
+      <p:sp>
+        <p:nvSpPr>
+          <p:cNvPr id="9" name="正方形/長方形 8"/>
+          <p:cNvSpPr/>
+          <p:nvPr/>
+        </p:nvSpPr>
+        <p:spPr>
+          <a:xfrm>
+            <a:off x="3713307" y="4590925"/>
+            <a:ext cx="1832043" cy="401386"/>
+          </a:xfrm>
+          <a:prstGeom prst="rect">
+            <a:avLst/>
+          </a:prstGeom>
+          <a:solidFill>
+            <a:srgbClr val="92D050"/>
+          </a:solidFill>
+        </p:spPr>
+        <p:style>
+          <a:lnRef idx="2">
+            <a:schemeClr val="accent1">
+              <a:shade val="50000"/>
+            </a:schemeClr>
+          </a:lnRef>
+          <a:fillRef idx="1">
+            <a:schemeClr val="accent1"/>
+          </a:fillRef>
+          <a:effectRef idx="0">
+            <a:schemeClr val="accent1"/>
+          </a:effectRef>
+          <a:fontRef idx="minor">
+            <a:schemeClr val="lt1"/>
+          </a:fontRef>
+        </p:style>
+        <p:txBody>
+          <a:bodyPr rtlCol="0" anchor="ctr"/>
+          <a:lstStyle/>
+          <a:p>
+            <a:pPr algn="ctr"/>
+            <a:r>
+              <a:rPr lang="en-US" altLang="ja-JP" dirty="0" smtClean="0"/>
+              <a:t>HSLB</a:t>
+            </a:r>
+            <a:endParaRPr kumimoji="1" lang="ja-JP" altLang="en-US" dirty="0"/>
+          </a:p>
+        </p:txBody>
+      </p:sp>
+      <p:sp>
+        <p:nvSpPr>
+          <p:cNvPr id="10" name="正方形/長方形 9"/>
+          <p:cNvSpPr/>
+          <p:nvPr/>
+        </p:nvSpPr>
+        <p:spPr>
+          <a:xfrm>
+            <a:off x="3696511" y="5069601"/>
+            <a:ext cx="1832043" cy="401386"/>
+          </a:xfrm>
+          <a:prstGeom prst="rect">
+            <a:avLst/>
+          </a:prstGeom>
+          <a:solidFill>
+            <a:srgbClr val="92D050"/>
+          </a:solidFill>
+        </p:spPr>
+        <p:style>
+          <a:lnRef idx="2">
+            <a:schemeClr val="accent1">
+              <a:shade val="50000"/>
+            </a:schemeClr>
+          </a:lnRef>
+          <a:fillRef idx="1">
+            <a:schemeClr val="accent1"/>
+          </a:fillRef>
+          <a:effectRef idx="0">
+            <a:schemeClr val="accent1"/>
+          </a:effectRef>
+          <a:fontRef idx="minor">
+            <a:schemeClr val="lt1"/>
+          </a:fontRef>
+        </p:style>
+        <p:txBody>
+          <a:bodyPr rtlCol="0" anchor="ctr"/>
+          <a:lstStyle/>
+          <a:p>
+            <a:pPr algn="ctr"/>
+            <a:r>
+              <a:rPr lang="en-US" altLang="ja-JP" dirty="0" smtClean="0"/>
+              <a:t>HSLB</a:t>
+            </a:r>
+            <a:endParaRPr kumimoji="1" lang="ja-JP" altLang="en-US" dirty="0"/>
+          </a:p>
+        </p:txBody>
+      </p:sp>
+      <p:sp>
+        <p:nvSpPr>
+          <p:cNvPr id="11" name="正方形/長方形 10"/>
+          <p:cNvSpPr/>
+          <p:nvPr/>
+        </p:nvSpPr>
+        <p:spPr>
+          <a:xfrm>
+            <a:off x="5756115" y="3668819"/>
+            <a:ext cx="1240484" cy="545942"/>
+          </a:xfrm>
+          <a:prstGeom prst="rect">
+            <a:avLst/>
+          </a:prstGeom>
+          <a:solidFill>
+            <a:srgbClr val="92D050"/>
+          </a:solidFill>
+        </p:spPr>
+        <p:style>
+          <a:lnRef idx="2">
+            <a:schemeClr val="accent1">
+              <a:shade val="50000"/>
+            </a:schemeClr>
+          </a:lnRef>
+          <a:fillRef idx="1">
+            <a:schemeClr val="accent1"/>
+          </a:fillRef>
+          <a:effectRef idx="0">
+            <a:schemeClr val="accent1"/>
+          </a:effectRef>
+          <a:fontRef idx="minor">
+            <a:schemeClr val="lt1"/>
+          </a:fontRef>
+        </p:style>
+        <p:txBody>
+          <a:bodyPr rtlCol="0" anchor="ctr"/>
+          <a:lstStyle/>
+          <a:p>
+            <a:pPr algn="ctr"/>
+            <a:r>
+              <a:rPr lang="en-US" altLang="ja-JP" dirty="0" smtClean="0"/>
+              <a:t>COPPER</a:t>
+            </a:r>
+          </a:p>
+          <a:p>
+            <a:pPr algn="ctr"/>
+            <a:r>
+              <a:rPr kumimoji="1" lang="en-US" altLang="ja-JP" dirty="0" smtClean="0"/>
+              <a:t>CPU</a:t>
+            </a:r>
+            <a:endParaRPr kumimoji="1" lang="ja-JP" altLang="en-US" dirty="0"/>
+          </a:p>
+        </p:txBody>
+      </p:sp>
+      <p:cxnSp>
+        <p:nvCxnSpPr>
+          <p:cNvPr id="13" name="直線コネクタ 12"/>
+          <p:cNvCxnSpPr/>
+          <p:nvPr/>
+        </p:nvCxnSpPr>
+        <p:spPr>
+          <a:xfrm flipH="1">
+            <a:off x="1167320" y="5660009"/>
+            <a:ext cx="2470826" cy="6872"/>
+          </a:xfrm>
+          <a:prstGeom prst="line">
+            <a:avLst/>
+          </a:prstGeom>
+        </p:spPr>
+        <p:style>
+          <a:lnRef idx="1">
+            <a:schemeClr val="accent1"/>
+          </a:lnRef>
+          <a:fillRef idx="0">
+            <a:schemeClr val="accent1"/>
+          </a:fillRef>
+          <a:effectRef idx="0">
+            <a:schemeClr val="accent1"/>
+          </a:effectRef>
+          <a:fontRef idx="minor">
+            <a:schemeClr val="tx1"/>
+          </a:fontRef>
+        </p:style>
+      </p:cxnSp>
+      <p:cxnSp>
+        <p:nvCxnSpPr>
+          <p:cNvPr id="14" name="直線コネクタ 13"/>
+          <p:cNvCxnSpPr/>
+          <p:nvPr/>
+        </p:nvCxnSpPr>
+        <p:spPr>
+          <a:xfrm>
+            <a:off x="1167320" y="1643073"/>
+            <a:ext cx="0" cy="4028154"/>
+          </a:xfrm>
+          <a:prstGeom prst="line">
+            <a:avLst/>
+          </a:prstGeom>
+        </p:spPr>
+        <p:style>
+          <a:lnRef idx="1">
+            <a:schemeClr val="accent1"/>
+          </a:lnRef>
+          <a:fillRef idx="0">
+            <a:schemeClr val="accent1"/>
+          </a:fillRef>
+          <a:effectRef idx="0">
+            <a:schemeClr val="accent1"/>
+          </a:effectRef>
+          <a:fontRef idx="minor">
+            <a:schemeClr val="tx1"/>
+          </a:fontRef>
+        </p:style>
+      </p:cxnSp>
+      <p:sp>
+        <p:nvSpPr>
+          <p:cNvPr id="22" name="正方形/長方形 21"/>
+          <p:cNvSpPr/>
+          <p:nvPr/>
+        </p:nvSpPr>
+        <p:spPr>
+          <a:xfrm>
+            <a:off x="3541789" y="1382420"/>
+            <a:ext cx="1094071" cy="545493"/>
+          </a:xfrm>
+          <a:prstGeom prst="rect">
+            <a:avLst/>
+          </a:prstGeom>
+        </p:spPr>
+        <p:style>
+          <a:lnRef idx="2">
+            <a:schemeClr val="accent1">
+              <a:shade val="50000"/>
+            </a:schemeClr>
+          </a:lnRef>
+          <a:fillRef idx="1">
+            <a:schemeClr val="accent1"/>
+          </a:fillRef>
+          <a:effectRef idx="0">
+            <a:schemeClr val="accent1"/>
+          </a:effectRef>
+          <a:fontRef idx="minor">
+            <a:schemeClr val="lt1"/>
+          </a:fontRef>
+        </p:style>
+        <p:txBody>
+          <a:bodyPr rtlCol="0" anchor="ctr"/>
+          <a:lstStyle/>
+          <a:p>
+            <a:pPr algn="ctr"/>
+            <a:r>
+              <a:rPr kumimoji="1" lang="en-US" altLang="ja-JP" dirty="0" smtClean="0"/>
+              <a:t>Network</a:t>
+            </a:r>
+          </a:p>
+          <a:p>
+            <a:pPr algn="ctr"/>
+            <a:r>
+              <a:rPr lang="en-US" altLang="ja-JP" dirty="0" smtClean="0"/>
+              <a:t>switch</a:t>
+            </a:r>
+            <a:endParaRPr kumimoji="1" lang="ja-JP" altLang="en-US" dirty="0"/>
+          </a:p>
+        </p:txBody>
+      </p:sp>
+      <p:cxnSp>
+        <p:nvCxnSpPr>
+          <p:cNvPr id="23" name="直線コネクタ 22"/>
+          <p:cNvCxnSpPr>
+            <a:stCxn id="22" idx="1"/>
+          </p:cNvCxnSpPr>
+          <p:nvPr/>
+        </p:nvCxnSpPr>
+        <p:spPr>
+          <a:xfrm flipH="1" flipV="1">
+            <a:off x="1173850" y="1655166"/>
+            <a:ext cx="2367939" cy="1"/>
+          </a:xfrm>
+          <a:prstGeom prst="line">
+            <a:avLst/>
+          </a:prstGeom>
+        </p:spPr>
+        <p:style>
+          <a:lnRef idx="1">
+            <a:schemeClr val="accent1"/>
+          </a:lnRef>
+          <a:fillRef idx="0">
+            <a:schemeClr val="accent1"/>
+          </a:fillRef>
+          <a:effectRef idx="0">
+            <a:schemeClr val="accent1"/>
+          </a:effectRef>
+          <a:fontRef idx="minor">
+            <a:schemeClr val="tx1"/>
+          </a:fontRef>
+        </p:style>
+      </p:cxnSp>
+      <p:sp>
+        <p:nvSpPr>
+          <p:cNvPr id="27" name="正方形/長方形 26"/>
+          <p:cNvSpPr/>
+          <p:nvPr/>
+        </p:nvSpPr>
+        <p:spPr>
+          <a:xfrm>
+            <a:off x="6337861" y="1222952"/>
+            <a:ext cx="2708862" cy="840240"/>
+          </a:xfrm>
+          <a:prstGeom prst="rect">
+            <a:avLst/>
+          </a:prstGeom>
+          <a:solidFill>
+            <a:srgbClr val="00B050"/>
+          </a:solidFill>
+        </p:spPr>
+        <p:style>
+          <a:lnRef idx="2">
+            <a:schemeClr val="accent1">
+              <a:shade val="50000"/>
+            </a:schemeClr>
+          </a:lnRef>
+          <a:fillRef idx="1">
+            <a:schemeClr val="accent1"/>
+          </a:fillRef>
+          <a:effectRef idx="0">
+            <a:schemeClr val="accent1"/>
+          </a:effectRef>
+          <a:fontRef idx="minor">
+            <a:schemeClr val="lt1"/>
+          </a:fontRef>
+        </p:style>
+        <p:txBody>
+          <a:bodyPr rtlCol="0" anchor="ctr"/>
+          <a:lstStyle/>
+          <a:p>
+            <a:pPr algn="ctr"/>
+            <a:r>
+              <a:rPr kumimoji="1" lang="en-US" altLang="ja-JP" dirty="0" smtClean="0"/>
+              <a:t>Readout</a:t>
+            </a:r>
+          </a:p>
+          <a:p>
+            <a:pPr algn="ctr"/>
+            <a:r>
+              <a:rPr kumimoji="1" lang="en-US" altLang="ja-JP" dirty="0" smtClean="0"/>
+              <a:t>PC (PXE boot server)</a:t>
+            </a:r>
+            <a:endParaRPr kumimoji="1" lang="ja-JP" altLang="en-US" dirty="0"/>
+          </a:p>
+        </p:txBody>
+      </p:sp>
+      <p:cxnSp>
+        <p:nvCxnSpPr>
+          <p:cNvPr id="28" name="直線コネクタ 27"/>
+          <p:cNvCxnSpPr>
+            <a:stCxn id="27" idx="1"/>
+            <a:endCxn id="22" idx="3"/>
+          </p:cNvCxnSpPr>
+          <p:nvPr/>
+        </p:nvCxnSpPr>
+        <p:spPr>
+          <a:xfrm flipH="1">
+            <a:off x="4635860" y="1643072"/>
+            <a:ext cx="1702001" cy="12095"/>
+          </a:xfrm>
+          <a:prstGeom prst="line">
+            <a:avLst/>
+          </a:prstGeom>
+        </p:spPr>
+        <p:style>
+          <a:lnRef idx="1">
+            <a:schemeClr val="accent1"/>
+          </a:lnRef>
+          <a:fillRef idx="0">
+            <a:schemeClr val="accent1"/>
+          </a:fillRef>
+          <a:effectRef idx="0">
+            <a:schemeClr val="accent1"/>
+          </a:effectRef>
+          <a:fontRef idx="minor">
+            <a:schemeClr val="tx1"/>
+          </a:fontRef>
+        </p:style>
+      </p:cxnSp>
+      <p:sp>
+        <p:nvSpPr>
+          <p:cNvPr id="38" name="正方形/長方形 37"/>
+          <p:cNvSpPr/>
+          <p:nvPr/>
+        </p:nvSpPr>
+        <p:spPr>
+          <a:xfrm>
+            <a:off x="1606391" y="3599979"/>
+            <a:ext cx="972768" cy="405797"/>
+          </a:xfrm>
+          <a:prstGeom prst="rect">
+            <a:avLst/>
+          </a:prstGeom>
+          <a:solidFill>
+            <a:srgbClr val="92D050"/>
+          </a:solidFill>
+        </p:spPr>
+        <p:style>
+          <a:lnRef idx="2">
+            <a:schemeClr val="accent1">
+              <a:shade val="50000"/>
+            </a:schemeClr>
+          </a:lnRef>
+          <a:fillRef idx="1">
+            <a:schemeClr val="accent1"/>
+          </a:fillRef>
+          <a:effectRef idx="0">
+            <a:schemeClr val="accent1"/>
+          </a:effectRef>
+          <a:fontRef idx="minor">
+            <a:schemeClr val="lt1"/>
+          </a:fontRef>
+        </p:style>
+        <p:txBody>
+          <a:bodyPr rtlCol="0" anchor="ctr"/>
+          <a:lstStyle/>
+          <a:p>
+            <a:pPr algn="ctr"/>
+            <a:r>
+              <a:rPr lang="en-US" altLang="ja-JP" dirty="0" smtClean="0"/>
+              <a:t>FEE</a:t>
+            </a:r>
+            <a:endParaRPr kumimoji="1" lang="ja-JP" altLang="en-US" dirty="0"/>
+          </a:p>
+        </p:txBody>
+      </p:sp>
+      <p:sp>
+        <p:nvSpPr>
+          <p:cNvPr id="39" name="正方形/長方形 38"/>
+          <p:cNvSpPr/>
+          <p:nvPr/>
+        </p:nvSpPr>
+        <p:spPr>
+          <a:xfrm>
+            <a:off x="1606391" y="4119956"/>
+            <a:ext cx="972768" cy="405797"/>
+          </a:xfrm>
+          <a:prstGeom prst="rect">
+            <a:avLst/>
+          </a:prstGeom>
+          <a:solidFill>
+            <a:srgbClr val="92D050"/>
+          </a:solidFill>
+        </p:spPr>
+        <p:style>
+          <a:lnRef idx="2">
+            <a:schemeClr val="accent1">
+              <a:shade val="50000"/>
+            </a:schemeClr>
+          </a:lnRef>
+          <a:fillRef idx="1">
+            <a:schemeClr val="accent1"/>
+          </a:fillRef>
+          <a:effectRef idx="0">
+            <a:schemeClr val="accent1"/>
+          </a:effectRef>
+          <a:fontRef idx="minor">
+            <a:schemeClr val="lt1"/>
+          </a:fontRef>
+        </p:style>
+        <p:txBody>
+          <a:bodyPr rtlCol="0" anchor="ctr"/>
+          <a:lstStyle/>
+          <a:p>
+            <a:pPr algn="ctr"/>
+            <a:r>
+              <a:rPr lang="en-US" altLang="ja-JP" dirty="0" smtClean="0"/>
+              <a:t>FEE</a:t>
+            </a:r>
+            <a:endParaRPr kumimoji="1" lang="ja-JP" altLang="en-US" dirty="0"/>
+          </a:p>
+        </p:txBody>
+      </p:sp>
+      <p:sp>
+        <p:nvSpPr>
+          <p:cNvPr id="40" name="正方形/長方形 39"/>
+          <p:cNvSpPr/>
+          <p:nvPr/>
+        </p:nvSpPr>
+        <p:spPr>
+          <a:xfrm>
+            <a:off x="1606391" y="4590925"/>
+            <a:ext cx="972768" cy="405797"/>
+          </a:xfrm>
+          <a:prstGeom prst="rect">
+            <a:avLst/>
+          </a:prstGeom>
+          <a:solidFill>
+            <a:srgbClr val="92D050"/>
+          </a:solidFill>
+        </p:spPr>
+        <p:style>
+          <a:lnRef idx="2">
+            <a:schemeClr val="accent1">
+              <a:shade val="50000"/>
+            </a:schemeClr>
+          </a:lnRef>
+          <a:fillRef idx="1">
+            <a:schemeClr val="accent1"/>
+          </a:fillRef>
+          <a:effectRef idx="0">
+            <a:schemeClr val="accent1"/>
+          </a:effectRef>
+          <a:fontRef idx="minor">
+            <a:schemeClr val="lt1"/>
+          </a:fontRef>
+        </p:style>
+        <p:txBody>
+          <a:bodyPr rtlCol="0" anchor="ctr"/>
+          <a:lstStyle/>
+          <a:p>
+            <a:pPr algn="ctr"/>
+            <a:r>
+              <a:rPr lang="en-US" altLang="ja-JP" dirty="0" smtClean="0"/>
+              <a:t>FEE</a:t>
+            </a:r>
+            <a:endParaRPr kumimoji="1" lang="ja-JP" altLang="en-US" dirty="0"/>
+          </a:p>
+        </p:txBody>
+      </p:sp>
+      <p:sp>
+        <p:nvSpPr>
+          <p:cNvPr id="41" name="正方形/長方形 40"/>
+          <p:cNvSpPr/>
+          <p:nvPr/>
+        </p:nvSpPr>
+        <p:spPr>
+          <a:xfrm>
+            <a:off x="1595334" y="5069601"/>
+            <a:ext cx="972768" cy="405797"/>
+          </a:xfrm>
+          <a:prstGeom prst="rect">
+            <a:avLst/>
+          </a:prstGeom>
+          <a:solidFill>
+            <a:srgbClr val="92D050"/>
+          </a:solidFill>
+        </p:spPr>
+        <p:style>
+          <a:lnRef idx="2">
+            <a:schemeClr val="accent1">
+              <a:shade val="50000"/>
+            </a:schemeClr>
+          </a:lnRef>
+          <a:fillRef idx="1">
+            <a:schemeClr val="accent1"/>
+          </a:fillRef>
+          <a:effectRef idx="0">
+            <a:schemeClr val="accent1"/>
+          </a:effectRef>
+          <a:fontRef idx="minor">
+            <a:schemeClr val="lt1"/>
+          </a:fontRef>
+        </p:style>
+        <p:txBody>
+          <a:bodyPr rtlCol="0" anchor="ctr"/>
+          <a:lstStyle/>
+          <a:p>
+            <a:pPr algn="ctr"/>
+            <a:r>
+              <a:rPr lang="en-US" altLang="ja-JP" dirty="0" smtClean="0"/>
+              <a:t>FEE</a:t>
+            </a:r>
+            <a:endParaRPr kumimoji="1" lang="ja-JP" altLang="en-US" dirty="0"/>
+          </a:p>
+        </p:txBody>
+      </p:sp>
+      <p:cxnSp>
+        <p:nvCxnSpPr>
+          <p:cNvPr id="44" name="直線コネクタ 43"/>
+          <p:cNvCxnSpPr>
+            <a:stCxn id="7" idx="1"/>
+            <a:endCxn id="38" idx="3"/>
+          </p:cNvCxnSpPr>
+          <p:nvPr/>
+        </p:nvCxnSpPr>
+        <p:spPr>
+          <a:xfrm flipH="1" flipV="1">
+            <a:off x="2579159" y="3802878"/>
+            <a:ext cx="1134148" cy="14751"/>
+          </a:xfrm>
+          <a:prstGeom prst="line">
+            <a:avLst/>
+          </a:prstGeom>
+          <a:ln w="38100">
+            <a:solidFill>
+              <a:srgbClr val="FFC000"/>
+            </a:solidFill>
+          </a:ln>
+        </p:spPr>
+        <p:style>
+          <a:lnRef idx="1">
+            <a:schemeClr val="accent1"/>
+          </a:lnRef>
+          <a:fillRef idx="0">
+            <a:schemeClr val="accent1"/>
+          </a:fillRef>
+          <a:effectRef idx="0">
+            <a:schemeClr val="accent1"/>
+          </a:effectRef>
+          <a:fontRef idx="minor">
+            <a:schemeClr val="tx1"/>
+          </a:fontRef>
+        </p:style>
+      </p:cxnSp>
+      <p:cxnSp>
+        <p:nvCxnSpPr>
+          <p:cNvPr id="48" name="直線コネクタ 47"/>
+          <p:cNvCxnSpPr>
+            <a:stCxn id="8" idx="1"/>
+            <a:endCxn id="39" idx="3"/>
+          </p:cNvCxnSpPr>
+          <p:nvPr/>
+        </p:nvCxnSpPr>
+        <p:spPr>
+          <a:xfrm flipH="1">
+            <a:off x="2579159" y="4312942"/>
+            <a:ext cx="1134148" cy="9913"/>
+          </a:xfrm>
+          <a:prstGeom prst="line">
+            <a:avLst/>
+          </a:prstGeom>
+          <a:ln w="38100">
+            <a:solidFill>
+              <a:srgbClr val="FFC000"/>
+            </a:solidFill>
+          </a:ln>
+        </p:spPr>
+        <p:style>
+          <a:lnRef idx="1">
+            <a:schemeClr val="accent1"/>
+          </a:lnRef>
+          <a:fillRef idx="0">
+            <a:schemeClr val="accent1"/>
+          </a:fillRef>
+          <a:effectRef idx="0">
+            <a:schemeClr val="accent1"/>
+          </a:effectRef>
+          <a:fontRef idx="minor">
+            <a:schemeClr val="tx1"/>
+          </a:fontRef>
+        </p:style>
+      </p:cxnSp>
+      <p:cxnSp>
+        <p:nvCxnSpPr>
+          <p:cNvPr id="52" name="直線コネクタ 51"/>
+          <p:cNvCxnSpPr>
+            <a:stCxn id="9" idx="1"/>
+            <a:endCxn id="40" idx="3"/>
+          </p:cNvCxnSpPr>
+          <p:nvPr/>
+        </p:nvCxnSpPr>
+        <p:spPr>
+          <a:xfrm flipH="1">
+            <a:off x="2579159" y="4791618"/>
+            <a:ext cx="1134148" cy="2206"/>
+          </a:xfrm>
+          <a:prstGeom prst="line">
+            <a:avLst/>
+          </a:prstGeom>
+          <a:ln w="38100">
+            <a:solidFill>
+              <a:srgbClr val="FFC000"/>
+            </a:solidFill>
+          </a:ln>
+        </p:spPr>
+        <p:style>
+          <a:lnRef idx="1">
+            <a:schemeClr val="accent1"/>
+          </a:lnRef>
+          <a:fillRef idx="0">
+            <a:schemeClr val="accent1"/>
+          </a:fillRef>
+          <a:effectRef idx="0">
+            <a:schemeClr val="accent1"/>
+          </a:effectRef>
+          <a:fontRef idx="minor">
+            <a:schemeClr val="tx1"/>
+          </a:fontRef>
+        </p:style>
+      </p:cxnSp>
+      <p:cxnSp>
+        <p:nvCxnSpPr>
+          <p:cNvPr id="55" name="直線コネクタ 54"/>
+          <p:cNvCxnSpPr>
+            <a:endCxn id="41" idx="3"/>
+          </p:cNvCxnSpPr>
+          <p:nvPr/>
+        </p:nvCxnSpPr>
+        <p:spPr>
+          <a:xfrm flipH="1" flipV="1">
+            <a:off x="2568102" y="5272500"/>
+            <a:ext cx="1128409" cy="2205"/>
+          </a:xfrm>
+          <a:prstGeom prst="line">
+            <a:avLst/>
+          </a:prstGeom>
+          <a:ln w="38100">
+            <a:solidFill>
+              <a:srgbClr val="FFC000"/>
+            </a:solidFill>
+          </a:ln>
+        </p:spPr>
+        <p:style>
+          <a:lnRef idx="1">
+            <a:schemeClr val="accent1"/>
+          </a:lnRef>
+          <a:fillRef idx="0">
+            <a:schemeClr val="accent1"/>
+          </a:fillRef>
+          <a:effectRef idx="0">
+            <a:schemeClr val="accent1"/>
+          </a:effectRef>
+          <a:fontRef idx="minor">
+            <a:schemeClr val="tx1"/>
+          </a:fontRef>
+        </p:style>
+      </p:cxnSp>
+      <p:sp>
+        <p:nvSpPr>
+          <p:cNvPr id="58" name="テキスト ボックス 57"/>
+          <p:cNvSpPr txBox="1"/>
+          <p:nvPr/>
+        </p:nvSpPr>
+        <p:spPr>
+          <a:xfrm rot="16200000">
+            <a:off x="481908" y="2261854"/>
+            <a:ext cx="1001493" cy="369332"/>
+          </a:xfrm>
+          <a:prstGeom prst="rect">
+            <a:avLst/>
+          </a:prstGeom>
+          <a:noFill/>
+        </p:spPr>
+        <p:txBody>
+          <a:bodyPr wrap="none" rtlCol="0">
+            <a:spAutoFit/>
+          </a:bodyPr>
+          <a:lstStyle/>
+          <a:p>
+            <a:r>
+              <a:rPr kumimoji="1" lang="en-US" altLang="ja-JP" dirty="0" smtClean="0"/>
+              <a:t>Ethernet</a:t>
+            </a:r>
+            <a:endParaRPr kumimoji="1" lang="ja-JP" altLang="en-US" dirty="0"/>
+          </a:p>
+        </p:txBody>
+      </p:sp>
+      <p:sp>
+        <p:nvSpPr>
+          <p:cNvPr id="63" name="テキスト ボックス 62"/>
+          <p:cNvSpPr txBox="1"/>
+          <p:nvPr/>
+        </p:nvSpPr>
+        <p:spPr>
+          <a:xfrm>
+            <a:off x="2626789" y="3484153"/>
+            <a:ext cx="758541" cy="369332"/>
+          </a:xfrm>
+          <a:prstGeom prst="rect">
+            <a:avLst/>
+          </a:prstGeom>
+          <a:noFill/>
+        </p:spPr>
+        <p:txBody>
+          <a:bodyPr wrap="none" rtlCol="0">
+            <a:spAutoFit/>
+          </a:bodyPr>
+          <a:lstStyle/>
+          <a:p>
+            <a:r>
+              <a:rPr kumimoji="1" lang="en-US" altLang="ja-JP" dirty="0" smtClean="0"/>
+              <a:t>B2link</a:t>
+            </a:r>
+            <a:endParaRPr kumimoji="1" lang="ja-JP" altLang="en-US" dirty="0"/>
+          </a:p>
+        </p:txBody>
+      </p:sp>
+      <p:sp>
+        <p:nvSpPr>
+          <p:cNvPr id="64" name="テキスト ボックス 63"/>
+          <p:cNvSpPr txBox="1"/>
+          <p:nvPr/>
+        </p:nvSpPr>
+        <p:spPr>
+          <a:xfrm>
+            <a:off x="35857" y="97439"/>
+            <a:ext cx="5828712" cy="584775"/>
+          </a:xfrm>
+          <a:prstGeom prst="rect">
+            <a:avLst/>
+          </a:prstGeom>
+          <a:noFill/>
+        </p:spPr>
+        <p:txBody>
+          <a:bodyPr wrap="none" rtlCol="0">
+            <a:spAutoFit/>
+          </a:bodyPr>
+          <a:lstStyle/>
+          <a:p>
+            <a:r>
+              <a:rPr kumimoji="1" lang="en-US" altLang="ja-JP" sz="3200" u="sng" dirty="0" smtClean="0"/>
+              <a:t>Connection </a:t>
+            </a:r>
+            <a:r>
+              <a:rPr lang="en-US" altLang="ja-JP" sz="3200" u="sng" dirty="0" smtClean="0"/>
+              <a:t>between components</a:t>
+            </a:r>
+            <a:endParaRPr kumimoji="1" lang="ja-JP" altLang="en-US" sz="3200" u="sng" dirty="0"/>
+          </a:p>
+        </p:txBody>
+      </p:sp>
+      <p:sp>
+        <p:nvSpPr>
+          <p:cNvPr id="29" name="正方形/長方形 28"/>
+          <p:cNvSpPr/>
+          <p:nvPr/>
+        </p:nvSpPr>
+        <p:spPr>
+          <a:xfrm>
+            <a:off x="5966881" y="5146496"/>
+            <a:ext cx="1163493" cy="545942"/>
+          </a:xfrm>
+          <a:prstGeom prst="rect">
+            <a:avLst/>
+          </a:prstGeom>
+          <a:solidFill>
+            <a:srgbClr val="92D050"/>
+          </a:solidFill>
+        </p:spPr>
+        <p:style>
+          <a:lnRef idx="2">
+            <a:schemeClr val="accent1">
+              <a:shade val="50000"/>
+            </a:schemeClr>
+          </a:lnRef>
+          <a:fillRef idx="1">
+            <a:schemeClr val="accent1"/>
+          </a:fillRef>
+          <a:effectRef idx="0">
+            <a:schemeClr val="accent1"/>
+          </a:effectRef>
+          <a:fontRef idx="minor">
+            <a:schemeClr val="lt1"/>
+          </a:fontRef>
+        </p:style>
+        <p:txBody>
+          <a:bodyPr rtlCol="0" anchor="ctr"/>
+          <a:lstStyle/>
+          <a:p>
+            <a:pPr algn="ctr"/>
+            <a:r>
+              <a:rPr lang="en-US" altLang="ja-JP" dirty="0" smtClean="0"/>
+              <a:t>TTRX</a:t>
+            </a:r>
+            <a:endParaRPr kumimoji="1" lang="ja-JP" altLang="en-US" dirty="0"/>
+          </a:p>
+        </p:txBody>
+      </p:sp>
+      <p:cxnSp>
+        <p:nvCxnSpPr>
+          <p:cNvPr id="30" name="直線コネクタ 29"/>
+          <p:cNvCxnSpPr>
+            <a:stCxn id="11" idx="1"/>
+            <a:endCxn id="7" idx="3"/>
+          </p:cNvCxnSpPr>
+          <p:nvPr/>
+        </p:nvCxnSpPr>
+        <p:spPr>
+          <a:xfrm flipH="1" flipV="1">
+            <a:off x="5545350" y="3817629"/>
+            <a:ext cx="210765" cy="124161"/>
+          </a:xfrm>
+          <a:prstGeom prst="line">
+            <a:avLst/>
+          </a:prstGeom>
+          <a:ln w="38100">
+            <a:solidFill>
+              <a:schemeClr val="tx1"/>
+            </a:solidFill>
+          </a:ln>
+        </p:spPr>
+        <p:style>
+          <a:lnRef idx="1">
+            <a:schemeClr val="accent1"/>
+          </a:lnRef>
+          <a:fillRef idx="0">
+            <a:schemeClr val="accent1"/>
+          </a:fillRef>
+          <a:effectRef idx="0">
+            <a:schemeClr val="accent1"/>
+          </a:effectRef>
+          <a:fontRef idx="minor">
+            <a:schemeClr val="tx1"/>
+          </a:fontRef>
+        </p:style>
+      </p:cxnSp>
+      <p:cxnSp>
+        <p:nvCxnSpPr>
+          <p:cNvPr id="36" name="直線コネクタ 35"/>
+          <p:cNvCxnSpPr>
+            <a:stCxn id="11" idx="1"/>
+            <a:endCxn id="8" idx="3"/>
+          </p:cNvCxnSpPr>
+          <p:nvPr/>
+        </p:nvCxnSpPr>
+        <p:spPr>
+          <a:xfrm flipH="1">
+            <a:off x="5545350" y="3941790"/>
+            <a:ext cx="210765" cy="371152"/>
+          </a:xfrm>
+          <a:prstGeom prst="line">
+            <a:avLst/>
+          </a:prstGeom>
+          <a:ln w="38100">
+            <a:solidFill>
+              <a:schemeClr val="tx1"/>
+            </a:solidFill>
+          </a:ln>
+        </p:spPr>
+        <p:style>
+          <a:lnRef idx="1">
+            <a:schemeClr val="accent1"/>
+          </a:lnRef>
+          <a:fillRef idx="0">
+            <a:schemeClr val="accent1"/>
+          </a:fillRef>
+          <a:effectRef idx="0">
+            <a:schemeClr val="accent1"/>
+          </a:effectRef>
+          <a:fontRef idx="minor">
+            <a:schemeClr val="tx1"/>
+          </a:fontRef>
+        </p:style>
+      </p:cxnSp>
+      <p:cxnSp>
+        <p:nvCxnSpPr>
+          <p:cNvPr id="42" name="直線コネクタ 41"/>
+          <p:cNvCxnSpPr>
+            <a:stCxn id="11" idx="1"/>
+            <a:endCxn id="9" idx="3"/>
+          </p:cNvCxnSpPr>
+          <p:nvPr/>
+        </p:nvCxnSpPr>
+        <p:spPr>
+          <a:xfrm flipH="1">
+            <a:off x="5545350" y="3941790"/>
+            <a:ext cx="210765" cy="849828"/>
+          </a:xfrm>
+          <a:prstGeom prst="line">
+            <a:avLst/>
+          </a:prstGeom>
+          <a:ln w="38100">
+            <a:solidFill>
+              <a:schemeClr val="tx1"/>
+            </a:solidFill>
+          </a:ln>
+        </p:spPr>
+        <p:style>
+          <a:lnRef idx="1">
+            <a:schemeClr val="accent1"/>
+          </a:lnRef>
+          <a:fillRef idx="0">
+            <a:schemeClr val="accent1"/>
+          </a:fillRef>
+          <a:effectRef idx="0">
+            <a:schemeClr val="accent1"/>
+          </a:effectRef>
+          <a:fontRef idx="minor">
+            <a:schemeClr val="tx1"/>
+          </a:fontRef>
+        </p:style>
+      </p:cxnSp>
+      <p:cxnSp>
+        <p:nvCxnSpPr>
+          <p:cNvPr id="43" name="直線コネクタ 42"/>
+          <p:cNvCxnSpPr>
+            <a:stCxn id="11" idx="1"/>
+            <a:endCxn id="10" idx="3"/>
+          </p:cNvCxnSpPr>
+          <p:nvPr/>
+        </p:nvCxnSpPr>
+        <p:spPr>
+          <a:xfrm flipH="1">
+            <a:off x="5528554" y="3941790"/>
+            <a:ext cx="227561" cy="1328504"/>
+          </a:xfrm>
+          <a:prstGeom prst="line">
+            <a:avLst/>
+          </a:prstGeom>
+          <a:ln w="38100">
+            <a:solidFill>
+              <a:schemeClr val="tx1"/>
+            </a:solidFill>
+          </a:ln>
+        </p:spPr>
+        <p:style>
+          <a:lnRef idx="1">
+            <a:schemeClr val="accent1"/>
+          </a:lnRef>
+          <a:fillRef idx="0">
+            <a:schemeClr val="accent1"/>
+          </a:fillRef>
+          <a:effectRef idx="0">
+            <a:schemeClr val="accent1"/>
+          </a:effectRef>
+          <a:fontRef idx="minor">
+            <a:schemeClr val="tx1"/>
+          </a:fontRef>
+        </p:style>
+      </p:cxnSp>
+      <p:cxnSp>
+        <p:nvCxnSpPr>
+          <p:cNvPr id="45" name="直線コネクタ 44"/>
+          <p:cNvCxnSpPr/>
+          <p:nvPr/>
+        </p:nvCxnSpPr>
+        <p:spPr>
+          <a:xfrm flipH="1">
+            <a:off x="3638145" y="5615173"/>
+            <a:ext cx="2229255" cy="32743"/>
+          </a:xfrm>
+          <a:prstGeom prst="line">
+            <a:avLst/>
+          </a:prstGeom>
+          <a:ln w="38100">
+            <a:solidFill>
+              <a:schemeClr val="accent2">
+                <a:lumMod val="75000"/>
+              </a:schemeClr>
+            </a:solidFill>
+          </a:ln>
+        </p:spPr>
+        <p:style>
+          <a:lnRef idx="1">
+            <a:schemeClr val="accent1"/>
+          </a:lnRef>
+          <a:fillRef idx="0">
+            <a:schemeClr val="accent1"/>
+          </a:fillRef>
+          <a:effectRef idx="0">
+            <a:schemeClr val="accent1"/>
+          </a:effectRef>
+          <a:fontRef idx="minor">
+            <a:schemeClr val="tx1"/>
+          </a:fontRef>
+        </p:style>
+      </p:cxnSp>
+      <p:cxnSp>
+        <p:nvCxnSpPr>
+          <p:cNvPr id="49" name="直線コネクタ 48"/>
+          <p:cNvCxnSpPr/>
+          <p:nvPr/>
+        </p:nvCxnSpPr>
+        <p:spPr>
+          <a:xfrm flipV="1">
+            <a:off x="5833106" y="4366704"/>
+            <a:ext cx="34294" cy="1281212"/>
+          </a:xfrm>
+          <a:prstGeom prst="line">
+            <a:avLst/>
+          </a:prstGeom>
+          <a:ln w="38100">
+            <a:solidFill>
+              <a:schemeClr val="accent2">
+                <a:lumMod val="75000"/>
+              </a:schemeClr>
+            </a:solidFill>
+          </a:ln>
+        </p:spPr>
+        <p:style>
+          <a:lnRef idx="1">
+            <a:schemeClr val="accent1"/>
+          </a:lnRef>
+          <a:fillRef idx="0">
+            <a:schemeClr val="accent1"/>
+          </a:fillRef>
+          <a:effectRef idx="0">
+            <a:schemeClr val="accent1"/>
+          </a:effectRef>
+          <a:fontRef idx="minor">
+            <a:schemeClr val="tx1"/>
+          </a:fontRef>
+        </p:style>
+      </p:cxnSp>
+      <p:cxnSp>
+        <p:nvCxnSpPr>
+          <p:cNvPr id="53" name="直線コネクタ 52"/>
+          <p:cNvCxnSpPr/>
+          <p:nvPr/>
+        </p:nvCxnSpPr>
+        <p:spPr>
+          <a:xfrm flipV="1">
+            <a:off x="5891472" y="4366704"/>
+            <a:ext cx="1105127" cy="23233"/>
+          </a:xfrm>
+          <a:prstGeom prst="line">
+            <a:avLst/>
+          </a:prstGeom>
+          <a:ln w="38100">
+            <a:solidFill>
+              <a:schemeClr val="accent2">
+                <a:lumMod val="75000"/>
+              </a:schemeClr>
+            </a:solidFill>
+          </a:ln>
+        </p:spPr>
+        <p:style>
+          <a:lnRef idx="1">
+            <a:schemeClr val="accent1"/>
+          </a:lnRef>
+          <a:fillRef idx="0">
+            <a:schemeClr val="accent1"/>
+          </a:fillRef>
+          <a:effectRef idx="0">
+            <a:schemeClr val="accent1"/>
+          </a:effectRef>
+          <a:fontRef idx="minor">
+            <a:schemeClr val="tx1"/>
+          </a:fontRef>
+        </p:style>
+      </p:cxnSp>
+      <p:cxnSp>
+        <p:nvCxnSpPr>
+          <p:cNvPr id="56" name="直線コネクタ 55"/>
+          <p:cNvCxnSpPr/>
+          <p:nvPr/>
+        </p:nvCxnSpPr>
+        <p:spPr>
+          <a:xfrm flipV="1">
+            <a:off x="6975404" y="3948894"/>
+            <a:ext cx="21195" cy="415415"/>
+          </a:xfrm>
+          <a:prstGeom prst="line">
+            <a:avLst/>
+          </a:prstGeom>
+          <a:ln w="38100">
+            <a:solidFill>
+              <a:schemeClr val="accent2">
+                <a:lumMod val="75000"/>
+              </a:schemeClr>
+            </a:solidFill>
+          </a:ln>
+        </p:spPr>
+        <p:style>
+          <a:lnRef idx="1">
+            <a:schemeClr val="accent1"/>
+          </a:lnRef>
+          <a:fillRef idx="0">
+            <a:schemeClr val="accent1"/>
+          </a:fillRef>
+          <a:effectRef idx="0">
+            <a:schemeClr val="accent1"/>
+          </a:effectRef>
+          <a:fontRef idx="minor">
+            <a:schemeClr val="tx1"/>
+          </a:fontRef>
+        </p:style>
+      </p:cxnSp>
+    </p:spTree>
+    <p:extLst>
+      <p:ext uri="{BB962C8B-B14F-4D97-AF65-F5344CB8AC3E}">
+        <p14:creationId xmlns:p14="http://schemas.microsoft.com/office/powerpoint/2010/main" val="2584151492"/>
+      </p:ext>
+    </p:extLst>
+  </p:cSld>
+  <p:clrMapOvr>
+    <a:masterClrMapping/>
+  </p:clrMapOvr>
+  <p:timing>
+    <p:tnLst>
+      <p:par>
+        <p:cTn id="1" dur="indefinite" restart="never" nodeType="tmRoot"/>
+      </p:par>
+    </p:tnLst>
+  </p:timing>
+</p:sld>
+</file>
+
+<file path=ppt/slides/slide20.xml><?xml version="1.0" encoding="utf-8"?>
+<p:sld xmlns:a="http://schemas.openxmlformats.org/drawingml/2006/main" xmlns:r="http://schemas.openxmlformats.org/officeDocument/2006/relationships" xmlns:p="http://schemas.openxmlformats.org/presentationml/2006/main">
+  <p:cSld>
+    <p:spTree>
+      <p:nvGrpSpPr>
+        <p:cNvPr id="1" name=""/>
+        <p:cNvGrpSpPr/>
+        <p:nvPr/>
+      </p:nvGrpSpPr>
+      <p:grpSpPr>
+        <a:xfrm>
+          <a:off x="0" y="0"/>
+          <a:ext cx="0" cy="0"/>
+          <a:chOff x="0" y="0"/>
+          <a:chExt cx="0" cy="0"/>
+        </a:xfrm>
+      </p:grpSpPr>
+      <p:sp>
+        <p:nvSpPr>
+          <p:cNvPr id="4" name="タイトル 1"/>
+          <p:cNvSpPr txBox="1">
+            <a:spLocks/>
+          </p:cNvSpPr>
+          <p:nvPr/>
+        </p:nvSpPr>
+        <p:spPr>
+          <a:xfrm>
+            <a:off x="217053" y="144378"/>
+            <a:ext cx="10515600" cy="918928"/>
+          </a:xfrm>
+          <a:prstGeom prst="rect">
+            <a:avLst/>
+          </a:prstGeom>
+        </p:spPr>
+        <p:txBody>
+          <a:bodyPr vert="horz" lIns="91440" tIns="45720" rIns="91440" bIns="45720" rtlCol="0" anchor="ctr">
+            <a:normAutofit/>
+          </a:bodyPr>
+          <a:lstStyle>
+            <a:lvl1pPr algn="l" defTabSz="914400" rtl="0" eaLnBrk="1" latinLnBrk="0" hangingPunct="1">
+              <a:lnSpc>
+                <a:spcPct val="90000"/>
+              </a:lnSpc>
+              <a:spcBef>
+                <a:spcPct val="0"/>
+              </a:spcBef>
+              <a:buNone/>
+              <a:defRPr kumimoji="1" sz="4400" kern="1200">
+                <a:solidFill>
+                  <a:schemeClr val="tx1"/>
+                </a:solidFill>
+                <a:latin typeface="+mj-lt"/>
+                <a:ea typeface="+mj-ea"/>
+                <a:cs typeface="+mj-cs"/>
+              </a:defRPr>
+            </a:lvl1pPr>
+          </a:lstStyle>
+          <a:p>
+            <a:r>
+              <a:rPr lang="en-US" altLang="ja-JP" sz="3600" u="sng" dirty="0" smtClean="0"/>
+              <a:t>A-3, Use </a:t>
+            </a:r>
+            <a:r>
+              <a:rPr lang="en-US" altLang="ja-JP" sz="3600" u="sng" dirty="0" err="1" smtClean="0"/>
+              <a:t>ntpd</a:t>
+            </a:r>
+            <a:r>
+              <a:rPr lang="en-US" altLang="ja-JP" sz="3600" u="sng" dirty="0" smtClean="0"/>
+              <a:t> to adjust time on COPPER</a:t>
+            </a:r>
+            <a:endParaRPr lang="ja-JP" altLang="en-US" sz="3600" u="sng" dirty="0"/>
+          </a:p>
+        </p:txBody>
+      </p:sp>
+      <p:sp>
+        <p:nvSpPr>
+          <p:cNvPr id="5" name="テキスト ボックス 4"/>
+          <p:cNvSpPr txBox="1"/>
+          <p:nvPr/>
+        </p:nvSpPr>
+        <p:spPr>
+          <a:xfrm>
+            <a:off x="733926" y="1063306"/>
+            <a:ext cx="4852932" cy="3693319"/>
+          </a:xfrm>
+          <a:prstGeom prst="rect">
+            <a:avLst/>
+          </a:prstGeom>
+          <a:noFill/>
+        </p:spPr>
+        <p:txBody>
+          <a:bodyPr wrap="none" rtlCol="0">
+            <a:spAutoFit/>
+          </a:bodyPr>
+          <a:lstStyle/>
+          <a:p>
+            <a:r>
+              <a:rPr lang="en-US" altLang="ja-JP" dirty="0" smtClean="0"/>
+              <a:t>1, Edit </a:t>
+            </a:r>
+            <a:r>
+              <a:rPr lang="en-US" altLang="ja-JP" dirty="0"/>
+              <a:t>/</a:t>
+            </a:r>
+            <a:r>
+              <a:rPr lang="en-US" altLang="ja-JP" dirty="0" err="1" smtClean="0"/>
+              <a:t>tftpboot</a:t>
+            </a:r>
+            <a:r>
+              <a:rPr lang="en-US" altLang="ja-JP" dirty="0" smtClean="0"/>
+              <a:t>/copper/root/</a:t>
+            </a:r>
+            <a:r>
+              <a:rPr lang="en-US" altLang="ja-JP" dirty="0" err="1" smtClean="0"/>
+              <a:t>etc</a:t>
+            </a:r>
+            <a:r>
+              <a:rPr lang="en-US" altLang="ja-JP" dirty="0" smtClean="0"/>
+              <a:t>/</a:t>
+            </a:r>
+            <a:r>
+              <a:rPr lang="en-US" altLang="ja-JP" dirty="0" err="1" smtClean="0"/>
+              <a:t>rc.d</a:t>
+            </a:r>
+            <a:r>
+              <a:rPr lang="en-US" altLang="ja-JP" dirty="0" smtClean="0"/>
+              <a:t>/</a:t>
+            </a:r>
+            <a:r>
+              <a:rPr lang="en-US" altLang="ja-JP" dirty="0" err="1" smtClean="0"/>
+              <a:t>init.d</a:t>
+            </a:r>
+            <a:r>
+              <a:rPr lang="en-US" altLang="ja-JP" dirty="0" smtClean="0"/>
+              <a:t>/</a:t>
+            </a:r>
+            <a:r>
+              <a:rPr lang="en-US" altLang="ja-JP" dirty="0" err="1" smtClean="0"/>
+              <a:t>ntpd</a:t>
+            </a:r>
+            <a:endParaRPr lang="en-US" altLang="ja-JP" dirty="0" smtClean="0"/>
+          </a:p>
+          <a:p>
+            <a:endParaRPr lang="en-US" altLang="ja-JP" dirty="0" smtClean="0"/>
+          </a:p>
+          <a:p>
+            <a:r>
+              <a:rPr lang="en-US" altLang="ja-JP" dirty="0"/>
+              <a:t># Source networking configuration.</a:t>
+            </a:r>
+          </a:p>
+          <a:p>
+            <a:r>
+              <a:rPr lang="en-US" altLang="ja-JP" dirty="0"/>
+              <a:t>. /</a:t>
+            </a:r>
+            <a:r>
+              <a:rPr lang="en-US" altLang="ja-JP" dirty="0" err="1"/>
+              <a:t>etc</a:t>
+            </a:r>
+            <a:r>
+              <a:rPr lang="en-US" altLang="ja-JP" dirty="0"/>
+              <a:t>/</a:t>
+            </a:r>
+            <a:r>
+              <a:rPr lang="en-US" altLang="ja-JP" dirty="0" err="1"/>
+              <a:t>sysconfig</a:t>
+            </a:r>
+            <a:r>
+              <a:rPr lang="en-US" altLang="ja-JP" dirty="0"/>
+              <a:t>/network</a:t>
+            </a:r>
+          </a:p>
+          <a:p>
+            <a:endParaRPr lang="en-US" altLang="ja-JP" dirty="0"/>
+          </a:p>
+          <a:p>
+            <a:r>
+              <a:rPr lang="en-US" altLang="ja-JP" dirty="0" err="1">
+                <a:solidFill>
+                  <a:srgbClr val="FF0000"/>
+                </a:solidFill>
+              </a:rPr>
+              <a:t>ntpdate</a:t>
+            </a:r>
+            <a:r>
+              <a:rPr lang="en-US" altLang="ja-JP" dirty="0">
+                <a:solidFill>
+                  <a:srgbClr val="FF0000"/>
+                </a:solidFill>
+              </a:rPr>
+              <a:t> 192.168.10.1</a:t>
+            </a:r>
+          </a:p>
+          <a:p>
+            <a:endParaRPr lang="en-US" altLang="ja-JP" dirty="0"/>
+          </a:p>
+          <a:p>
+            <a:r>
+              <a:rPr lang="en-US" altLang="ja-JP" dirty="0"/>
+              <a:t>if [ -f /</a:t>
+            </a:r>
+            <a:r>
+              <a:rPr lang="en-US" altLang="ja-JP" dirty="0" err="1"/>
+              <a:t>etc</a:t>
+            </a:r>
+            <a:r>
+              <a:rPr lang="en-US" altLang="ja-JP" dirty="0"/>
+              <a:t>/</a:t>
+            </a:r>
+            <a:r>
+              <a:rPr lang="en-US" altLang="ja-JP" dirty="0" err="1"/>
+              <a:t>sysconfig</a:t>
+            </a:r>
+            <a:r>
+              <a:rPr lang="en-US" altLang="ja-JP" dirty="0"/>
+              <a:t>/</a:t>
+            </a:r>
+            <a:r>
+              <a:rPr lang="en-US" altLang="ja-JP" dirty="0" err="1"/>
+              <a:t>ntpd</a:t>
+            </a:r>
+            <a:r>
+              <a:rPr lang="en-US" altLang="ja-JP" dirty="0"/>
+              <a:t> ];then</a:t>
+            </a:r>
+          </a:p>
+          <a:p>
+            <a:r>
+              <a:rPr lang="en-US" altLang="ja-JP" dirty="0"/>
+              <a:t>        . /</a:t>
+            </a:r>
+            <a:r>
+              <a:rPr lang="en-US" altLang="ja-JP" dirty="0" err="1"/>
+              <a:t>etc</a:t>
+            </a:r>
+            <a:r>
+              <a:rPr lang="en-US" altLang="ja-JP" dirty="0"/>
+              <a:t>/</a:t>
+            </a:r>
+            <a:r>
+              <a:rPr lang="en-US" altLang="ja-JP" dirty="0" err="1"/>
+              <a:t>sysconfig</a:t>
+            </a:r>
+            <a:r>
+              <a:rPr lang="en-US" altLang="ja-JP" dirty="0"/>
+              <a:t>/</a:t>
+            </a:r>
+            <a:r>
+              <a:rPr lang="en-US" altLang="ja-JP" dirty="0" err="1"/>
+              <a:t>ntpd</a:t>
+            </a:r>
+            <a:endParaRPr lang="en-US" altLang="ja-JP" dirty="0"/>
+          </a:p>
+          <a:p>
+            <a:r>
+              <a:rPr lang="en-US" altLang="ja-JP" dirty="0"/>
+              <a:t>fi</a:t>
+            </a:r>
+          </a:p>
+          <a:p>
+            <a:endParaRPr kumimoji="1" lang="en-US" altLang="ja-JP" dirty="0" smtClean="0"/>
+          </a:p>
+          <a:p>
+            <a:r>
+              <a:rPr lang="en-US" altLang="ja-JP" dirty="0" smtClean="0"/>
+              <a:t>2, check </a:t>
+            </a:r>
+            <a:r>
+              <a:rPr lang="en-US" altLang="ja-JP" dirty="0" err="1" smtClean="0"/>
+              <a:t>ntpd</a:t>
+            </a:r>
+            <a:r>
+              <a:rPr lang="en-US" altLang="ja-JP" dirty="0" smtClean="0"/>
+              <a:t> is started at boot time</a:t>
+            </a:r>
+          </a:p>
+          <a:p>
+            <a:r>
+              <a:rPr lang="en-US" altLang="ja-JP" dirty="0" err="1" smtClean="0"/>
+              <a:t>cpr</a:t>
+            </a:r>
+            <a:r>
+              <a:rPr lang="en-US" altLang="ja-JP" dirty="0" smtClean="0"/>
+              <a:t>**** $ </a:t>
+            </a:r>
+            <a:r>
+              <a:rPr lang="en-US" altLang="ja-JP" dirty="0" err="1" smtClean="0"/>
+              <a:t>chkconfig</a:t>
+            </a:r>
+            <a:r>
+              <a:rPr lang="en-US" altLang="ja-JP" dirty="0" smtClean="0"/>
+              <a:t> –list | </a:t>
+            </a:r>
+            <a:r>
+              <a:rPr lang="en-US" altLang="ja-JP" dirty="0" err="1" smtClean="0"/>
+              <a:t>grep</a:t>
+            </a:r>
+            <a:r>
+              <a:rPr lang="en-US" altLang="ja-JP" dirty="0" smtClean="0"/>
+              <a:t> </a:t>
+            </a:r>
+            <a:r>
+              <a:rPr lang="en-US" altLang="ja-JP" dirty="0" err="1" smtClean="0"/>
+              <a:t>ntp</a:t>
+            </a:r>
+            <a:endParaRPr kumimoji="1" lang="ja-JP" altLang="en-US" dirty="0"/>
+          </a:p>
+        </p:txBody>
+      </p:sp>
+    </p:spTree>
+    <p:extLst>
+      <p:ext uri="{BB962C8B-B14F-4D97-AF65-F5344CB8AC3E}">
+        <p14:creationId xmlns:p14="http://schemas.microsoft.com/office/powerpoint/2010/main" val="1942385635"/>
+      </p:ext>
+    </p:extLst>
+  </p:cSld>
+  <p:clrMapOvr>
+    <a:masterClrMapping/>
+  </p:clrMapOvr>
+</p:sld>
+</file>
+
+<file path=ppt/slides/slide21.xml><?xml version="1.0" encoding="utf-8"?>
+<p:sld xmlns:a="http://schemas.openxmlformats.org/drawingml/2006/main" xmlns:r="http://schemas.openxmlformats.org/officeDocument/2006/relationships" xmlns:p="http://schemas.openxmlformats.org/presentationml/2006/main">
+  <p:cSld>
+    <p:spTree>
+      <p:nvGrpSpPr>
+        <p:cNvPr id="1" name=""/>
+        <p:cNvGrpSpPr/>
+        <p:nvPr/>
+      </p:nvGrpSpPr>
+      <p:grpSpPr>
+        <a:xfrm>
+          <a:off x="0" y="0"/>
+          <a:ext cx="0" cy="0"/>
+          <a:chOff x="0" y="0"/>
+          <a:chExt cx="0" cy="0"/>
+        </a:xfrm>
+      </p:grpSpPr>
+      <p:sp>
+        <p:nvSpPr>
+          <p:cNvPr id="2" name="タイトル 1"/>
+          <p:cNvSpPr>
+            <a:spLocks noGrp="1"/>
+          </p:cNvSpPr>
+          <p:nvPr>
+            <p:ph type="title"/>
+          </p:nvPr>
+        </p:nvSpPr>
+        <p:spPr>
+          <a:xfrm>
+            <a:off x="0" y="0"/>
+            <a:ext cx="10515600" cy="721895"/>
+          </a:xfrm>
+        </p:spPr>
+        <p:txBody>
+          <a:bodyPr>
+            <a:normAutofit/>
+          </a:bodyPr>
+          <a:lstStyle/>
+          <a:p>
+            <a:r>
+              <a:rPr lang="en-US" altLang="ja-JP" sz="3600" u="sng" dirty="0" smtClean="0"/>
+              <a:t>A-4, </a:t>
+            </a:r>
+            <a:r>
+              <a:rPr lang="en-US" altLang="ja-JP" sz="3600" u="sng" dirty="0" err="1" smtClean="0"/>
+              <a:t>syslogd</a:t>
+            </a:r>
+            <a:endParaRPr kumimoji="1" lang="ja-JP" altLang="en-US" sz="3600" u="sng" dirty="0"/>
+          </a:p>
+        </p:txBody>
+      </p:sp>
+      <p:sp>
+        <p:nvSpPr>
+          <p:cNvPr id="3" name="コンテンツ プレースホルダー 2"/>
+          <p:cNvSpPr>
+            <a:spLocks noGrp="1"/>
+          </p:cNvSpPr>
+          <p:nvPr>
+            <p:ph idx="1"/>
+          </p:nvPr>
+        </p:nvSpPr>
+        <p:spPr>
+          <a:xfrm>
+            <a:off x="717885" y="1325563"/>
+            <a:ext cx="10515600" cy="4351338"/>
+          </a:xfrm>
+        </p:spPr>
+        <p:txBody>
+          <a:bodyPr/>
+          <a:lstStyle/>
+          <a:p>
+            <a:pPr marL="0" indent="0">
+              <a:buNone/>
+            </a:pPr>
+            <a:r>
+              <a:rPr kumimoji="1" lang="en-US" altLang="ja-JP" dirty="0" smtClean="0"/>
+              <a:t>Instal</a:t>
+            </a:r>
+            <a:r>
+              <a:rPr lang="en-US" altLang="ja-JP" dirty="0" smtClean="0"/>
+              <a:t>l </a:t>
+            </a:r>
+            <a:r>
+              <a:rPr lang="en-US" altLang="ja-JP" dirty="0" err="1" smtClean="0"/>
+              <a:t>syslogd</a:t>
+            </a:r>
+            <a:r>
+              <a:rPr lang="en-US" altLang="ja-JP" dirty="0" smtClean="0"/>
+              <a:t> :</a:t>
+            </a:r>
+          </a:p>
+          <a:p>
+            <a:pPr marL="0" indent="0">
+              <a:buNone/>
+            </a:pPr>
+            <a:r>
+              <a:rPr lang="en-US" altLang="ja-JP" dirty="0" smtClean="0"/>
+              <a:t> </a:t>
+            </a:r>
+            <a:r>
+              <a:rPr lang="en-US" altLang="ja-JP" dirty="0" err="1" smtClean="0"/>
+              <a:t>readoutPC</a:t>
+            </a:r>
+            <a:r>
+              <a:rPr lang="en-US" altLang="ja-JP" dirty="0" smtClean="0"/>
+              <a:t> </a:t>
+            </a:r>
+            <a:r>
+              <a:rPr lang="en-US" altLang="ja-JP" dirty="0"/>
+              <a:t># yum install </a:t>
+            </a:r>
+            <a:r>
+              <a:rPr lang="en-US" altLang="ja-JP" dirty="0" err="1" smtClean="0"/>
+              <a:t>syslogd</a:t>
+            </a:r>
+            <a:r>
+              <a:rPr lang="en-US" altLang="ja-JP" dirty="0" smtClean="0"/>
+              <a:t> --</a:t>
+            </a:r>
+            <a:r>
+              <a:rPr lang="en-US" altLang="ja-JP" dirty="0" err="1"/>
+              <a:t>installroot</a:t>
+            </a:r>
+            <a:r>
+              <a:rPr lang="en-US" altLang="ja-JP" dirty="0"/>
+              <a:t>=/</a:t>
+            </a:r>
+            <a:r>
+              <a:rPr lang="en-US" altLang="ja-JP" dirty="0" err="1" smtClean="0"/>
+              <a:t>tftpboot</a:t>
+            </a:r>
+            <a:r>
+              <a:rPr lang="en-US" altLang="ja-JP" dirty="0" smtClean="0"/>
+              <a:t>/copper/root</a:t>
+            </a:r>
+          </a:p>
+          <a:p>
+            <a:pPr marL="0" indent="0">
+              <a:buNone/>
+            </a:pPr>
+            <a:endParaRPr lang="en-US" altLang="ja-JP" dirty="0"/>
+          </a:p>
+          <a:p>
+            <a:pPr marL="0" indent="0">
+              <a:buNone/>
+            </a:pPr>
+            <a:r>
+              <a:rPr lang="en-US" altLang="ja-JP" dirty="0" smtClean="0"/>
+              <a:t>Add entry to /</a:t>
+            </a:r>
+            <a:r>
+              <a:rPr lang="en-US" altLang="ja-JP" dirty="0" err="1" smtClean="0"/>
+              <a:t>tftpboot</a:t>
+            </a:r>
+            <a:r>
+              <a:rPr lang="en-US" altLang="ja-JP" dirty="0" smtClean="0"/>
+              <a:t>/copper/root/</a:t>
+            </a:r>
+            <a:r>
+              <a:rPr lang="en-US" altLang="ja-JP" dirty="0" err="1" smtClean="0"/>
+              <a:t>etc</a:t>
+            </a:r>
+            <a:r>
+              <a:rPr lang="en-US" altLang="ja-JP" dirty="0" smtClean="0"/>
+              <a:t>/</a:t>
+            </a:r>
+            <a:r>
+              <a:rPr lang="en-US" altLang="ja-JP" dirty="0" err="1" smtClean="0"/>
+              <a:t>syslogd.conf</a:t>
+            </a:r>
+            <a:r>
+              <a:rPr lang="en-US" altLang="ja-JP" dirty="0" smtClean="0"/>
+              <a:t> if needed:</a:t>
+            </a:r>
+          </a:p>
+          <a:p>
+            <a:pPr marL="0" indent="0">
+              <a:buNone/>
+            </a:pPr>
+            <a:r>
+              <a:rPr lang="en-US" altLang="ja-JP" sz="1600" dirty="0"/>
+              <a:t># Log anything (except mail) of level info or higher.</a:t>
+            </a:r>
+          </a:p>
+          <a:p>
+            <a:pPr marL="0" indent="0">
+              <a:buNone/>
+            </a:pPr>
+            <a:r>
+              <a:rPr lang="en-US" altLang="ja-JP" sz="1600" dirty="0"/>
+              <a:t># Don't log private authentication messages!</a:t>
+            </a:r>
+          </a:p>
+          <a:p>
+            <a:pPr marL="0" indent="0">
+              <a:buNone/>
+            </a:pPr>
+            <a:r>
+              <a:rPr lang="en-US" altLang="ja-JP" sz="1600" dirty="0"/>
+              <a:t>*.</a:t>
+            </a:r>
+            <a:r>
+              <a:rPr lang="en-US" altLang="ja-JP" sz="1600" dirty="0" err="1"/>
+              <a:t>info;mail.none;news.none;authpriv.none;cron.none</a:t>
+            </a:r>
+            <a:r>
+              <a:rPr lang="en-US" altLang="ja-JP" sz="1600" dirty="0"/>
+              <a:t>              /</a:t>
+            </a:r>
+            <a:r>
+              <a:rPr lang="en-US" altLang="ja-JP" sz="1600" dirty="0" err="1"/>
+              <a:t>var</a:t>
+            </a:r>
+            <a:r>
+              <a:rPr lang="en-US" altLang="ja-JP" sz="1600" dirty="0"/>
+              <a:t>/log/messages</a:t>
+            </a:r>
+          </a:p>
+          <a:p>
+            <a:pPr marL="0" indent="0">
+              <a:buNone/>
+            </a:pPr>
+            <a:endParaRPr lang="en-US" altLang="ja-JP" dirty="0"/>
+          </a:p>
+          <a:p>
+            <a:pPr marL="0" indent="0">
+              <a:buNone/>
+            </a:pPr>
+            <a:endParaRPr lang="en-US" altLang="ja-JP" dirty="0" smtClean="0"/>
+          </a:p>
+          <a:p>
+            <a:pPr marL="0" indent="0">
+              <a:buNone/>
+            </a:pPr>
+            <a:endParaRPr kumimoji="1" lang="ja-JP" altLang="en-US" dirty="0"/>
+          </a:p>
+        </p:txBody>
+      </p:sp>
+    </p:spTree>
+    <p:extLst>
+      <p:ext uri="{BB962C8B-B14F-4D97-AF65-F5344CB8AC3E}">
+        <p14:creationId xmlns:p14="http://schemas.microsoft.com/office/powerpoint/2010/main" val="1011948530"/>
+      </p:ext>
+    </p:extLst>
+  </p:cSld>
+  <p:clrMapOvr>
+    <a:masterClrMapping/>
+  </p:clrMapOvr>
+</p:sld>
+</file>
+
+<file path=ppt/slides/slide22.xml><?xml version="1.0" encoding="utf-8"?>
 <p:sld xmlns:a="http://schemas.openxmlformats.org/drawingml/2006/main" xmlns:r="http://schemas.openxmlformats.org/officeDocument/2006/relationships" xmlns:p="http://schemas.openxmlformats.org/presentationml/2006/main">
   <p:cSld>
     <p:spTree>
@@ -6749,7 +9293,7 @@
         <p:spPr>
           <a:xfrm>
             <a:off x="256685" y="145654"/>
-            <a:ext cx="4363117" cy="584775"/>
+            <a:ext cx="5114926" cy="584775"/>
           </a:xfrm>
           <a:prstGeom prst="rect">
             <a:avLst/>
@@ -6764,7 +9308,11 @@
           <a:p>
             <a:r>
               <a:rPr kumimoji="1" lang="en-US" altLang="ja-JP" sz="3200" u="sng" dirty="0" smtClean="0"/>
-              <a:t>Test bench at Tsukuba B3</a:t>
+              <a:t>B-1, Test </a:t>
+            </a:r>
+            <a:r>
+              <a:rPr kumimoji="1" lang="en-US" altLang="ja-JP" sz="3200" u="sng" dirty="0" smtClean="0"/>
+              <a:t>bench at Tsukuba B3</a:t>
             </a:r>
             <a:endParaRPr kumimoji="1" lang="ja-JP" altLang="en-US" sz="3200" u="sng" dirty="0"/>
           </a:p>
@@ -6780,1365 +9328,6 @@
   <p:clrMapOvr>
     <a:masterClrMapping/>
   </p:clrMapOvr>
-</p:sld>
-</file>
-
-<file path=ppt/slides/slide2.xml><?xml version="1.0" encoding="utf-8"?>
-<p:sld xmlns:a="http://schemas.openxmlformats.org/drawingml/2006/main" xmlns:r="http://schemas.openxmlformats.org/officeDocument/2006/relationships" xmlns:p="http://schemas.openxmlformats.org/presentationml/2006/main">
-  <p:cSld>
-    <p:spTree>
-      <p:nvGrpSpPr>
-        <p:cNvPr id="1" name=""/>
-        <p:cNvGrpSpPr/>
-        <p:nvPr/>
-      </p:nvGrpSpPr>
-      <p:grpSpPr>
-        <a:xfrm>
-          <a:off x="0" y="0"/>
-          <a:ext cx="0" cy="0"/>
-          <a:chOff x="0" y="0"/>
-          <a:chExt cx="0" cy="0"/>
-        </a:xfrm>
-      </p:grpSpPr>
-      <p:sp>
-        <p:nvSpPr>
-          <p:cNvPr id="5" name="正方形/長方形 4"/>
-          <p:cNvSpPr/>
-          <p:nvPr/>
-        </p:nvSpPr>
-        <p:spPr>
-          <a:xfrm>
-            <a:off x="3638144" y="3540869"/>
-            <a:ext cx="3492230" cy="2305455"/>
-          </a:xfrm>
-          <a:prstGeom prst="rect">
-            <a:avLst/>
-          </a:prstGeom>
-        </p:spPr>
-        <p:style>
-          <a:lnRef idx="2">
-            <a:schemeClr val="accent1">
-              <a:shade val="50000"/>
-            </a:schemeClr>
-          </a:lnRef>
-          <a:fillRef idx="1">
-            <a:schemeClr val="accent1"/>
-          </a:fillRef>
-          <a:effectRef idx="0">
-            <a:schemeClr val="accent1"/>
-          </a:effectRef>
-          <a:fontRef idx="minor">
-            <a:schemeClr val="lt1"/>
-          </a:fontRef>
-        </p:style>
-        <p:txBody>
-          <a:bodyPr rtlCol="0" anchor="ctr"/>
-          <a:lstStyle/>
-          <a:p>
-            <a:pPr algn="ctr"/>
-            <a:endParaRPr kumimoji="1" lang="ja-JP" altLang="en-US" dirty="0"/>
-          </a:p>
-        </p:txBody>
-      </p:sp>
-      <p:sp>
-        <p:nvSpPr>
-          <p:cNvPr id="6" name="テキスト ボックス 5"/>
-          <p:cNvSpPr txBox="1"/>
-          <p:nvPr/>
-        </p:nvSpPr>
-        <p:spPr>
-          <a:xfrm>
-            <a:off x="3696511" y="3200401"/>
-            <a:ext cx="932819" cy="369332"/>
-          </a:xfrm>
-          <a:prstGeom prst="rect">
-            <a:avLst/>
-          </a:prstGeom>
-          <a:noFill/>
-        </p:spPr>
-        <p:txBody>
-          <a:bodyPr wrap="none" rtlCol="0">
-            <a:spAutoFit/>
-          </a:bodyPr>
-          <a:lstStyle/>
-          <a:p>
-            <a:r>
-              <a:rPr kumimoji="1" lang="en-US" altLang="ja-JP" dirty="0" smtClean="0"/>
-              <a:t>COPPER</a:t>
-            </a:r>
-            <a:endParaRPr kumimoji="1" lang="ja-JP" altLang="en-US" dirty="0"/>
-          </a:p>
-        </p:txBody>
-      </p:sp>
-      <p:sp>
-        <p:nvSpPr>
-          <p:cNvPr id="7" name="正方形/長方形 6"/>
-          <p:cNvSpPr/>
-          <p:nvPr/>
-        </p:nvSpPr>
-        <p:spPr>
-          <a:xfrm>
-            <a:off x="3713307" y="3600298"/>
-            <a:ext cx="1832043" cy="434661"/>
-          </a:xfrm>
-          <a:prstGeom prst="rect">
-            <a:avLst/>
-          </a:prstGeom>
-          <a:solidFill>
-            <a:srgbClr val="92D050"/>
-          </a:solidFill>
-        </p:spPr>
-        <p:style>
-          <a:lnRef idx="2">
-            <a:schemeClr val="accent1">
-              <a:shade val="50000"/>
-            </a:schemeClr>
-          </a:lnRef>
-          <a:fillRef idx="1">
-            <a:schemeClr val="accent1"/>
-          </a:fillRef>
-          <a:effectRef idx="0">
-            <a:schemeClr val="accent1"/>
-          </a:effectRef>
-          <a:fontRef idx="minor">
-            <a:schemeClr val="lt1"/>
-          </a:fontRef>
-        </p:style>
-        <p:txBody>
-          <a:bodyPr rtlCol="0" anchor="ctr"/>
-          <a:lstStyle/>
-          <a:p>
-            <a:pPr algn="ctr"/>
-            <a:r>
-              <a:rPr lang="en-US" altLang="ja-JP" dirty="0" smtClean="0"/>
-              <a:t>HSLB</a:t>
-            </a:r>
-            <a:endParaRPr kumimoji="1" lang="ja-JP" altLang="en-US" dirty="0"/>
-          </a:p>
-        </p:txBody>
-      </p:sp>
-      <p:sp>
-        <p:nvSpPr>
-          <p:cNvPr id="8" name="正方形/長方形 7"/>
-          <p:cNvSpPr/>
-          <p:nvPr/>
-        </p:nvSpPr>
-        <p:spPr>
-          <a:xfrm>
-            <a:off x="3713307" y="4112249"/>
-            <a:ext cx="1832043" cy="401386"/>
-          </a:xfrm>
-          <a:prstGeom prst="rect">
-            <a:avLst/>
-          </a:prstGeom>
-          <a:solidFill>
-            <a:srgbClr val="92D050"/>
-          </a:solidFill>
-        </p:spPr>
-        <p:style>
-          <a:lnRef idx="2">
-            <a:schemeClr val="accent1">
-              <a:shade val="50000"/>
-            </a:schemeClr>
-          </a:lnRef>
-          <a:fillRef idx="1">
-            <a:schemeClr val="accent1"/>
-          </a:fillRef>
-          <a:effectRef idx="0">
-            <a:schemeClr val="accent1"/>
-          </a:effectRef>
-          <a:fontRef idx="minor">
-            <a:schemeClr val="lt1"/>
-          </a:fontRef>
-        </p:style>
-        <p:txBody>
-          <a:bodyPr rtlCol="0" anchor="ctr"/>
-          <a:lstStyle/>
-          <a:p>
-            <a:pPr algn="ctr"/>
-            <a:r>
-              <a:rPr lang="en-US" altLang="ja-JP" dirty="0" smtClean="0"/>
-              <a:t>HSLB</a:t>
-            </a:r>
-            <a:endParaRPr kumimoji="1" lang="ja-JP" altLang="en-US" dirty="0"/>
-          </a:p>
-        </p:txBody>
-      </p:sp>
-      <p:sp>
-        <p:nvSpPr>
-          <p:cNvPr id="9" name="正方形/長方形 8"/>
-          <p:cNvSpPr/>
-          <p:nvPr/>
-        </p:nvSpPr>
-        <p:spPr>
-          <a:xfrm>
-            <a:off x="3713307" y="4590925"/>
-            <a:ext cx="1832043" cy="401386"/>
-          </a:xfrm>
-          <a:prstGeom prst="rect">
-            <a:avLst/>
-          </a:prstGeom>
-          <a:solidFill>
-            <a:srgbClr val="92D050"/>
-          </a:solidFill>
-        </p:spPr>
-        <p:style>
-          <a:lnRef idx="2">
-            <a:schemeClr val="accent1">
-              <a:shade val="50000"/>
-            </a:schemeClr>
-          </a:lnRef>
-          <a:fillRef idx="1">
-            <a:schemeClr val="accent1"/>
-          </a:fillRef>
-          <a:effectRef idx="0">
-            <a:schemeClr val="accent1"/>
-          </a:effectRef>
-          <a:fontRef idx="minor">
-            <a:schemeClr val="lt1"/>
-          </a:fontRef>
-        </p:style>
-        <p:txBody>
-          <a:bodyPr rtlCol="0" anchor="ctr"/>
-          <a:lstStyle/>
-          <a:p>
-            <a:pPr algn="ctr"/>
-            <a:r>
-              <a:rPr lang="en-US" altLang="ja-JP" dirty="0" smtClean="0"/>
-              <a:t>HSLB</a:t>
-            </a:r>
-            <a:endParaRPr kumimoji="1" lang="ja-JP" altLang="en-US" dirty="0"/>
-          </a:p>
-        </p:txBody>
-      </p:sp>
-      <p:sp>
-        <p:nvSpPr>
-          <p:cNvPr id="10" name="正方形/長方形 9"/>
-          <p:cNvSpPr/>
-          <p:nvPr/>
-        </p:nvSpPr>
-        <p:spPr>
-          <a:xfrm>
-            <a:off x="3696511" y="5069601"/>
-            <a:ext cx="1832043" cy="401386"/>
-          </a:xfrm>
-          <a:prstGeom prst="rect">
-            <a:avLst/>
-          </a:prstGeom>
-          <a:solidFill>
-            <a:srgbClr val="92D050"/>
-          </a:solidFill>
-        </p:spPr>
-        <p:style>
-          <a:lnRef idx="2">
-            <a:schemeClr val="accent1">
-              <a:shade val="50000"/>
-            </a:schemeClr>
-          </a:lnRef>
-          <a:fillRef idx="1">
-            <a:schemeClr val="accent1"/>
-          </a:fillRef>
-          <a:effectRef idx="0">
-            <a:schemeClr val="accent1"/>
-          </a:effectRef>
-          <a:fontRef idx="minor">
-            <a:schemeClr val="lt1"/>
-          </a:fontRef>
-        </p:style>
-        <p:txBody>
-          <a:bodyPr rtlCol="0" anchor="ctr"/>
-          <a:lstStyle/>
-          <a:p>
-            <a:pPr algn="ctr"/>
-            <a:r>
-              <a:rPr lang="en-US" altLang="ja-JP" dirty="0" smtClean="0"/>
-              <a:t>HSLB</a:t>
-            </a:r>
-            <a:endParaRPr kumimoji="1" lang="ja-JP" altLang="en-US" dirty="0"/>
-          </a:p>
-        </p:txBody>
-      </p:sp>
-      <p:sp>
-        <p:nvSpPr>
-          <p:cNvPr id="11" name="正方形/長方形 10"/>
-          <p:cNvSpPr/>
-          <p:nvPr/>
-        </p:nvSpPr>
-        <p:spPr>
-          <a:xfrm>
-            <a:off x="5756115" y="3668819"/>
-            <a:ext cx="1240484" cy="545942"/>
-          </a:xfrm>
-          <a:prstGeom prst="rect">
-            <a:avLst/>
-          </a:prstGeom>
-          <a:solidFill>
-            <a:srgbClr val="92D050"/>
-          </a:solidFill>
-        </p:spPr>
-        <p:style>
-          <a:lnRef idx="2">
-            <a:schemeClr val="accent1">
-              <a:shade val="50000"/>
-            </a:schemeClr>
-          </a:lnRef>
-          <a:fillRef idx="1">
-            <a:schemeClr val="accent1"/>
-          </a:fillRef>
-          <a:effectRef idx="0">
-            <a:schemeClr val="accent1"/>
-          </a:effectRef>
-          <a:fontRef idx="minor">
-            <a:schemeClr val="lt1"/>
-          </a:fontRef>
-        </p:style>
-        <p:txBody>
-          <a:bodyPr rtlCol="0" anchor="ctr"/>
-          <a:lstStyle/>
-          <a:p>
-            <a:pPr algn="ctr"/>
-            <a:r>
-              <a:rPr lang="en-US" altLang="ja-JP" dirty="0" smtClean="0"/>
-              <a:t>COPPER</a:t>
-            </a:r>
-          </a:p>
-          <a:p>
-            <a:pPr algn="ctr"/>
-            <a:r>
-              <a:rPr kumimoji="1" lang="en-US" altLang="ja-JP" dirty="0" smtClean="0"/>
-              <a:t>CPU</a:t>
-            </a:r>
-            <a:endParaRPr kumimoji="1" lang="ja-JP" altLang="en-US" dirty="0"/>
-          </a:p>
-        </p:txBody>
-      </p:sp>
-      <p:cxnSp>
-        <p:nvCxnSpPr>
-          <p:cNvPr id="13" name="直線コネクタ 12"/>
-          <p:cNvCxnSpPr/>
-          <p:nvPr/>
-        </p:nvCxnSpPr>
-        <p:spPr>
-          <a:xfrm flipH="1">
-            <a:off x="1167320" y="5660009"/>
-            <a:ext cx="2470826" cy="6872"/>
-          </a:xfrm>
-          <a:prstGeom prst="line">
-            <a:avLst/>
-          </a:prstGeom>
-        </p:spPr>
-        <p:style>
-          <a:lnRef idx="1">
-            <a:schemeClr val="accent1"/>
-          </a:lnRef>
-          <a:fillRef idx="0">
-            <a:schemeClr val="accent1"/>
-          </a:fillRef>
-          <a:effectRef idx="0">
-            <a:schemeClr val="accent1"/>
-          </a:effectRef>
-          <a:fontRef idx="minor">
-            <a:schemeClr val="tx1"/>
-          </a:fontRef>
-        </p:style>
-      </p:cxnSp>
-      <p:cxnSp>
-        <p:nvCxnSpPr>
-          <p:cNvPr id="14" name="直線コネクタ 13"/>
-          <p:cNvCxnSpPr/>
-          <p:nvPr/>
-        </p:nvCxnSpPr>
-        <p:spPr>
-          <a:xfrm>
-            <a:off x="1167320" y="1643073"/>
-            <a:ext cx="0" cy="4028154"/>
-          </a:xfrm>
-          <a:prstGeom prst="line">
-            <a:avLst/>
-          </a:prstGeom>
-        </p:spPr>
-        <p:style>
-          <a:lnRef idx="1">
-            <a:schemeClr val="accent1"/>
-          </a:lnRef>
-          <a:fillRef idx="0">
-            <a:schemeClr val="accent1"/>
-          </a:fillRef>
-          <a:effectRef idx="0">
-            <a:schemeClr val="accent1"/>
-          </a:effectRef>
-          <a:fontRef idx="minor">
-            <a:schemeClr val="tx1"/>
-          </a:fontRef>
-        </p:style>
-      </p:cxnSp>
-      <p:sp>
-        <p:nvSpPr>
-          <p:cNvPr id="22" name="正方形/長方形 21"/>
-          <p:cNvSpPr/>
-          <p:nvPr/>
-        </p:nvSpPr>
-        <p:spPr>
-          <a:xfrm>
-            <a:off x="3541789" y="1382420"/>
-            <a:ext cx="1094071" cy="545493"/>
-          </a:xfrm>
-          <a:prstGeom prst="rect">
-            <a:avLst/>
-          </a:prstGeom>
-        </p:spPr>
-        <p:style>
-          <a:lnRef idx="2">
-            <a:schemeClr val="accent1">
-              <a:shade val="50000"/>
-            </a:schemeClr>
-          </a:lnRef>
-          <a:fillRef idx="1">
-            <a:schemeClr val="accent1"/>
-          </a:fillRef>
-          <a:effectRef idx="0">
-            <a:schemeClr val="accent1"/>
-          </a:effectRef>
-          <a:fontRef idx="minor">
-            <a:schemeClr val="lt1"/>
-          </a:fontRef>
-        </p:style>
-        <p:txBody>
-          <a:bodyPr rtlCol="0" anchor="ctr"/>
-          <a:lstStyle/>
-          <a:p>
-            <a:pPr algn="ctr"/>
-            <a:r>
-              <a:rPr kumimoji="1" lang="en-US" altLang="ja-JP" dirty="0" smtClean="0"/>
-              <a:t>Network</a:t>
-            </a:r>
-          </a:p>
-          <a:p>
-            <a:pPr algn="ctr"/>
-            <a:r>
-              <a:rPr lang="en-US" altLang="ja-JP" dirty="0" smtClean="0"/>
-              <a:t>switch</a:t>
-            </a:r>
-            <a:endParaRPr kumimoji="1" lang="ja-JP" altLang="en-US" dirty="0"/>
-          </a:p>
-        </p:txBody>
-      </p:sp>
-      <p:cxnSp>
-        <p:nvCxnSpPr>
-          <p:cNvPr id="23" name="直線コネクタ 22"/>
-          <p:cNvCxnSpPr>
-            <a:stCxn id="22" idx="1"/>
-          </p:cNvCxnSpPr>
-          <p:nvPr/>
-        </p:nvCxnSpPr>
-        <p:spPr>
-          <a:xfrm flipH="1" flipV="1">
-            <a:off x="1173850" y="1655166"/>
-            <a:ext cx="2367939" cy="1"/>
-          </a:xfrm>
-          <a:prstGeom prst="line">
-            <a:avLst/>
-          </a:prstGeom>
-        </p:spPr>
-        <p:style>
-          <a:lnRef idx="1">
-            <a:schemeClr val="accent1"/>
-          </a:lnRef>
-          <a:fillRef idx="0">
-            <a:schemeClr val="accent1"/>
-          </a:fillRef>
-          <a:effectRef idx="0">
-            <a:schemeClr val="accent1"/>
-          </a:effectRef>
-          <a:fontRef idx="minor">
-            <a:schemeClr val="tx1"/>
-          </a:fontRef>
-        </p:style>
-      </p:cxnSp>
-      <p:sp>
-        <p:nvSpPr>
-          <p:cNvPr id="27" name="正方形/長方形 26"/>
-          <p:cNvSpPr/>
-          <p:nvPr/>
-        </p:nvSpPr>
-        <p:spPr>
-          <a:xfrm>
-            <a:off x="6337861" y="1222952"/>
-            <a:ext cx="2708862" cy="840240"/>
-          </a:xfrm>
-          <a:prstGeom prst="rect">
-            <a:avLst/>
-          </a:prstGeom>
-          <a:solidFill>
-            <a:srgbClr val="00B050"/>
-          </a:solidFill>
-        </p:spPr>
-        <p:style>
-          <a:lnRef idx="2">
-            <a:schemeClr val="accent1">
-              <a:shade val="50000"/>
-            </a:schemeClr>
-          </a:lnRef>
-          <a:fillRef idx="1">
-            <a:schemeClr val="accent1"/>
-          </a:fillRef>
-          <a:effectRef idx="0">
-            <a:schemeClr val="accent1"/>
-          </a:effectRef>
-          <a:fontRef idx="minor">
-            <a:schemeClr val="lt1"/>
-          </a:fontRef>
-        </p:style>
-        <p:txBody>
-          <a:bodyPr rtlCol="0" anchor="ctr"/>
-          <a:lstStyle/>
-          <a:p>
-            <a:pPr algn="ctr"/>
-            <a:r>
-              <a:rPr kumimoji="1" lang="en-US" altLang="ja-JP" dirty="0" smtClean="0"/>
-              <a:t>Readout</a:t>
-            </a:r>
-          </a:p>
-          <a:p>
-            <a:pPr algn="ctr"/>
-            <a:r>
-              <a:rPr kumimoji="1" lang="en-US" altLang="ja-JP" dirty="0" smtClean="0"/>
-              <a:t>PC (PXE boot server)</a:t>
-            </a:r>
-            <a:endParaRPr kumimoji="1" lang="ja-JP" altLang="en-US" dirty="0"/>
-          </a:p>
-        </p:txBody>
-      </p:sp>
-      <p:cxnSp>
-        <p:nvCxnSpPr>
-          <p:cNvPr id="28" name="直線コネクタ 27"/>
-          <p:cNvCxnSpPr>
-            <a:stCxn id="27" idx="1"/>
-            <a:endCxn id="22" idx="3"/>
-          </p:cNvCxnSpPr>
-          <p:nvPr/>
-        </p:nvCxnSpPr>
-        <p:spPr>
-          <a:xfrm flipH="1">
-            <a:off x="4635860" y="1643072"/>
-            <a:ext cx="1702001" cy="12095"/>
-          </a:xfrm>
-          <a:prstGeom prst="line">
-            <a:avLst/>
-          </a:prstGeom>
-        </p:spPr>
-        <p:style>
-          <a:lnRef idx="1">
-            <a:schemeClr val="accent1"/>
-          </a:lnRef>
-          <a:fillRef idx="0">
-            <a:schemeClr val="accent1"/>
-          </a:fillRef>
-          <a:effectRef idx="0">
-            <a:schemeClr val="accent1"/>
-          </a:effectRef>
-          <a:fontRef idx="minor">
-            <a:schemeClr val="tx1"/>
-          </a:fontRef>
-        </p:style>
-      </p:cxnSp>
-      <p:sp>
-        <p:nvSpPr>
-          <p:cNvPr id="38" name="正方形/長方形 37"/>
-          <p:cNvSpPr/>
-          <p:nvPr/>
-        </p:nvSpPr>
-        <p:spPr>
-          <a:xfrm>
-            <a:off x="1606391" y="3599979"/>
-            <a:ext cx="972768" cy="405797"/>
-          </a:xfrm>
-          <a:prstGeom prst="rect">
-            <a:avLst/>
-          </a:prstGeom>
-          <a:solidFill>
-            <a:srgbClr val="92D050"/>
-          </a:solidFill>
-        </p:spPr>
-        <p:style>
-          <a:lnRef idx="2">
-            <a:schemeClr val="accent1">
-              <a:shade val="50000"/>
-            </a:schemeClr>
-          </a:lnRef>
-          <a:fillRef idx="1">
-            <a:schemeClr val="accent1"/>
-          </a:fillRef>
-          <a:effectRef idx="0">
-            <a:schemeClr val="accent1"/>
-          </a:effectRef>
-          <a:fontRef idx="minor">
-            <a:schemeClr val="lt1"/>
-          </a:fontRef>
-        </p:style>
-        <p:txBody>
-          <a:bodyPr rtlCol="0" anchor="ctr"/>
-          <a:lstStyle/>
-          <a:p>
-            <a:pPr algn="ctr"/>
-            <a:r>
-              <a:rPr lang="en-US" altLang="ja-JP" dirty="0" smtClean="0"/>
-              <a:t>FEE</a:t>
-            </a:r>
-            <a:endParaRPr kumimoji="1" lang="ja-JP" altLang="en-US" dirty="0"/>
-          </a:p>
-        </p:txBody>
-      </p:sp>
-      <p:sp>
-        <p:nvSpPr>
-          <p:cNvPr id="39" name="正方形/長方形 38"/>
-          <p:cNvSpPr/>
-          <p:nvPr/>
-        </p:nvSpPr>
-        <p:spPr>
-          <a:xfrm>
-            <a:off x="1606391" y="4119956"/>
-            <a:ext cx="972768" cy="405797"/>
-          </a:xfrm>
-          <a:prstGeom prst="rect">
-            <a:avLst/>
-          </a:prstGeom>
-          <a:solidFill>
-            <a:srgbClr val="92D050"/>
-          </a:solidFill>
-        </p:spPr>
-        <p:style>
-          <a:lnRef idx="2">
-            <a:schemeClr val="accent1">
-              <a:shade val="50000"/>
-            </a:schemeClr>
-          </a:lnRef>
-          <a:fillRef idx="1">
-            <a:schemeClr val="accent1"/>
-          </a:fillRef>
-          <a:effectRef idx="0">
-            <a:schemeClr val="accent1"/>
-          </a:effectRef>
-          <a:fontRef idx="minor">
-            <a:schemeClr val="lt1"/>
-          </a:fontRef>
-        </p:style>
-        <p:txBody>
-          <a:bodyPr rtlCol="0" anchor="ctr"/>
-          <a:lstStyle/>
-          <a:p>
-            <a:pPr algn="ctr"/>
-            <a:r>
-              <a:rPr lang="en-US" altLang="ja-JP" dirty="0" smtClean="0"/>
-              <a:t>FEE</a:t>
-            </a:r>
-            <a:endParaRPr kumimoji="1" lang="ja-JP" altLang="en-US" dirty="0"/>
-          </a:p>
-        </p:txBody>
-      </p:sp>
-      <p:sp>
-        <p:nvSpPr>
-          <p:cNvPr id="40" name="正方形/長方形 39"/>
-          <p:cNvSpPr/>
-          <p:nvPr/>
-        </p:nvSpPr>
-        <p:spPr>
-          <a:xfrm>
-            <a:off x="1606391" y="4590925"/>
-            <a:ext cx="972768" cy="405797"/>
-          </a:xfrm>
-          <a:prstGeom prst="rect">
-            <a:avLst/>
-          </a:prstGeom>
-          <a:solidFill>
-            <a:srgbClr val="92D050"/>
-          </a:solidFill>
-        </p:spPr>
-        <p:style>
-          <a:lnRef idx="2">
-            <a:schemeClr val="accent1">
-              <a:shade val="50000"/>
-            </a:schemeClr>
-          </a:lnRef>
-          <a:fillRef idx="1">
-            <a:schemeClr val="accent1"/>
-          </a:fillRef>
-          <a:effectRef idx="0">
-            <a:schemeClr val="accent1"/>
-          </a:effectRef>
-          <a:fontRef idx="minor">
-            <a:schemeClr val="lt1"/>
-          </a:fontRef>
-        </p:style>
-        <p:txBody>
-          <a:bodyPr rtlCol="0" anchor="ctr"/>
-          <a:lstStyle/>
-          <a:p>
-            <a:pPr algn="ctr"/>
-            <a:r>
-              <a:rPr lang="en-US" altLang="ja-JP" dirty="0" smtClean="0"/>
-              <a:t>FEE</a:t>
-            </a:r>
-            <a:endParaRPr kumimoji="1" lang="ja-JP" altLang="en-US" dirty="0"/>
-          </a:p>
-        </p:txBody>
-      </p:sp>
-      <p:sp>
-        <p:nvSpPr>
-          <p:cNvPr id="41" name="正方形/長方形 40"/>
-          <p:cNvSpPr/>
-          <p:nvPr/>
-        </p:nvSpPr>
-        <p:spPr>
-          <a:xfrm>
-            <a:off x="1595334" y="5069601"/>
-            <a:ext cx="972768" cy="405797"/>
-          </a:xfrm>
-          <a:prstGeom prst="rect">
-            <a:avLst/>
-          </a:prstGeom>
-          <a:solidFill>
-            <a:srgbClr val="92D050"/>
-          </a:solidFill>
-        </p:spPr>
-        <p:style>
-          <a:lnRef idx="2">
-            <a:schemeClr val="accent1">
-              <a:shade val="50000"/>
-            </a:schemeClr>
-          </a:lnRef>
-          <a:fillRef idx="1">
-            <a:schemeClr val="accent1"/>
-          </a:fillRef>
-          <a:effectRef idx="0">
-            <a:schemeClr val="accent1"/>
-          </a:effectRef>
-          <a:fontRef idx="minor">
-            <a:schemeClr val="lt1"/>
-          </a:fontRef>
-        </p:style>
-        <p:txBody>
-          <a:bodyPr rtlCol="0" anchor="ctr"/>
-          <a:lstStyle/>
-          <a:p>
-            <a:pPr algn="ctr"/>
-            <a:r>
-              <a:rPr lang="en-US" altLang="ja-JP" dirty="0" smtClean="0"/>
-              <a:t>FEE</a:t>
-            </a:r>
-            <a:endParaRPr kumimoji="1" lang="ja-JP" altLang="en-US" dirty="0"/>
-          </a:p>
-        </p:txBody>
-      </p:sp>
-      <p:cxnSp>
-        <p:nvCxnSpPr>
-          <p:cNvPr id="44" name="直線コネクタ 43"/>
-          <p:cNvCxnSpPr>
-            <a:stCxn id="7" idx="1"/>
-            <a:endCxn id="38" idx="3"/>
-          </p:cNvCxnSpPr>
-          <p:nvPr/>
-        </p:nvCxnSpPr>
-        <p:spPr>
-          <a:xfrm flipH="1" flipV="1">
-            <a:off x="2579159" y="3802878"/>
-            <a:ext cx="1134148" cy="14751"/>
-          </a:xfrm>
-          <a:prstGeom prst="line">
-            <a:avLst/>
-          </a:prstGeom>
-          <a:ln w="38100">
-            <a:solidFill>
-              <a:srgbClr val="FFC000"/>
-            </a:solidFill>
-          </a:ln>
-        </p:spPr>
-        <p:style>
-          <a:lnRef idx="1">
-            <a:schemeClr val="accent1"/>
-          </a:lnRef>
-          <a:fillRef idx="0">
-            <a:schemeClr val="accent1"/>
-          </a:fillRef>
-          <a:effectRef idx="0">
-            <a:schemeClr val="accent1"/>
-          </a:effectRef>
-          <a:fontRef idx="minor">
-            <a:schemeClr val="tx1"/>
-          </a:fontRef>
-        </p:style>
-      </p:cxnSp>
-      <p:cxnSp>
-        <p:nvCxnSpPr>
-          <p:cNvPr id="48" name="直線コネクタ 47"/>
-          <p:cNvCxnSpPr>
-            <a:stCxn id="8" idx="1"/>
-            <a:endCxn id="39" idx="3"/>
-          </p:cNvCxnSpPr>
-          <p:nvPr/>
-        </p:nvCxnSpPr>
-        <p:spPr>
-          <a:xfrm flipH="1">
-            <a:off x="2579159" y="4312942"/>
-            <a:ext cx="1134148" cy="9913"/>
-          </a:xfrm>
-          <a:prstGeom prst="line">
-            <a:avLst/>
-          </a:prstGeom>
-          <a:ln w="38100">
-            <a:solidFill>
-              <a:srgbClr val="FFC000"/>
-            </a:solidFill>
-          </a:ln>
-        </p:spPr>
-        <p:style>
-          <a:lnRef idx="1">
-            <a:schemeClr val="accent1"/>
-          </a:lnRef>
-          <a:fillRef idx="0">
-            <a:schemeClr val="accent1"/>
-          </a:fillRef>
-          <a:effectRef idx="0">
-            <a:schemeClr val="accent1"/>
-          </a:effectRef>
-          <a:fontRef idx="minor">
-            <a:schemeClr val="tx1"/>
-          </a:fontRef>
-        </p:style>
-      </p:cxnSp>
-      <p:cxnSp>
-        <p:nvCxnSpPr>
-          <p:cNvPr id="52" name="直線コネクタ 51"/>
-          <p:cNvCxnSpPr>
-            <a:stCxn id="9" idx="1"/>
-            <a:endCxn id="40" idx="3"/>
-          </p:cNvCxnSpPr>
-          <p:nvPr/>
-        </p:nvCxnSpPr>
-        <p:spPr>
-          <a:xfrm flipH="1">
-            <a:off x="2579159" y="4791618"/>
-            <a:ext cx="1134148" cy="2206"/>
-          </a:xfrm>
-          <a:prstGeom prst="line">
-            <a:avLst/>
-          </a:prstGeom>
-          <a:ln w="38100">
-            <a:solidFill>
-              <a:srgbClr val="FFC000"/>
-            </a:solidFill>
-          </a:ln>
-        </p:spPr>
-        <p:style>
-          <a:lnRef idx="1">
-            <a:schemeClr val="accent1"/>
-          </a:lnRef>
-          <a:fillRef idx="0">
-            <a:schemeClr val="accent1"/>
-          </a:fillRef>
-          <a:effectRef idx="0">
-            <a:schemeClr val="accent1"/>
-          </a:effectRef>
-          <a:fontRef idx="minor">
-            <a:schemeClr val="tx1"/>
-          </a:fontRef>
-        </p:style>
-      </p:cxnSp>
-      <p:cxnSp>
-        <p:nvCxnSpPr>
-          <p:cNvPr id="55" name="直線コネクタ 54"/>
-          <p:cNvCxnSpPr>
-            <a:endCxn id="41" idx="3"/>
-          </p:cNvCxnSpPr>
-          <p:nvPr/>
-        </p:nvCxnSpPr>
-        <p:spPr>
-          <a:xfrm flipH="1" flipV="1">
-            <a:off x="2568102" y="5272500"/>
-            <a:ext cx="1128409" cy="2205"/>
-          </a:xfrm>
-          <a:prstGeom prst="line">
-            <a:avLst/>
-          </a:prstGeom>
-          <a:ln w="38100">
-            <a:solidFill>
-              <a:srgbClr val="FFC000"/>
-            </a:solidFill>
-          </a:ln>
-        </p:spPr>
-        <p:style>
-          <a:lnRef idx="1">
-            <a:schemeClr val="accent1"/>
-          </a:lnRef>
-          <a:fillRef idx="0">
-            <a:schemeClr val="accent1"/>
-          </a:fillRef>
-          <a:effectRef idx="0">
-            <a:schemeClr val="accent1"/>
-          </a:effectRef>
-          <a:fontRef idx="minor">
-            <a:schemeClr val="tx1"/>
-          </a:fontRef>
-        </p:style>
-      </p:cxnSp>
-      <p:sp>
-        <p:nvSpPr>
-          <p:cNvPr id="58" name="テキスト ボックス 57"/>
-          <p:cNvSpPr txBox="1"/>
-          <p:nvPr/>
-        </p:nvSpPr>
-        <p:spPr>
-          <a:xfrm rot="16200000">
-            <a:off x="481908" y="2261854"/>
-            <a:ext cx="1001493" cy="369332"/>
-          </a:xfrm>
-          <a:prstGeom prst="rect">
-            <a:avLst/>
-          </a:prstGeom>
-          <a:noFill/>
-        </p:spPr>
-        <p:txBody>
-          <a:bodyPr wrap="none" rtlCol="0">
-            <a:spAutoFit/>
-          </a:bodyPr>
-          <a:lstStyle/>
-          <a:p>
-            <a:r>
-              <a:rPr kumimoji="1" lang="en-US" altLang="ja-JP" dirty="0" smtClean="0"/>
-              <a:t>Ethernet</a:t>
-            </a:r>
-            <a:endParaRPr kumimoji="1" lang="ja-JP" altLang="en-US" dirty="0"/>
-          </a:p>
-        </p:txBody>
-      </p:sp>
-      <p:sp>
-        <p:nvSpPr>
-          <p:cNvPr id="63" name="テキスト ボックス 62"/>
-          <p:cNvSpPr txBox="1"/>
-          <p:nvPr/>
-        </p:nvSpPr>
-        <p:spPr>
-          <a:xfrm>
-            <a:off x="2626789" y="3484153"/>
-            <a:ext cx="758541" cy="369332"/>
-          </a:xfrm>
-          <a:prstGeom prst="rect">
-            <a:avLst/>
-          </a:prstGeom>
-          <a:noFill/>
-        </p:spPr>
-        <p:txBody>
-          <a:bodyPr wrap="none" rtlCol="0">
-            <a:spAutoFit/>
-          </a:bodyPr>
-          <a:lstStyle/>
-          <a:p>
-            <a:r>
-              <a:rPr kumimoji="1" lang="en-US" altLang="ja-JP" dirty="0" smtClean="0"/>
-              <a:t>B2link</a:t>
-            </a:r>
-            <a:endParaRPr kumimoji="1" lang="ja-JP" altLang="en-US" dirty="0"/>
-          </a:p>
-        </p:txBody>
-      </p:sp>
-      <p:sp>
-        <p:nvSpPr>
-          <p:cNvPr id="64" name="テキスト ボックス 63"/>
-          <p:cNvSpPr txBox="1"/>
-          <p:nvPr/>
-        </p:nvSpPr>
-        <p:spPr>
-          <a:xfrm>
-            <a:off x="35857" y="97439"/>
-            <a:ext cx="5828712" cy="584775"/>
-          </a:xfrm>
-          <a:prstGeom prst="rect">
-            <a:avLst/>
-          </a:prstGeom>
-          <a:noFill/>
-        </p:spPr>
-        <p:txBody>
-          <a:bodyPr wrap="none" rtlCol="0">
-            <a:spAutoFit/>
-          </a:bodyPr>
-          <a:lstStyle/>
-          <a:p>
-            <a:r>
-              <a:rPr kumimoji="1" lang="en-US" altLang="ja-JP" sz="3200" u="sng" dirty="0" smtClean="0"/>
-              <a:t>Connection </a:t>
-            </a:r>
-            <a:r>
-              <a:rPr lang="en-US" altLang="ja-JP" sz="3200" u="sng" dirty="0" smtClean="0"/>
-              <a:t>between components</a:t>
-            </a:r>
-            <a:endParaRPr kumimoji="1" lang="ja-JP" altLang="en-US" sz="3200" u="sng" dirty="0"/>
-          </a:p>
-        </p:txBody>
-      </p:sp>
-      <p:sp>
-        <p:nvSpPr>
-          <p:cNvPr id="29" name="正方形/長方形 28"/>
-          <p:cNvSpPr/>
-          <p:nvPr/>
-        </p:nvSpPr>
-        <p:spPr>
-          <a:xfrm>
-            <a:off x="5966881" y="5146496"/>
-            <a:ext cx="1163493" cy="545942"/>
-          </a:xfrm>
-          <a:prstGeom prst="rect">
-            <a:avLst/>
-          </a:prstGeom>
-          <a:solidFill>
-            <a:srgbClr val="92D050"/>
-          </a:solidFill>
-        </p:spPr>
-        <p:style>
-          <a:lnRef idx="2">
-            <a:schemeClr val="accent1">
-              <a:shade val="50000"/>
-            </a:schemeClr>
-          </a:lnRef>
-          <a:fillRef idx="1">
-            <a:schemeClr val="accent1"/>
-          </a:fillRef>
-          <a:effectRef idx="0">
-            <a:schemeClr val="accent1"/>
-          </a:effectRef>
-          <a:fontRef idx="minor">
-            <a:schemeClr val="lt1"/>
-          </a:fontRef>
-        </p:style>
-        <p:txBody>
-          <a:bodyPr rtlCol="0" anchor="ctr"/>
-          <a:lstStyle/>
-          <a:p>
-            <a:pPr algn="ctr"/>
-            <a:r>
-              <a:rPr lang="en-US" altLang="ja-JP" dirty="0" smtClean="0"/>
-              <a:t>TTRX</a:t>
-            </a:r>
-            <a:endParaRPr kumimoji="1" lang="ja-JP" altLang="en-US" dirty="0"/>
-          </a:p>
-        </p:txBody>
-      </p:sp>
-      <p:cxnSp>
-        <p:nvCxnSpPr>
-          <p:cNvPr id="30" name="直線コネクタ 29"/>
-          <p:cNvCxnSpPr>
-            <a:stCxn id="11" idx="1"/>
-            <a:endCxn id="7" idx="3"/>
-          </p:cNvCxnSpPr>
-          <p:nvPr/>
-        </p:nvCxnSpPr>
-        <p:spPr>
-          <a:xfrm flipH="1" flipV="1">
-            <a:off x="5545350" y="3817629"/>
-            <a:ext cx="210765" cy="124161"/>
-          </a:xfrm>
-          <a:prstGeom prst="line">
-            <a:avLst/>
-          </a:prstGeom>
-          <a:ln w="38100">
-            <a:solidFill>
-              <a:schemeClr val="tx1"/>
-            </a:solidFill>
-          </a:ln>
-        </p:spPr>
-        <p:style>
-          <a:lnRef idx="1">
-            <a:schemeClr val="accent1"/>
-          </a:lnRef>
-          <a:fillRef idx="0">
-            <a:schemeClr val="accent1"/>
-          </a:fillRef>
-          <a:effectRef idx="0">
-            <a:schemeClr val="accent1"/>
-          </a:effectRef>
-          <a:fontRef idx="minor">
-            <a:schemeClr val="tx1"/>
-          </a:fontRef>
-        </p:style>
-      </p:cxnSp>
-      <p:cxnSp>
-        <p:nvCxnSpPr>
-          <p:cNvPr id="36" name="直線コネクタ 35"/>
-          <p:cNvCxnSpPr>
-            <a:stCxn id="11" idx="1"/>
-            <a:endCxn id="8" idx="3"/>
-          </p:cNvCxnSpPr>
-          <p:nvPr/>
-        </p:nvCxnSpPr>
-        <p:spPr>
-          <a:xfrm flipH="1">
-            <a:off x="5545350" y="3941790"/>
-            <a:ext cx="210765" cy="371152"/>
-          </a:xfrm>
-          <a:prstGeom prst="line">
-            <a:avLst/>
-          </a:prstGeom>
-          <a:ln w="38100">
-            <a:solidFill>
-              <a:schemeClr val="tx1"/>
-            </a:solidFill>
-          </a:ln>
-        </p:spPr>
-        <p:style>
-          <a:lnRef idx="1">
-            <a:schemeClr val="accent1"/>
-          </a:lnRef>
-          <a:fillRef idx="0">
-            <a:schemeClr val="accent1"/>
-          </a:fillRef>
-          <a:effectRef idx="0">
-            <a:schemeClr val="accent1"/>
-          </a:effectRef>
-          <a:fontRef idx="minor">
-            <a:schemeClr val="tx1"/>
-          </a:fontRef>
-        </p:style>
-      </p:cxnSp>
-      <p:cxnSp>
-        <p:nvCxnSpPr>
-          <p:cNvPr id="42" name="直線コネクタ 41"/>
-          <p:cNvCxnSpPr>
-            <a:stCxn id="11" idx="1"/>
-            <a:endCxn id="9" idx="3"/>
-          </p:cNvCxnSpPr>
-          <p:nvPr/>
-        </p:nvCxnSpPr>
-        <p:spPr>
-          <a:xfrm flipH="1">
-            <a:off x="5545350" y="3941790"/>
-            <a:ext cx="210765" cy="849828"/>
-          </a:xfrm>
-          <a:prstGeom prst="line">
-            <a:avLst/>
-          </a:prstGeom>
-          <a:ln w="38100">
-            <a:solidFill>
-              <a:schemeClr val="tx1"/>
-            </a:solidFill>
-          </a:ln>
-        </p:spPr>
-        <p:style>
-          <a:lnRef idx="1">
-            <a:schemeClr val="accent1"/>
-          </a:lnRef>
-          <a:fillRef idx="0">
-            <a:schemeClr val="accent1"/>
-          </a:fillRef>
-          <a:effectRef idx="0">
-            <a:schemeClr val="accent1"/>
-          </a:effectRef>
-          <a:fontRef idx="minor">
-            <a:schemeClr val="tx1"/>
-          </a:fontRef>
-        </p:style>
-      </p:cxnSp>
-      <p:cxnSp>
-        <p:nvCxnSpPr>
-          <p:cNvPr id="43" name="直線コネクタ 42"/>
-          <p:cNvCxnSpPr>
-            <a:stCxn id="11" idx="1"/>
-            <a:endCxn id="10" idx="3"/>
-          </p:cNvCxnSpPr>
-          <p:nvPr/>
-        </p:nvCxnSpPr>
-        <p:spPr>
-          <a:xfrm flipH="1">
-            <a:off x="5528554" y="3941790"/>
-            <a:ext cx="227561" cy="1328504"/>
-          </a:xfrm>
-          <a:prstGeom prst="line">
-            <a:avLst/>
-          </a:prstGeom>
-          <a:ln w="38100">
-            <a:solidFill>
-              <a:schemeClr val="tx1"/>
-            </a:solidFill>
-          </a:ln>
-        </p:spPr>
-        <p:style>
-          <a:lnRef idx="1">
-            <a:schemeClr val="accent1"/>
-          </a:lnRef>
-          <a:fillRef idx="0">
-            <a:schemeClr val="accent1"/>
-          </a:fillRef>
-          <a:effectRef idx="0">
-            <a:schemeClr val="accent1"/>
-          </a:effectRef>
-          <a:fontRef idx="minor">
-            <a:schemeClr val="tx1"/>
-          </a:fontRef>
-        </p:style>
-      </p:cxnSp>
-      <p:cxnSp>
-        <p:nvCxnSpPr>
-          <p:cNvPr id="45" name="直線コネクタ 44"/>
-          <p:cNvCxnSpPr/>
-          <p:nvPr/>
-        </p:nvCxnSpPr>
-        <p:spPr>
-          <a:xfrm flipH="1">
-            <a:off x="3638145" y="5615173"/>
-            <a:ext cx="2229255" cy="32743"/>
-          </a:xfrm>
-          <a:prstGeom prst="line">
-            <a:avLst/>
-          </a:prstGeom>
-          <a:ln w="38100">
-            <a:solidFill>
-              <a:schemeClr val="accent2">
-                <a:lumMod val="75000"/>
-              </a:schemeClr>
-            </a:solidFill>
-          </a:ln>
-        </p:spPr>
-        <p:style>
-          <a:lnRef idx="1">
-            <a:schemeClr val="accent1"/>
-          </a:lnRef>
-          <a:fillRef idx="0">
-            <a:schemeClr val="accent1"/>
-          </a:fillRef>
-          <a:effectRef idx="0">
-            <a:schemeClr val="accent1"/>
-          </a:effectRef>
-          <a:fontRef idx="minor">
-            <a:schemeClr val="tx1"/>
-          </a:fontRef>
-        </p:style>
-      </p:cxnSp>
-      <p:cxnSp>
-        <p:nvCxnSpPr>
-          <p:cNvPr id="49" name="直線コネクタ 48"/>
-          <p:cNvCxnSpPr/>
-          <p:nvPr/>
-        </p:nvCxnSpPr>
-        <p:spPr>
-          <a:xfrm flipV="1">
-            <a:off x="5833106" y="4366704"/>
-            <a:ext cx="34294" cy="1281212"/>
-          </a:xfrm>
-          <a:prstGeom prst="line">
-            <a:avLst/>
-          </a:prstGeom>
-          <a:ln w="38100">
-            <a:solidFill>
-              <a:schemeClr val="accent2">
-                <a:lumMod val="75000"/>
-              </a:schemeClr>
-            </a:solidFill>
-          </a:ln>
-        </p:spPr>
-        <p:style>
-          <a:lnRef idx="1">
-            <a:schemeClr val="accent1"/>
-          </a:lnRef>
-          <a:fillRef idx="0">
-            <a:schemeClr val="accent1"/>
-          </a:fillRef>
-          <a:effectRef idx="0">
-            <a:schemeClr val="accent1"/>
-          </a:effectRef>
-          <a:fontRef idx="minor">
-            <a:schemeClr val="tx1"/>
-          </a:fontRef>
-        </p:style>
-      </p:cxnSp>
-      <p:cxnSp>
-        <p:nvCxnSpPr>
-          <p:cNvPr id="53" name="直線コネクタ 52"/>
-          <p:cNvCxnSpPr/>
-          <p:nvPr/>
-        </p:nvCxnSpPr>
-        <p:spPr>
-          <a:xfrm flipV="1">
-            <a:off x="5891472" y="4366704"/>
-            <a:ext cx="1105127" cy="23233"/>
-          </a:xfrm>
-          <a:prstGeom prst="line">
-            <a:avLst/>
-          </a:prstGeom>
-          <a:ln w="38100">
-            <a:solidFill>
-              <a:schemeClr val="accent2">
-                <a:lumMod val="75000"/>
-              </a:schemeClr>
-            </a:solidFill>
-          </a:ln>
-        </p:spPr>
-        <p:style>
-          <a:lnRef idx="1">
-            <a:schemeClr val="accent1"/>
-          </a:lnRef>
-          <a:fillRef idx="0">
-            <a:schemeClr val="accent1"/>
-          </a:fillRef>
-          <a:effectRef idx="0">
-            <a:schemeClr val="accent1"/>
-          </a:effectRef>
-          <a:fontRef idx="minor">
-            <a:schemeClr val="tx1"/>
-          </a:fontRef>
-        </p:style>
-      </p:cxnSp>
-      <p:cxnSp>
-        <p:nvCxnSpPr>
-          <p:cNvPr id="56" name="直線コネクタ 55"/>
-          <p:cNvCxnSpPr/>
-          <p:nvPr/>
-        </p:nvCxnSpPr>
-        <p:spPr>
-          <a:xfrm flipV="1">
-            <a:off x="6975404" y="3948894"/>
-            <a:ext cx="21195" cy="415415"/>
-          </a:xfrm>
-          <a:prstGeom prst="line">
-            <a:avLst/>
-          </a:prstGeom>
-          <a:ln w="38100">
-            <a:solidFill>
-              <a:schemeClr val="accent2">
-                <a:lumMod val="75000"/>
-              </a:schemeClr>
-            </a:solidFill>
-          </a:ln>
-        </p:spPr>
-        <p:style>
-          <a:lnRef idx="1">
-            <a:schemeClr val="accent1"/>
-          </a:lnRef>
-          <a:fillRef idx="0">
-            <a:schemeClr val="accent1"/>
-          </a:fillRef>
-          <a:effectRef idx="0">
-            <a:schemeClr val="accent1"/>
-          </a:effectRef>
-          <a:fontRef idx="minor">
-            <a:schemeClr val="tx1"/>
-          </a:fontRef>
-        </p:style>
-      </p:cxnSp>
-    </p:spTree>
-    <p:extLst>
-      <p:ext uri="{BB962C8B-B14F-4D97-AF65-F5344CB8AC3E}">
-        <p14:creationId xmlns:p14="http://schemas.microsoft.com/office/powerpoint/2010/main" val="2584151492"/>
-      </p:ext>
-    </p:extLst>
-  </p:cSld>
-  <p:clrMapOvr>
-    <a:masterClrMapping/>
-  </p:clrMapOvr>
-  <p:timing>
-    <p:tnLst>
-      <p:par>
-        <p:cTn id="1" dur="indefinite" restart="never" nodeType="tmRoot"/>
-      </p:par>
-    </p:tnLst>
-  </p:timing>
 </p:sld>
 </file>
 
@@ -9118,11 +10307,7 @@
             </a:r>
             <a:r>
               <a:rPr lang="en-US" altLang="ja-JP" dirty="0" smtClean="0"/>
-              <a:t> package</a:t>
-            </a:r>
-            <a:r>
-              <a:rPr lang="en-US" altLang="ja-JP" dirty="0" smtClean="0"/>
-              <a:t>. You need to do “</a:t>
+              <a:t> package. You need to do “</a:t>
             </a:r>
             <a:r>
               <a:rPr lang="en-US" altLang="ja-JP" dirty="0" err="1" smtClean="0"/>
@@ -9140,7 +10325,6 @@
               <a:rPr lang="en-US" altLang="ja-JP" dirty="0" smtClean="0"/>
               <a:t>”.</a:t>
             </a:r>
-            <a:endParaRPr lang="en-US" altLang="ja-JP" dirty="0" smtClean="0"/>
           </a:p>
           <a:p>
             <a:pPr lvl="1"/>
@@ -9916,11 +11100,7 @@
             </a:r>
             <a:r>
               <a:rPr lang="en-US" altLang="ja-JP" b="1" dirty="0" smtClean="0"/>
-              <a:t>for </a:t>
-            </a:r>
-            <a:r>
-              <a:rPr lang="en-US" altLang="ja-JP" b="1" dirty="0" smtClean="0"/>
-              <a:t>details. </a:t>
+              <a:t>for details. </a:t>
             </a:r>
           </a:p>
           <a:p>

</xml_diff>

<commit_message>
Update manual about usage of a script
git-svn-id: https://belle2.cc.kek.jp/svn/trunk/software@12133 b38c6c8f-bee8-465d-8448-9abe6915d496
</commit_message>
<xml_diff>
--- a/daq/copper/doc/SetupPocketDAQ_4_DAQsoftware.pptx
+++ b/daq/copper/doc/SetupPocketDAQ_4_DAQsoftware.pptx
@@ -264,7 +264,7 @@
           <a:p>
             <a:fld id="{1A984C01-8EE0-44F4-B595-752AEE56780B}" type="datetimeFigureOut">
               <a:rPr kumimoji="1" lang="ja-JP" altLang="en-US" smtClean="0"/>
-              <a:t>2014/7/28</a:t>
+              <a:t>2014/8/8</a:t>
             </a:fld>
             <a:endParaRPr kumimoji="1" lang="ja-JP" altLang="en-US"/>
           </a:p>
@@ -466,7 +466,7 @@
           <a:p>
             <a:fld id="{1A984C01-8EE0-44F4-B595-752AEE56780B}" type="datetimeFigureOut">
               <a:rPr kumimoji="1" lang="ja-JP" altLang="en-US" smtClean="0"/>
-              <a:t>2014/7/28</a:t>
+              <a:t>2014/8/8</a:t>
             </a:fld>
             <a:endParaRPr kumimoji="1" lang="ja-JP" altLang="en-US"/>
           </a:p>
@@ -678,7 +678,7 @@
           <a:p>
             <a:fld id="{1A984C01-8EE0-44F4-B595-752AEE56780B}" type="datetimeFigureOut">
               <a:rPr kumimoji="1" lang="ja-JP" altLang="en-US" smtClean="0"/>
-              <a:t>2014/7/28</a:t>
+              <a:t>2014/8/8</a:t>
             </a:fld>
             <a:endParaRPr kumimoji="1" lang="ja-JP" altLang="en-US"/>
           </a:p>
@@ -880,7 +880,7 @@
           <a:p>
             <a:fld id="{1A984C01-8EE0-44F4-B595-752AEE56780B}" type="datetimeFigureOut">
               <a:rPr kumimoji="1" lang="ja-JP" altLang="en-US" smtClean="0"/>
-              <a:t>2014/7/28</a:t>
+              <a:t>2014/8/8</a:t>
             </a:fld>
             <a:endParaRPr kumimoji="1" lang="ja-JP" altLang="en-US"/>
           </a:p>
@@ -1126,7 +1126,7 @@
           <a:p>
             <a:fld id="{1A984C01-8EE0-44F4-B595-752AEE56780B}" type="datetimeFigureOut">
               <a:rPr kumimoji="1" lang="ja-JP" altLang="en-US" smtClean="0"/>
-              <a:t>2014/7/28</a:t>
+              <a:t>2014/8/8</a:t>
             </a:fld>
             <a:endParaRPr kumimoji="1" lang="ja-JP" altLang="en-US"/>
           </a:p>
@@ -1422,7 +1422,7 @@
           <a:p>
             <a:fld id="{1A984C01-8EE0-44F4-B595-752AEE56780B}" type="datetimeFigureOut">
               <a:rPr kumimoji="1" lang="ja-JP" altLang="en-US" smtClean="0"/>
-              <a:t>2014/7/28</a:t>
+              <a:t>2014/8/8</a:t>
             </a:fld>
             <a:endParaRPr kumimoji="1" lang="ja-JP" altLang="en-US"/>
           </a:p>
@@ -1853,7 +1853,7 @@
           <a:p>
             <a:fld id="{1A984C01-8EE0-44F4-B595-752AEE56780B}" type="datetimeFigureOut">
               <a:rPr kumimoji="1" lang="ja-JP" altLang="en-US" smtClean="0"/>
-              <a:t>2014/7/28</a:t>
+              <a:t>2014/8/8</a:t>
             </a:fld>
             <a:endParaRPr kumimoji="1" lang="ja-JP" altLang="en-US"/>
           </a:p>
@@ -1971,7 +1971,7 @@
           <a:p>
             <a:fld id="{1A984C01-8EE0-44F4-B595-752AEE56780B}" type="datetimeFigureOut">
               <a:rPr kumimoji="1" lang="ja-JP" altLang="en-US" smtClean="0"/>
-              <a:t>2014/7/28</a:t>
+              <a:t>2014/8/8</a:t>
             </a:fld>
             <a:endParaRPr kumimoji="1" lang="ja-JP" altLang="en-US"/>
           </a:p>
@@ -2066,7 +2066,7 @@
           <a:p>
             <a:fld id="{1A984C01-8EE0-44F4-B595-752AEE56780B}" type="datetimeFigureOut">
               <a:rPr kumimoji="1" lang="ja-JP" altLang="en-US" smtClean="0"/>
-              <a:t>2014/7/28</a:t>
+              <a:t>2014/8/8</a:t>
             </a:fld>
             <a:endParaRPr kumimoji="1" lang="ja-JP" altLang="en-US"/>
           </a:p>
@@ -2375,7 +2375,7 @@
           <a:p>
             <a:fld id="{1A984C01-8EE0-44F4-B595-752AEE56780B}" type="datetimeFigureOut">
               <a:rPr kumimoji="1" lang="ja-JP" altLang="en-US" smtClean="0"/>
-              <a:t>2014/7/28</a:t>
+              <a:t>2014/8/8</a:t>
             </a:fld>
             <a:endParaRPr kumimoji="1" lang="ja-JP" altLang="en-US"/>
           </a:p>
@@ -2628,7 +2628,7 @@
           <a:p>
             <a:fld id="{1A984C01-8EE0-44F4-B595-752AEE56780B}" type="datetimeFigureOut">
               <a:rPr kumimoji="1" lang="ja-JP" altLang="en-US" smtClean="0"/>
-              <a:t>2014/7/28</a:t>
+              <a:t>2014/8/8</a:t>
             </a:fld>
             <a:endParaRPr kumimoji="1" lang="ja-JP" altLang="en-US"/>
           </a:p>
@@ -2873,7 +2873,7 @@
           <a:p>
             <a:fld id="{1A984C01-8EE0-44F4-B595-752AEE56780B}" type="datetimeFigureOut">
               <a:rPr kumimoji="1" lang="ja-JP" altLang="en-US" smtClean="0"/>
-              <a:t>2014/7/28</a:t>
+              <a:t>2014/8/8</a:t>
             </a:fld>
             <a:endParaRPr kumimoji="1" lang="ja-JP" altLang="en-US"/>
           </a:p>
@@ -3295,14 +3295,11 @@
           <a:p>
             <a:r>
               <a:rPr kumimoji="1" lang="en-US" altLang="ja-JP" dirty="0" smtClean="0"/>
-              <a:t>Pocket DAQ manual</a:t>
-            </a:r>
-            <a:br>
+              <a:t>Pocket DAQ </a:t>
+            </a:r>
+            <a:r>
               <a:rPr kumimoji="1" lang="en-US" altLang="ja-JP" dirty="0" smtClean="0"/>
-            </a:br>
-            <a:r>
-              <a:rPr lang="en-US" altLang="ja-JP" dirty="0" smtClean="0"/>
-              <a:t>(2014.7.19) rev.11654</a:t>
+              <a:t>manual</a:t>
             </a:r>
             <a:endParaRPr kumimoji="1" lang="ja-JP" altLang="en-US" dirty="0"/>
           </a:p>
@@ -3320,19 +3317,39 @@
         </p:nvSpPr>
         <p:spPr>
           <a:xfrm>
-            <a:off x="6096000" y="4737369"/>
+            <a:off x="5978013" y="4786530"/>
             <a:ext cx="3476017" cy="666345"/>
           </a:xfrm>
         </p:spPr>
         <p:txBody>
-          <a:bodyPr/>
+          <a:bodyPr>
+            <a:noAutofit/>
+          </a:bodyPr>
           <a:lstStyle/>
           <a:p>
             <a:r>
-              <a:rPr kumimoji="1" lang="en-US" altLang="ja-JP" dirty="0" smtClean="0"/>
-              <a:t>Satoru Yamada</a:t>
-            </a:r>
-            <a:endParaRPr kumimoji="1" lang="ja-JP" altLang="en-US" dirty="0"/>
+              <a:rPr lang="en-US" altLang="ja-JP" sz="2000" dirty="0"/>
+              <a:t/>
+            </a:r>
+            <a:br>
+              <a:rPr lang="en-US" altLang="ja-JP" sz="2000" dirty="0"/>
+            </a:br>
+            <a:r>
+              <a:rPr lang="en-US" altLang="ja-JP" sz="2000" dirty="0"/>
+              <a:t>(2014.8.8) rev.11654</a:t>
+            </a:r>
+            <a:endParaRPr kumimoji="1" lang="en-US" altLang="ja-JP" sz="2000" dirty="0" smtClean="0"/>
+          </a:p>
+          <a:p>
+            <a:r>
+              <a:rPr kumimoji="1" lang="en-US" altLang="ja-JP" sz="2000" dirty="0" smtClean="0"/>
+              <a:t>Satoru </a:t>
+            </a:r>
+            <a:r>
+              <a:rPr kumimoji="1" lang="en-US" altLang="ja-JP" sz="2000" dirty="0" smtClean="0"/>
+              <a:t>Yamada</a:t>
+            </a:r>
+            <a:endParaRPr kumimoji="1" lang="ja-JP" altLang="en-US" sz="2000" dirty="0"/>
           </a:p>
         </p:txBody>
       </p:sp>
@@ -5239,6 +5256,27 @@
             <a:r>
               <a:rPr lang="en-US" altLang="ja-JP" sz="1400" dirty="0" smtClean="0"/>
               <a:t>”</a:t>
+            </a:r>
+          </a:p>
+          <a:p>
+            <a:r>
+              <a:rPr kumimoji="1" lang="en-US" altLang="ja-JP" sz="1800" dirty="0" smtClean="0"/>
+              <a:t>2014/8/8</a:t>
+            </a:r>
+          </a:p>
+          <a:p>
+            <a:pPr lvl="1"/>
+            <a:r>
+              <a:rPr lang="en-US" altLang="ja-JP" sz="1400" dirty="0" smtClean="0"/>
+              <a:t>Modify usage of start_run.sh. (</a:t>
+            </a:r>
+            <a:r>
+              <a:rPr lang="en-US" altLang="ja-JP" sz="1400" dirty="0" err="1" smtClean="0"/>
+              <a:t>nodename</a:t>
+            </a:r>
+            <a:r>
+              <a:rPr lang="en-US" altLang="ja-JP" sz="1400" dirty="0" smtClean="0"/>
+              <a:t> is only used for NSM)</a:t>
             </a:r>
             <a:endParaRPr kumimoji="1" lang="ja-JP" altLang="en-US" sz="1400" dirty="0"/>
           </a:p>
@@ -9308,11 +9346,7 @@
           <a:p>
             <a:r>
               <a:rPr kumimoji="1" lang="en-US" altLang="ja-JP" sz="3200" u="sng" dirty="0" smtClean="0"/>
-              <a:t>B-1, Test </a:t>
-            </a:r>
-            <a:r>
-              <a:rPr kumimoji="1" lang="en-US" altLang="ja-JP" sz="3200" u="sng" dirty="0" smtClean="0"/>
-              <a:t>bench at Tsukuba B3</a:t>
+              <a:t>B-1, Test bench at Tsukuba B3</a:t>
             </a:r>
             <a:endParaRPr kumimoji="1" lang="ja-JP" altLang="en-US" sz="3200" u="sng" dirty="0"/>
           </a:p>
@@ -10758,8 +10792,37 @@
                   <a:srgbClr val="0000CC"/>
                 </a:solidFill>
               </a:rPr>
-              <a:t>&lt;HOSTNAME&gt; &lt;COPPER node ID&gt; &lt;FINNESSE bit flag: A=1, B=2, C=4, D=8&gt; &lt;Use network shared memory : Yes=1, No=0&gt; &lt;node name&gt;</a:t>
-            </a:r>
+              <a:t>&lt;HOSTNAME&gt; &lt;COPPER </a:t>
+            </a:r>
+            <a:r>
+              <a:rPr lang="en-US" altLang="ja-JP" b="1" dirty="0" smtClean="0">
+                <a:solidFill>
+                  <a:srgbClr val="0000CC"/>
+                </a:solidFill>
+              </a:rPr>
+              <a:t>node&gt; </a:t>
+            </a:r>
+            <a:r>
+              <a:rPr lang="en-US" altLang="ja-JP" b="1" dirty="0" smtClean="0">
+                <a:solidFill>
+                  <a:srgbClr val="0000CC"/>
+                </a:solidFill>
+              </a:rPr>
+              <a:t>&lt;FINNESSE bit flag: A=1, B=2, C=4, D=8&gt; &lt;Use network shared memory : Yes=1, No=0&gt; &lt;node </a:t>
+            </a:r>
+            <a:r>
+              <a:rPr lang="en-US" altLang="ja-JP" b="1" dirty="0" smtClean="0">
+                <a:solidFill>
+                  <a:srgbClr val="0000CC"/>
+                </a:solidFill>
+              </a:rPr>
+              <a:t>name(used for Network Shared Memory)&gt;</a:t>
+            </a:r>
+            <a:endParaRPr lang="en-US" altLang="ja-JP" b="1" dirty="0" smtClean="0">
+              <a:solidFill>
+                <a:srgbClr val="0000CC"/>
+              </a:solidFill>
+            </a:endParaRPr>
           </a:p>
           <a:p>
             <a:r>

</xml_diff>

<commit_message>
Update description about the data format ver.2
git-svn-id: https://belle2.cc.kek.jp/svn/trunk/software@17270 b38c6c8f-bee8-465d-8448-9abe6915d496
</commit_message>
<xml_diff>
--- a/daq/copper/doc/SetupPocketDAQ_4_DAQsoftware.pptx
+++ b/daq/copper/doc/SetupPocketDAQ_4_DAQsoftware.pptx
@@ -271,7 +271,7 @@
           <a:p>
             <a:fld id="{1A984C01-8EE0-44F4-B595-752AEE56780B}" type="datetimeFigureOut">
               <a:rPr kumimoji="1" lang="ja-JP" altLang="en-US" smtClean="0"/>
-              <a:t>2015/4/13</a:t>
+              <a:t>2015/4/15</a:t>
             </a:fld>
             <a:endParaRPr kumimoji="1" lang="ja-JP" altLang="en-US"/>
           </a:p>
@@ -473,7 +473,7 @@
           <a:p>
             <a:fld id="{1A984C01-8EE0-44F4-B595-752AEE56780B}" type="datetimeFigureOut">
               <a:rPr kumimoji="1" lang="ja-JP" altLang="en-US" smtClean="0"/>
-              <a:t>2015/4/13</a:t>
+              <a:t>2015/4/15</a:t>
             </a:fld>
             <a:endParaRPr kumimoji="1" lang="ja-JP" altLang="en-US"/>
           </a:p>
@@ -685,7 +685,7 @@
           <a:p>
             <a:fld id="{1A984C01-8EE0-44F4-B595-752AEE56780B}" type="datetimeFigureOut">
               <a:rPr kumimoji="1" lang="ja-JP" altLang="en-US" smtClean="0"/>
-              <a:t>2015/4/13</a:t>
+              <a:t>2015/4/15</a:t>
             </a:fld>
             <a:endParaRPr kumimoji="1" lang="ja-JP" altLang="en-US"/>
           </a:p>
@@ -887,7 +887,7 @@
           <a:p>
             <a:fld id="{1A984C01-8EE0-44F4-B595-752AEE56780B}" type="datetimeFigureOut">
               <a:rPr kumimoji="1" lang="ja-JP" altLang="en-US" smtClean="0"/>
-              <a:t>2015/4/13</a:t>
+              <a:t>2015/4/15</a:t>
             </a:fld>
             <a:endParaRPr kumimoji="1" lang="ja-JP" altLang="en-US"/>
           </a:p>
@@ -1133,7 +1133,7 @@
           <a:p>
             <a:fld id="{1A984C01-8EE0-44F4-B595-752AEE56780B}" type="datetimeFigureOut">
               <a:rPr kumimoji="1" lang="ja-JP" altLang="en-US" smtClean="0"/>
-              <a:t>2015/4/13</a:t>
+              <a:t>2015/4/15</a:t>
             </a:fld>
             <a:endParaRPr kumimoji="1" lang="ja-JP" altLang="en-US"/>
           </a:p>
@@ -1429,7 +1429,7 @@
           <a:p>
             <a:fld id="{1A984C01-8EE0-44F4-B595-752AEE56780B}" type="datetimeFigureOut">
               <a:rPr kumimoji="1" lang="ja-JP" altLang="en-US" smtClean="0"/>
-              <a:t>2015/4/13</a:t>
+              <a:t>2015/4/15</a:t>
             </a:fld>
             <a:endParaRPr kumimoji="1" lang="ja-JP" altLang="en-US"/>
           </a:p>
@@ -1860,7 +1860,7 @@
           <a:p>
             <a:fld id="{1A984C01-8EE0-44F4-B595-752AEE56780B}" type="datetimeFigureOut">
               <a:rPr kumimoji="1" lang="ja-JP" altLang="en-US" smtClean="0"/>
-              <a:t>2015/4/13</a:t>
+              <a:t>2015/4/15</a:t>
             </a:fld>
             <a:endParaRPr kumimoji="1" lang="ja-JP" altLang="en-US"/>
           </a:p>
@@ -1978,7 +1978,7 @@
           <a:p>
             <a:fld id="{1A984C01-8EE0-44F4-B595-752AEE56780B}" type="datetimeFigureOut">
               <a:rPr kumimoji="1" lang="ja-JP" altLang="en-US" smtClean="0"/>
-              <a:t>2015/4/13</a:t>
+              <a:t>2015/4/15</a:t>
             </a:fld>
             <a:endParaRPr kumimoji="1" lang="ja-JP" altLang="en-US"/>
           </a:p>
@@ -2073,7 +2073,7 @@
           <a:p>
             <a:fld id="{1A984C01-8EE0-44F4-B595-752AEE56780B}" type="datetimeFigureOut">
               <a:rPr kumimoji="1" lang="ja-JP" altLang="en-US" smtClean="0"/>
-              <a:t>2015/4/13</a:t>
+              <a:t>2015/4/15</a:t>
             </a:fld>
             <a:endParaRPr kumimoji="1" lang="ja-JP" altLang="en-US"/>
           </a:p>
@@ -2382,7 +2382,7 @@
           <a:p>
             <a:fld id="{1A984C01-8EE0-44F4-B595-752AEE56780B}" type="datetimeFigureOut">
               <a:rPr kumimoji="1" lang="ja-JP" altLang="en-US" smtClean="0"/>
-              <a:t>2015/4/13</a:t>
+              <a:t>2015/4/15</a:t>
             </a:fld>
             <a:endParaRPr kumimoji="1" lang="ja-JP" altLang="en-US"/>
           </a:p>
@@ -2635,7 +2635,7 @@
           <a:p>
             <a:fld id="{1A984C01-8EE0-44F4-B595-752AEE56780B}" type="datetimeFigureOut">
               <a:rPr kumimoji="1" lang="ja-JP" altLang="en-US" smtClean="0"/>
-              <a:t>2015/4/13</a:t>
+              <a:t>2015/4/15</a:t>
             </a:fld>
             <a:endParaRPr kumimoji="1" lang="ja-JP" altLang="en-US"/>
           </a:p>
@@ -2880,7 +2880,7 @@
           <a:p>
             <a:fld id="{1A984C01-8EE0-44F4-B595-752AEE56780B}" type="datetimeFigureOut">
               <a:rPr kumimoji="1" lang="ja-JP" altLang="en-US" smtClean="0"/>
-              <a:t>2015/4/13</a:t>
+              <a:t>2015/4/15</a:t>
             </a:fld>
             <a:endParaRPr kumimoji="1" lang="ja-JP" altLang="en-US"/>
           </a:p>
@@ -3348,19 +3348,11 @@
             </a:br>
             <a:r>
               <a:rPr lang="en-US" altLang="ja-JP" sz="2000" dirty="0" smtClean="0"/>
-              <a:t>Apr</a:t>
+              <a:t>Apr. </a:t>
             </a:r>
             <a:r>
               <a:rPr lang="en-US" altLang="ja-JP" sz="2000" dirty="0" smtClean="0"/>
-              <a:t>. </a:t>
-            </a:r>
-            <a:r>
-              <a:rPr lang="en-US" altLang="ja-JP" sz="2000" dirty="0" smtClean="0"/>
-              <a:t>13</a:t>
-            </a:r>
-            <a:r>
-              <a:rPr lang="en-US" altLang="ja-JP" sz="2000" dirty="0" smtClean="0"/>
-              <a:t>, </a:t>
+              <a:t>15, </a:t>
             </a:r>
             <a:r>
               <a:rPr lang="en-US" altLang="ja-JP" sz="2000" dirty="0" smtClean="0"/>
@@ -3573,7 +3565,7 @@
         </p:nvSpPr>
         <p:spPr>
           <a:xfrm>
-            <a:off x="0" y="-304800"/>
+            <a:off x="219920" y="-339524"/>
             <a:ext cx="10515600" cy="1325563"/>
           </a:xfrm>
         </p:spPr>
@@ -3601,7 +3593,7 @@
         </p:nvSpPr>
         <p:spPr>
           <a:xfrm>
-            <a:off x="737420" y="873278"/>
+            <a:off x="905626" y="661678"/>
             <a:ext cx="10009238" cy="2308324"/>
           </a:xfrm>
           <a:prstGeom prst="rect">
@@ -3738,8 +3730,8 @@
         </p:nvSpPr>
         <p:spPr>
           <a:xfrm>
-            <a:off x="2330245" y="3637936"/>
-            <a:ext cx="6558116" cy="1754326"/>
+            <a:off x="2434417" y="2880660"/>
+            <a:ext cx="6558116" cy="1477328"/>
           </a:xfrm>
           <a:prstGeom prst="rect">
             <a:avLst/>
@@ -3758,9 +3750,6 @@
             </a:r>
           </a:p>
           <a:p>
-            <a:endParaRPr kumimoji="1" lang="en-US" altLang="ja-JP" dirty="0" smtClean="0"/>
-          </a:p>
-          <a:p>
             <a:r>
               <a:rPr kumimoji="1" lang="en-US" altLang="ja-JP" dirty="0" smtClean="0"/>
               <a:t>When you use;</a:t>
@@ -3854,6 +3843,114 @@
               <a:t>00000003</a:t>
             </a:r>
             <a:endParaRPr kumimoji="1" lang="ja-JP" altLang="en-US" dirty="0"/>
+          </a:p>
+        </p:txBody>
+      </p:sp>
+      <p:sp>
+        <p:nvSpPr>
+          <p:cNvPr id="2" name="テキスト ボックス 1"/>
+          <p:cNvSpPr txBox="1"/>
+          <p:nvPr/>
+        </p:nvSpPr>
+        <p:spPr>
+          <a:xfrm>
+            <a:off x="1285117" y="4450586"/>
+            <a:ext cx="10324291" cy="2246769"/>
+          </a:xfrm>
+          <a:prstGeom prst="rect">
+            <a:avLst/>
+          </a:prstGeom>
+          <a:noFill/>
+          <a:ln>
+            <a:solidFill>
+              <a:srgbClr val="0000CC"/>
+            </a:solidFill>
+          </a:ln>
+        </p:spPr>
+        <p:txBody>
+          <a:bodyPr wrap="square" rtlCol="0">
+            <a:spAutoFit/>
+          </a:bodyPr>
+          <a:lstStyle/>
+          <a:p>
+            <a:r>
+              <a:rPr kumimoji="1" lang="en-US" altLang="ja-JP" sz="2800" dirty="0" smtClean="0"/>
+              <a:t>2015.4.15</a:t>
+            </a:r>
+          </a:p>
+          <a:p>
+            <a:r>
+              <a:rPr lang="en-US" altLang="ja-JP" sz="2800" b="1" dirty="0" smtClean="0"/>
+              <a:t>For tt5r028.bit firmware, the setting value should be different.</a:t>
+            </a:r>
+          </a:p>
+          <a:p>
+            <a:r>
+              <a:rPr lang="en-US" altLang="ja-JP" sz="2800" strike="sngStrike" dirty="0"/>
+              <a:t>Slot A and B : </a:t>
+            </a:r>
+            <a:r>
+              <a:rPr lang="en-US" altLang="ja-JP" sz="2800" strike="sngStrike" dirty="0" err="1"/>
+              <a:t>copper_CPU</a:t>
+            </a:r>
+            <a:r>
+              <a:rPr lang="en-US" altLang="ja-JP" sz="2800" strike="sngStrike" dirty="0"/>
+              <a:t> $ </a:t>
+            </a:r>
+            <a:r>
+              <a:rPr lang="en-US" altLang="ja-JP" sz="2800" strike="sngStrike" dirty="0" err="1"/>
+              <a:t>regrx</a:t>
+            </a:r>
+            <a:r>
+              <a:rPr lang="en-US" altLang="ja-JP" sz="2800" strike="sngStrike" dirty="0"/>
+              <a:t> 130 </a:t>
+            </a:r>
+            <a:r>
+              <a:rPr lang="en-US" altLang="ja-JP" sz="2800" strike="sngStrike" dirty="0" smtClean="0"/>
+              <a:t>00000003</a:t>
+            </a:r>
+          </a:p>
+          <a:p>
+            <a:r>
+              <a:rPr lang="en-US" altLang="ja-JP" sz="2800" dirty="0"/>
+              <a:t>Slot A and B : </a:t>
+            </a:r>
+            <a:r>
+              <a:rPr lang="en-US" altLang="ja-JP" sz="2800" dirty="0" err="1"/>
+              <a:t>copper_CPU</a:t>
+            </a:r>
+            <a:r>
+              <a:rPr lang="en-US" altLang="ja-JP" sz="2800" dirty="0"/>
+              <a:t> $ </a:t>
+            </a:r>
+            <a:r>
+              <a:rPr lang="en-US" altLang="ja-JP" sz="2800" dirty="0" err="1"/>
+              <a:t>regrx</a:t>
+            </a:r>
+            <a:r>
+              <a:rPr lang="en-US" altLang="ja-JP" sz="2800" dirty="0"/>
+              <a:t> 130 </a:t>
+            </a:r>
+            <a:r>
+              <a:rPr lang="en-US" altLang="ja-JP" sz="2800" dirty="0" smtClean="0"/>
+              <a:t>00002503</a:t>
+            </a:r>
+            <a:endParaRPr lang="en-US" altLang="ja-JP" sz="2800" dirty="0"/>
+          </a:p>
+          <a:p>
+            <a:r>
+              <a:rPr lang="en-US" altLang="ja-JP" sz="2800" b="1" dirty="0" smtClean="0"/>
+              <a:t>Please ask </a:t>
+            </a:r>
+            <a:r>
+              <a:rPr lang="en-US" altLang="ja-JP" sz="2800" b="1" dirty="0" err="1" smtClean="0"/>
+              <a:t>Nakao</a:t>
+            </a:r>
+            <a:r>
+              <a:rPr lang="en-US" altLang="ja-JP" sz="2800" b="1" dirty="0" smtClean="0"/>
+              <a:t>-san about details.</a:t>
+            </a:r>
+            <a:endParaRPr kumimoji="1" lang="ja-JP" altLang="en-US" sz="2800" b="1" dirty="0"/>
           </a:p>
         </p:txBody>
       </p:sp>
@@ -11419,11 +11516,7 @@
           <a:p>
             <a:r>
               <a:rPr kumimoji="1" lang="en-US" altLang="ja-JP" sz="3600" u="sng" dirty="0" smtClean="0"/>
-              <a:t>Revision </a:t>
-            </a:r>
-            <a:r>
-              <a:rPr kumimoji="1" lang="en-US" altLang="ja-JP" sz="3600" u="sng" dirty="0" smtClean="0"/>
-              <a:t>history(1)</a:t>
+              <a:t>Revision history(1)</a:t>
             </a:r>
             <a:endParaRPr kumimoji="1" lang="ja-JP" altLang="en-US" sz="3600" u="sng" dirty="0"/>
           </a:p>
@@ -11935,11 +12028,7 @@
           <a:p>
             <a:r>
               <a:rPr kumimoji="1" lang="en-US" altLang="ja-JP" sz="3600" u="sng" dirty="0" smtClean="0"/>
-              <a:t>Revision </a:t>
-            </a:r>
-            <a:r>
-              <a:rPr kumimoji="1" lang="en-US" altLang="ja-JP" sz="3600" u="sng" dirty="0" smtClean="0"/>
-              <a:t>history(2)</a:t>
+              <a:t>Revision history(2)</a:t>
             </a:r>
             <a:endParaRPr kumimoji="1" lang="ja-JP" altLang="en-US" sz="3600" u="sng" dirty="0"/>
           </a:p>

</xml_diff>

<commit_message>
Modify instruction about commeinting out a Sconscript line
git-svn-id: https://belle2.cc.kek.jp/svn/trunk/software@17332 b38c6c8f-bee8-465d-8448-9abe6915d496
</commit_message>
<xml_diff>
--- a/daq/copper/doc/SetupPocketDAQ_4_DAQsoftware.pptx
+++ b/daq/copper/doc/SetupPocketDAQ_4_DAQsoftware.pptx
@@ -271,7 +271,7 @@
           <a:p>
             <a:fld id="{1A984C01-8EE0-44F4-B595-752AEE56780B}" type="datetimeFigureOut">
               <a:rPr kumimoji="1" lang="ja-JP" altLang="en-US" smtClean="0"/>
-              <a:t>2015/4/15</a:t>
+              <a:t>2015/4/23</a:t>
             </a:fld>
             <a:endParaRPr kumimoji="1" lang="ja-JP" altLang="en-US"/>
           </a:p>
@@ -473,7 +473,7 @@
           <a:p>
             <a:fld id="{1A984C01-8EE0-44F4-B595-752AEE56780B}" type="datetimeFigureOut">
               <a:rPr kumimoji="1" lang="ja-JP" altLang="en-US" smtClean="0"/>
-              <a:t>2015/4/15</a:t>
+              <a:t>2015/4/23</a:t>
             </a:fld>
             <a:endParaRPr kumimoji="1" lang="ja-JP" altLang="en-US"/>
           </a:p>
@@ -685,7 +685,7 @@
           <a:p>
             <a:fld id="{1A984C01-8EE0-44F4-B595-752AEE56780B}" type="datetimeFigureOut">
               <a:rPr kumimoji="1" lang="ja-JP" altLang="en-US" smtClean="0"/>
-              <a:t>2015/4/15</a:t>
+              <a:t>2015/4/23</a:t>
             </a:fld>
             <a:endParaRPr kumimoji="1" lang="ja-JP" altLang="en-US"/>
           </a:p>
@@ -887,7 +887,7 @@
           <a:p>
             <a:fld id="{1A984C01-8EE0-44F4-B595-752AEE56780B}" type="datetimeFigureOut">
               <a:rPr kumimoji="1" lang="ja-JP" altLang="en-US" smtClean="0"/>
-              <a:t>2015/4/15</a:t>
+              <a:t>2015/4/23</a:t>
             </a:fld>
             <a:endParaRPr kumimoji="1" lang="ja-JP" altLang="en-US"/>
           </a:p>
@@ -1133,7 +1133,7 @@
           <a:p>
             <a:fld id="{1A984C01-8EE0-44F4-B595-752AEE56780B}" type="datetimeFigureOut">
               <a:rPr kumimoji="1" lang="ja-JP" altLang="en-US" smtClean="0"/>
-              <a:t>2015/4/15</a:t>
+              <a:t>2015/4/23</a:t>
             </a:fld>
             <a:endParaRPr kumimoji="1" lang="ja-JP" altLang="en-US"/>
           </a:p>
@@ -1429,7 +1429,7 @@
           <a:p>
             <a:fld id="{1A984C01-8EE0-44F4-B595-752AEE56780B}" type="datetimeFigureOut">
               <a:rPr kumimoji="1" lang="ja-JP" altLang="en-US" smtClean="0"/>
-              <a:t>2015/4/15</a:t>
+              <a:t>2015/4/23</a:t>
             </a:fld>
             <a:endParaRPr kumimoji="1" lang="ja-JP" altLang="en-US"/>
           </a:p>
@@ -1860,7 +1860,7 @@
           <a:p>
             <a:fld id="{1A984C01-8EE0-44F4-B595-752AEE56780B}" type="datetimeFigureOut">
               <a:rPr kumimoji="1" lang="ja-JP" altLang="en-US" smtClean="0"/>
-              <a:t>2015/4/15</a:t>
+              <a:t>2015/4/23</a:t>
             </a:fld>
             <a:endParaRPr kumimoji="1" lang="ja-JP" altLang="en-US"/>
           </a:p>
@@ -1978,7 +1978,7 @@
           <a:p>
             <a:fld id="{1A984C01-8EE0-44F4-B595-752AEE56780B}" type="datetimeFigureOut">
               <a:rPr kumimoji="1" lang="ja-JP" altLang="en-US" smtClean="0"/>
-              <a:t>2015/4/15</a:t>
+              <a:t>2015/4/23</a:t>
             </a:fld>
             <a:endParaRPr kumimoji="1" lang="ja-JP" altLang="en-US"/>
           </a:p>
@@ -2073,7 +2073,7 @@
           <a:p>
             <a:fld id="{1A984C01-8EE0-44F4-B595-752AEE56780B}" type="datetimeFigureOut">
               <a:rPr kumimoji="1" lang="ja-JP" altLang="en-US" smtClean="0"/>
-              <a:t>2015/4/15</a:t>
+              <a:t>2015/4/23</a:t>
             </a:fld>
             <a:endParaRPr kumimoji="1" lang="ja-JP" altLang="en-US"/>
           </a:p>
@@ -2382,7 +2382,7 @@
           <a:p>
             <a:fld id="{1A984C01-8EE0-44F4-B595-752AEE56780B}" type="datetimeFigureOut">
               <a:rPr kumimoji="1" lang="ja-JP" altLang="en-US" smtClean="0"/>
-              <a:t>2015/4/15</a:t>
+              <a:t>2015/4/23</a:t>
             </a:fld>
             <a:endParaRPr kumimoji="1" lang="ja-JP" altLang="en-US"/>
           </a:p>
@@ -2635,7 +2635,7 @@
           <a:p>
             <a:fld id="{1A984C01-8EE0-44F4-B595-752AEE56780B}" type="datetimeFigureOut">
               <a:rPr kumimoji="1" lang="ja-JP" altLang="en-US" smtClean="0"/>
-              <a:t>2015/4/15</a:t>
+              <a:t>2015/4/23</a:t>
             </a:fld>
             <a:endParaRPr kumimoji="1" lang="ja-JP" altLang="en-US"/>
           </a:p>
@@ -2880,7 +2880,7 @@
           <a:p>
             <a:fld id="{1A984C01-8EE0-44F4-B595-752AEE56780B}" type="datetimeFigureOut">
               <a:rPr kumimoji="1" lang="ja-JP" altLang="en-US" smtClean="0"/>
-              <a:t>2015/4/15</a:t>
+              <a:t>2015/4/23</a:t>
             </a:fld>
             <a:endParaRPr kumimoji="1" lang="ja-JP" altLang="en-US"/>
           </a:p>
@@ -3348,15 +3348,7 @@
             </a:br>
             <a:r>
               <a:rPr lang="en-US" altLang="ja-JP" sz="2000" dirty="0" smtClean="0"/>
-              <a:t>Apr. </a:t>
-            </a:r>
-            <a:r>
-              <a:rPr lang="en-US" altLang="ja-JP" sz="2000" dirty="0" smtClean="0"/>
-              <a:t>15, </a:t>
-            </a:r>
-            <a:r>
-              <a:rPr lang="en-US" altLang="ja-JP" sz="2000" dirty="0" smtClean="0"/>
-              <a:t>2015 </a:t>
+              <a:t>Apr. 15, 2015 </a:t>
             </a:r>
           </a:p>
           <a:p>
@@ -3843,114 +3835,6 @@
               <a:t>00000003</a:t>
             </a:r>
             <a:endParaRPr kumimoji="1" lang="ja-JP" altLang="en-US" dirty="0"/>
-          </a:p>
-        </p:txBody>
-      </p:sp>
-      <p:sp>
-        <p:nvSpPr>
-          <p:cNvPr id="2" name="テキスト ボックス 1"/>
-          <p:cNvSpPr txBox="1"/>
-          <p:nvPr/>
-        </p:nvSpPr>
-        <p:spPr>
-          <a:xfrm>
-            <a:off x="1285117" y="4450586"/>
-            <a:ext cx="10324291" cy="2246769"/>
-          </a:xfrm>
-          <a:prstGeom prst="rect">
-            <a:avLst/>
-          </a:prstGeom>
-          <a:noFill/>
-          <a:ln>
-            <a:solidFill>
-              <a:srgbClr val="0000CC"/>
-            </a:solidFill>
-          </a:ln>
-        </p:spPr>
-        <p:txBody>
-          <a:bodyPr wrap="square" rtlCol="0">
-            <a:spAutoFit/>
-          </a:bodyPr>
-          <a:lstStyle/>
-          <a:p>
-            <a:r>
-              <a:rPr kumimoji="1" lang="en-US" altLang="ja-JP" sz="2800" dirty="0" smtClean="0"/>
-              <a:t>2015.4.15</a:t>
-            </a:r>
-          </a:p>
-          <a:p>
-            <a:r>
-              <a:rPr lang="en-US" altLang="ja-JP" sz="2800" b="1" dirty="0" smtClean="0"/>
-              <a:t>For tt5r028.bit firmware, the setting value should be different.</a:t>
-            </a:r>
-          </a:p>
-          <a:p>
-            <a:r>
-              <a:rPr lang="en-US" altLang="ja-JP" sz="2800" strike="sngStrike" dirty="0"/>
-              <a:t>Slot A and B : </a:t>
-            </a:r>
-            <a:r>
-              <a:rPr lang="en-US" altLang="ja-JP" sz="2800" strike="sngStrike" dirty="0" err="1"/>
-              <a:t>copper_CPU</a:t>
-            </a:r>
-            <a:r>
-              <a:rPr lang="en-US" altLang="ja-JP" sz="2800" strike="sngStrike" dirty="0"/>
-              <a:t> $ </a:t>
-            </a:r>
-            <a:r>
-              <a:rPr lang="en-US" altLang="ja-JP" sz="2800" strike="sngStrike" dirty="0" err="1"/>
-              <a:t>regrx</a:t>
-            </a:r>
-            <a:r>
-              <a:rPr lang="en-US" altLang="ja-JP" sz="2800" strike="sngStrike" dirty="0"/>
-              <a:t> 130 </a:t>
-            </a:r>
-            <a:r>
-              <a:rPr lang="en-US" altLang="ja-JP" sz="2800" strike="sngStrike" dirty="0" smtClean="0"/>
-              <a:t>00000003</a:t>
-            </a:r>
-          </a:p>
-          <a:p>
-            <a:r>
-              <a:rPr lang="en-US" altLang="ja-JP" sz="2800" dirty="0"/>
-              <a:t>Slot A and B : </a:t>
-            </a:r>
-            <a:r>
-              <a:rPr lang="en-US" altLang="ja-JP" sz="2800" dirty="0" err="1"/>
-              <a:t>copper_CPU</a:t>
-            </a:r>
-            <a:r>
-              <a:rPr lang="en-US" altLang="ja-JP" sz="2800" dirty="0"/>
-              <a:t> $ </a:t>
-            </a:r>
-            <a:r>
-              <a:rPr lang="en-US" altLang="ja-JP" sz="2800" dirty="0" err="1"/>
-              <a:t>regrx</a:t>
-            </a:r>
-            <a:r>
-              <a:rPr lang="en-US" altLang="ja-JP" sz="2800" dirty="0"/>
-              <a:t> 130 </a:t>
-            </a:r>
-            <a:r>
-              <a:rPr lang="en-US" altLang="ja-JP" sz="2800" dirty="0" smtClean="0"/>
-              <a:t>00002503</a:t>
-            </a:r>
-            <a:endParaRPr lang="en-US" altLang="ja-JP" sz="2800" dirty="0"/>
-          </a:p>
-          <a:p>
-            <a:r>
-              <a:rPr lang="en-US" altLang="ja-JP" sz="2800" b="1" dirty="0" smtClean="0"/>
-              <a:t>Please ask </a:t>
-            </a:r>
-            <a:r>
-              <a:rPr lang="en-US" altLang="ja-JP" sz="2800" b="1" dirty="0" err="1" smtClean="0"/>
-              <a:t>Nakao</a:t>
-            </a:r>
-            <a:r>
-              <a:rPr lang="en-US" altLang="ja-JP" sz="2800" b="1" dirty="0" smtClean="0"/>
-              <a:t>-san about details.</a:t>
-            </a:r>
-            <a:endParaRPr kumimoji="1" lang="ja-JP" altLang="en-US" sz="2800" b="1" dirty="0"/>
           </a:p>
         </p:txBody>
       </p:sp>
@@ -20265,8 +20149,8 @@
               <a:t> and </a:t>
             </a:r>
             <a:r>
-              <a:rPr lang="en-US" altLang="ja-JP" dirty="0"/>
-              <a:t>check if </a:t>
+              <a:rPr lang="en-US" altLang="ja-JP" dirty="0" smtClean="0"/>
+              <a:t>comment out “if </a:t>
             </a:r>
             <a:r>
               <a:rPr lang="en-US" altLang="ja-JP" dirty="0" err="1"/>
@@ -20278,8 +20162,9 @@
             </a:r>
             <a:r>
               <a:rPr lang="en-US" altLang="ja-JP" dirty="0" smtClean="0"/>
-              <a:t>False is commented out.</a:t>
-            </a:r>
+              <a:t>False” line.</a:t>
+            </a:r>
+            <a:endParaRPr lang="en-US" altLang="ja-JP" dirty="0" smtClean="0"/>
           </a:p>
           <a:p>
             <a:pPr lvl="1"/>
@@ -20782,7 +20667,7 @@
         <a:sysClr val="windowText" lastClr="000000"/>
       </a:dk1>
       <a:lt1>
-        <a:sysClr val="window" lastClr="C0C0C0"/>
+        <a:sysClr val="window" lastClr="E0E0E0"/>
       </a:lt1>
       <a:dk2>
         <a:srgbClr val="44546A"/>

</xml_diff>

<commit_message>
Comment out NONSTOP definition in DAQConsts.h for PocketDAQ
git-svn-id: https://belle2.cc.kek.jp/svn/trunk/software@25608 b38c6c8f-bee8-465d-8448-9abe6915d496
</commit_message>
<xml_diff>
--- a/daq/copper/doc/SetupPocketDAQ_4_DAQsoftware.pptx
+++ b/daq/copper/doc/SetupPocketDAQ_4_DAQsoftware.pptx
@@ -274,7 +274,7 @@
           <a:p>
             <a:fld id="{1A984C01-8EE0-44F4-B595-752AEE56780B}" type="datetimeFigureOut">
               <a:rPr kumimoji="1" lang="ja-JP" altLang="en-US" smtClean="0"/>
-              <a:t>2015/7/14</a:t>
+              <a:t>2016/2/22</a:t>
             </a:fld>
             <a:endParaRPr kumimoji="1" lang="ja-JP" altLang="en-US"/>
           </a:p>
@@ -476,7 +476,7 @@
           <a:p>
             <a:fld id="{1A984C01-8EE0-44F4-B595-752AEE56780B}" type="datetimeFigureOut">
               <a:rPr kumimoji="1" lang="ja-JP" altLang="en-US" smtClean="0"/>
-              <a:t>2015/7/14</a:t>
+              <a:t>2016/2/22</a:t>
             </a:fld>
             <a:endParaRPr kumimoji="1" lang="ja-JP" altLang="en-US"/>
           </a:p>
@@ -688,7 +688,7 @@
           <a:p>
             <a:fld id="{1A984C01-8EE0-44F4-B595-752AEE56780B}" type="datetimeFigureOut">
               <a:rPr kumimoji="1" lang="ja-JP" altLang="en-US" smtClean="0"/>
-              <a:t>2015/7/14</a:t>
+              <a:t>2016/2/22</a:t>
             </a:fld>
             <a:endParaRPr kumimoji="1" lang="ja-JP" altLang="en-US"/>
           </a:p>
@@ -890,7 +890,7 @@
           <a:p>
             <a:fld id="{1A984C01-8EE0-44F4-B595-752AEE56780B}" type="datetimeFigureOut">
               <a:rPr kumimoji="1" lang="ja-JP" altLang="en-US" smtClean="0"/>
-              <a:t>2015/7/14</a:t>
+              <a:t>2016/2/22</a:t>
             </a:fld>
             <a:endParaRPr kumimoji="1" lang="ja-JP" altLang="en-US"/>
           </a:p>
@@ -1136,7 +1136,7 @@
           <a:p>
             <a:fld id="{1A984C01-8EE0-44F4-B595-752AEE56780B}" type="datetimeFigureOut">
               <a:rPr kumimoji="1" lang="ja-JP" altLang="en-US" smtClean="0"/>
-              <a:t>2015/7/14</a:t>
+              <a:t>2016/2/22</a:t>
             </a:fld>
             <a:endParaRPr kumimoji="1" lang="ja-JP" altLang="en-US"/>
           </a:p>
@@ -1432,7 +1432,7 @@
           <a:p>
             <a:fld id="{1A984C01-8EE0-44F4-B595-752AEE56780B}" type="datetimeFigureOut">
               <a:rPr kumimoji="1" lang="ja-JP" altLang="en-US" smtClean="0"/>
-              <a:t>2015/7/14</a:t>
+              <a:t>2016/2/22</a:t>
             </a:fld>
             <a:endParaRPr kumimoji="1" lang="ja-JP" altLang="en-US"/>
           </a:p>
@@ -1863,7 +1863,7 @@
           <a:p>
             <a:fld id="{1A984C01-8EE0-44F4-B595-752AEE56780B}" type="datetimeFigureOut">
               <a:rPr kumimoji="1" lang="ja-JP" altLang="en-US" smtClean="0"/>
-              <a:t>2015/7/14</a:t>
+              <a:t>2016/2/22</a:t>
             </a:fld>
             <a:endParaRPr kumimoji="1" lang="ja-JP" altLang="en-US"/>
           </a:p>
@@ -1981,7 +1981,7 @@
           <a:p>
             <a:fld id="{1A984C01-8EE0-44F4-B595-752AEE56780B}" type="datetimeFigureOut">
               <a:rPr kumimoji="1" lang="ja-JP" altLang="en-US" smtClean="0"/>
-              <a:t>2015/7/14</a:t>
+              <a:t>2016/2/22</a:t>
             </a:fld>
             <a:endParaRPr kumimoji="1" lang="ja-JP" altLang="en-US"/>
           </a:p>
@@ -2076,7 +2076,7 @@
           <a:p>
             <a:fld id="{1A984C01-8EE0-44F4-B595-752AEE56780B}" type="datetimeFigureOut">
               <a:rPr kumimoji="1" lang="ja-JP" altLang="en-US" smtClean="0"/>
-              <a:t>2015/7/14</a:t>
+              <a:t>2016/2/22</a:t>
             </a:fld>
             <a:endParaRPr kumimoji="1" lang="ja-JP" altLang="en-US"/>
           </a:p>
@@ -2385,7 +2385,7 @@
           <a:p>
             <a:fld id="{1A984C01-8EE0-44F4-B595-752AEE56780B}" type="datetimeFigureOut">
               <a:rPr kumimoji="1" lang="ja-JP" altLang="en-US" smtClean="0"/>
-              <a:t>2015/7/14</a:t>
+              <a:t>2016/2/22</a:t>
             </a:fld>
             <a:endParaRPr kumimoji="1" lang="ja-JP" altLang="en-US"/>
           </a:p>
@@ -2638,7 +2638,7 @@
           <a:p>
             <a:fld id="{1A984C01-8EE0-44F4-B595-752AEE56780B}" type="datetimeFigureOut">
               <a:rPr kumimoji="1" lang="ja-JP" altLang="en-US" smtClean="0"/>
-              <a:t>2015/7/14</a:t>
+              <a:t>2016/2/22</a:t>
             </a:fld>
             <a:endParaRPr kumimoji="1" lang="ja-JP" altLang="en-US"/>
           </a:p>
@@ -2883,7 +2883,7 @@
           <a:p>
             <a:fld id="{1A984C01-8EE0-44F4-B595-752AEE56780B}" type="datetimeFigureOut">
               <a:rPr kumimoji="1" lang="ja-JP" altLang="en-US" smtClean="0"/>
-              <a:t>2015/7/14</a:t>
+              <a:t>2016/2/22</a:t>
             </a:fld>
             <a:endParaRPr kumimoji="1" lang="ja-JP" altLang="en-US"/>
           </a:p>
@@ -3351,11 +3351,7 @@
             </a:br>
             <a:r>
               <a:rPr lang="en-US" altLang="ja-JP" sz="2000" dirty="0" smtClean="0"/>
-              <a:t>July 14, </a:t>
-            </a:r>
-            <a:r>
-              <a:rPr lang="en-US" altLang="ja-JP" sz="2000" dirty="0" smtClean="0"/>
-              <a:t>2015 </a:t>
+              <a:t>July 14, 2015 </a:t>
             </a:r>
           </a:p>
           <a:p>
@@ -3723,8 +3719,8 @@
         </p:nvSpPr>
         <p:spPr>
           <a:xfrm>
-            <a:off x="0" y="0"/>
-            <a:ext cx="10515600" cy="746791"/>
+            <a:off x="381000" y="240664"/>
+            <a:ext cx="10515600" cy="556927"/>
           </a:xfrm>
         </p:spPr>
         <p:txBody>
@@ -3734,18 +3730,18 @@
           <a:lstStyle/>
           <a:p>
             <a:r>
-              <a:rPr lang="en-US" altLang="ja-JP" sz="3200" b="1" u="sng" dirty="0" smtClean="0"/>
+              <a:rPr lang="en-US" altLang="ja-JP" sz="2400" b="1" u="sng" dirty="0" smtClean="0"/>
               <a:t>Notice from Konno-san about compiling </a:t>
             </a:r>
             <a:r>
-              <a:rPr lang="en-US" altLang="ja-JP" sz="3200" b="1" u="sng" dirty="0" err="1" smtClean="0"/>
+              <a:rPr lang="en-US" altLang="ja-JP" sz="2400" b="1" u="sng" dirty="0" err="1" smtClean="0"/>
               <a:t>daq</a:t>
             </a:r>
             <a:r>
-              <a:rPr lang="en-US" altLang="ja-JP" sz="3200" b="1" u="sng" dirty="0" smtClean="0"/>
+              <a:rPr lang="en-US" altLang="ja-JP" sz="2400" b="1" u="sng" dirty="0" smtClean="0"/>
               <a:t> package</a:t>
             </a:r>
-            <a:endParaRPr kumimoji="1" lang="ja-JP" altLang="en-US" sz="3200" b="1" u="sng" dirty="0"/>
+            <a:endParaRPr kumimoji="1" lang="ja-JP" altLang="en-US" sz="2400" b="1" u="sng" dirty="0"/>
           </a:p>
         </p:txBody>
       </p:sp>
@@ -3761,22 +3757,22 @@
         </p:nvSpPr>
         <p:spPr>
           <a:xfrm>
-            <a:off x="797514" y="1493582"/>
-            <a:ext cx="10515600" cy="4351338"/>
+            <a:off x="645114" y="797591"/>
+            <a:ext cx="9603786" cy="3228309"/>
           </a:xfrm>
         </p:spPr>
         <p:txBody>
           <a:bodyPr>
-            <a:normAutofit lnSpcReduction="10000"/>
+            <a:normAutofit/>
           </a:bodyPr>
           <a:lstStyle/>
           <a:p>
             <a:r>
-              <a:rPr lang="en-US" altLang="ja-JP" dirty="0"/>
+              <a:rPr lang="en-US" altLang="ja-JP" sz="1800" dirty="0"/>
               <a:t>Please </a:t>
             </a:r>
             <a:r>
-              <a:rPr lang="en-US" altLang="ja-JP" dirty="0" smtClean="0"/>
+              <a:rPr lang="en-US" altLang="ja-JP" sz="1800" dirty="0" smtClean="0"/>
               <a:t>run the following command to update nsm2 programs in your external directory</a:t>
             </a:r>
           </a:p>
@@ -3785,23 +3781,23 @@
               <a:buNone/>
             </a:pPr>
             <a:r>
-              <a:rPr lang="en-US" altLang="ja-JP" dirty="0" smtClean="0"/>
+              <a:rPr lang="en-US" altLang="ja-JP" sz="1800" dirty="0" smtClean="0"/>
               <a:t>$ </a:t>
             </a:r>
             <a:r>
-              <a:rPr lang="en-US" altLang="ja-JP" dirty="0"/>
+              <a:rPr lang="en-US" altLang="ja-JP" sz="1800" dirty="0"/>
               <a:t>source </a:t>
             </a:r>
             <a:r>
-              <a:rPr lang="en-US" altLang="ja-JP" dirty="0" smtClean="0"/>
+              <a:rPr lang="en-US" altLang="ja-JP" sz="1800" dirty="0" smtClean="0"/>
               <a:t>${</a:t>
             </a:r>
             <a:r>
-              <a:rPr lang="en-US" altLang="ja-JP" dirty="0"/>
+              <a:rPr lang="en-US" altLang="ja-JP" sz="1800" dirty="0"/>
               <a:t>BELLE2_LOCAL_DIR}/ </a:t>
             </a:r>
             <a:r>
-              <a:rPr lang="en-US" altLang="ja-JP" dirty="0" smtClean="0"/>
+              <a:rPr lang="en-US" altLang="ja-JP" sz="1800" dirty="0" smtClean="0"/>
               <a:t>daq/slc/extra/nsm2/export.sh</a:t>
             </a:r>
           </a:p>
@@ -3809,14 +3805,14 @@
             <a:pPr marL="0" indent="0">
               <a:buNone/>
             </a:pPr>
-            <a:endParaRPr kumimoji="1" lang="en-US" altLang="ja-JP" dirty="0" smtClean="0"/>
+            <a:endParaRPr kumimoji="1" lang="en-US" altLang="ja-JP" sz="1800" dirty="0" smtClean="0"/>
           </a:p>
           <a:p>
             <a:pPr marL="0" indent="0">
               <a:buNone/>
             </a:pPr>
             <a:r>
-              <a:rPr lang="en-US" altLang="ja-JP" dirty="0" smtClean="0"/>
+              <a:rPr lang="en-US" altLang="ja-JP" sz="1800" dirty="0" smtClean="0"/>
               <a:t>Otherwise you may get error messages about compilation of slow control programs ;</a:t>
             </a:r>
           </a:p>
@@ -3825,63 +3821,63 @@
               <a:buNone/>
             </a:pPr>
             <a:r>
-              <a:rPr lang="en-US" altLang="ja-JP" sz="1900" i="1" dirty="0" err="1" smtClean="0"/>
+              <a:rPr lang="en-US" altLang="ja-JP" sz="1800" i="1" dirty="0" err="1" smtClean="0"/>
               <a:t>daq</a:t>
             </a:r>
             <a:r>
-              <a:rPr lang="en-US" altLang="ja-JP" sz="1900" i="1" dirty="0" smtClean="0"/>
+              <a:rPr lang="en-US" altLang="ja-JP" sz="1800" i="1" dirty="0" smtClean="0"/>
               <a:t>/</a:t>
             </a:r>
             <a:r>
-              <a:rPr lang="en-US" altLang="ja-JP" sz="1900" i="1" dirty="0" err="1" smtClean="0"/>
+              <a:rPr lang="en-US" altLang="ja-JP" sz="1800" i="1" dirty="0" err="1" smtClean="0"/>
               <a:t>slc</a:t>
             </a:r>
             <a:r>
-              <a:rPr lang="en-US" altLang="ja-JP" sz="1900" i="1" dirty="0" smtClean="0"/>
+              <a:rPr lang="en-US" altLang="ja-JP" sz="1800" i="1" dirty="0" smtClean="0"/>
               <a:t>/</a:t>
             </a:r>
             <a:r>
-              <a:rPr lang="en-US" altLang="ja-JP" sz="1900" i="1" dirty="0" err="1" smtClean="0"/>
+              <a:rPr lang="en-US" altLang="ja-JP" sz="1800" i="1" dirty="0" err="1" smtClean="0"/>
               <a:t>nsm</a:t>
             </a:r>
             <a:r>
-              <a:rPr lang="en-US" altLang="ja-JP" sz="1900" i="1" dirty="0" smtClean="0"/>
+              <a:rPr lang="en-US" altLang="ja-JP" sz="1800" i="1" dirty="0" smtClean="0"/>
               <a:t>/</a:t>
             </a:r>
             <a:r>
-              <a:rPr lang="en-US" altLang="ja-JP" sz="1900" i="1" dirty="0" err="1" smtClean="0"/>
+              <a:rPr lang="en-US" altLang="ja-JP" sz="1800" i="1" dirty="0" err="1" smtClean="0"/>
               <a:t>src</a:t>
             </a:r>
             <a:r>
-              <a:rPr lang="en-US" altLang="ja-JP" sz="1900" i="1" dirty="0" smtClean="0"/>
+              <a:rPr lang="en-US" altLang="ja-JP" sz="1800" i="1" dirty="0" smtClean="0"/>
               <a:t>/NSMData.cc</a:t>
             </a:r>
             <a:r>
-              <a:rPr lang="en-US" altLang="ja-JP" sz="1900" i="1" dirty="0"/>
+              <a:rPr lang="en-US" altLang="ja-JP" sz="1800" i="1" dirty="0"/>
               <a:t>: In member function 'void* Belle2::</a:t>
             </a:r>
             <a:r>
-              <a:rPr lang="en-US" altLang="ja-JP" sz="1900" i="1" dirty="0" err="1"/>
+              <a:rPr lang="en-US" altLang="ja-JP" sz="1800" i="1" dirty="0" err="1"/>
               <a:t>NSMData</a:t>
             </a:r>
             <a:r>
-              <a:rPr lang="en-US" altLang="ja-JP" sz="1900" i="1" dirty="0"/>
+              <a:rPr lang="en-US" altLang="ja-JP" sz="1800" i="1" dirty="0"/>
               <a:t>::parse(</a:t>
             </a:r>
             <a:r>
-              <a:rPr lang="en-US" altLang="ja-JP" sz="1900" i="1" dirty="0" err="1"/>
+              <a:rPr lang="en-US" altLang="ja-JP" sz="1800" i="1" dirty="0" err="1"/>
               <a:t>const</a:t>
             </a:r>
             <a:r>
-              <a:rPr lang="en-US" altLang="ja-JP" sz="1900" i="1" dirty="0"/>
+              <a:rPr lang="en-US" altLang="ja-JP" sz="1800" i="1" dirty="0"/>
               <a:t> char*, </a:t>
             </a:r>
             <a:r>
-              <a:rPr lang="en-US" altLang="ja-JP" sz="1900" i="1" dirty="0" err="1"/>
+              <a:rPr lang="en-US" altLang="ja-JP" sz="1800" i="1" dirty="0" err="1"/>
               <a:t>bool</a:t>
             </a:r>
             <a:r>
-              <a:rPr lang="en-US" altLang="ja-JP" sz="1900" i="1" dirty="0"/>
+              <a:rPr lang="en-US" altLang="ja-JP" sz="1800" i="1" dirty="0"/>
               <a:t>)':</a:t>
             </a:r>
           </a:p>
@@ -3890,75 +3886,75 @@
               <a:buNone/>
             </a:pPr>
             <a:r>
-              <a:rPr lang="en-US" altLang="ja-JP" sz="1900" i="1" dirty="0" err="1"/>
+              <a:rPr lang="en-US" altLang="ja-JP" sz="1800" i="1" dirty="0" err="1"/>
               <a:t>daq</a:t>
             </a:r>
             <a:r>
-              <a:rPr lang="en-US" altLang="ja-JP" sz="1900" i="1" dirty="0"/>
+              <a:rPr lang="en-US" altLang="ja-JP" sz="1800" i="1" dirty="0"/>
               <a:t>/</a:t>
             </a:r>
             <a:r>
-              <a:rPr lang="en-US" altLang="ja-JP" sz="1900" i="1" dirty="0" err="1"/>
+              <a:rPr lang="en-US" altLang="ja-JP" sz="1800" i="1" dirty="0" err="1"/>
               <a:t>slc</a:t>
             </a:r>
             <a:r>
-              <a:rPr lang="en-US" altLang="ja-JP" sz="1900" i="1" dirty="0"/>
+              <a:rPr lang="en-US" altLang="ja-JP" sz="1800" i="1" dirty="0"/>
               <a:t>/</a:t>
             </a:r>
             <a:r>
-              <a:rPr lang="en-US" altLang="ja-JP" sz="1900" i="1" dirty="0" err="1"/>
+              <a:rPr lang="en-US" altLang="ja-JP" sz="1800" i="1" dirty="0" err="1"/>
               <a:t>nsm</a:t>
             </a:r>
             <a:r>
-              <a:rPr lang="en-US" altLang="ja-JP" sz="1900" i="1" dirty="0"/>
+              <a:rPr lang="en-US" altLang="ja-JP" sz="1800" i="1" dirty="0"/>
               <a:t>/</a:t>
             </a:r>
             <a:r>
-              <a:rPr lang="en-US" altLang="ja-JP" sz="1900" i="1" dirty="0" err="1"/>
+              <a:rPr lang="en-US" altLang="ja-JP" sz="1800" i="1" dirty="0" err="1"/>
               <a:t>src</a:t>
             </a:r>
             <a:r>
-              <a:rPr lang="en-US" altLang="ja-JP" sz="1900" i="1" dirty="0"/>
+              <a:rPr lang="en-US" altLang="ja-JP" sz="1800" i="1" dirty="0"/>
               <a:t>/NSMData.cc:299:68: error: too many arguments to function '</a:t>
             </a:r>
             <a:r>
-              <a:rPr lang="en-US" altLang="ja-JP" sz="1900" i="1" dirty="0" err="1"/>
+              <a:rPr lang="en-US" altLang="ja-JP" sz="1800" i="1" dirty="0" err="1"/>
               <a:t>NSMparse</a:t>
             </a:r>
             <a:r>
-              <a:rPr lang="en-US" altLang="ja-JP" sz="1900" i="1" dirty="0"/>
+              <a:rPr lang="en-US" altLang="ja-JP" sz="1800" i="1" dirty="0"/>
               <a:t>* </a:t>
             </a:r>
             <a:r>
-              <a:rPr lang="en-US" altLang="ja-JP" sz="1900" i="1" dirty="0" err="1"/>
+              <a:rPr lang="en-US" altLang="ja-JP" sz="1800" i="1" dirty="0" err="1"/>
               <a:t>nsmlib_parsefile</a:t>
             </a:r>
             <a:r>
-              <a:rPr lang="en-US" altLang="ja-JP" sz="1900" i="1" dirty="0"/>
+              <a:rPr lang="en-US" altLang="ja-JP" sz="1800" i="1" dirty="0"/>
               <a:t>(</a:t>
             </a:r>
             <a:r>
-              <a:rPr lang="en-US" altLang="ja-JP" sz="1900" i="1" dirty="0" err="1"/>
+              <a:rPr lang="en-US" altLang="ja-JP" sz="1800" i="1" dirty="0" err="1"/>
               <a:t>const</a:t>
             </a:r>
             <a:r>
-              <a:rPr lang="en-US" altLang="ja-JP" sz="1900" i="1" dirty="0"/>
+              <a:rPr lang="en-US" altLang="ja-JP" sz="1800" i="1" dirty="0"/>
               <a:t> char*, </a:t>
             </a:r>
             <a:r>
-              <a:rPr lang="en-US" altLang="ja-JP" sz="1900" i="1" dirty="0" err="1"/>
+              <a:rPr lang="en-US" altLang="ja-JP" sz="1800" i="1" dirty="0" err="1"/>
               <a:t>int</a:t>
             </a:r>
             <a:r>
-              <a:rPr lang="en-US" altLang="ja-JP" sz="1900" i="1" dirty="0"/>
+              <a:rPr lang="en-US" altLang="ja-JP" sz="1800" i="1" dirty="0"/>
               <a:t>, </a:t>
             </a:r>
             <a:r>
-              <a:rPr lang="en-US" altLang="ja-JP" sz="1900" i="1" dirty="0" err="1"/>
+              <a:rPr lang="en-US" altLang="ja-JP" sz="1800" i="1" dirty="0" err="1"/>
               <a:t>const</a:t>
             </a:r>
             <a:r>
-              <a:rPr lang="en-US" altLang="ja-JP" sz="1900" i="1" dirty="0"/>
+              <a:rPr lang="en-US" altLang="ja-JP" sz="1800" i="1" dirty="0"/>
               <a:t> char*, char*)'</a:t>
             </a:r>
           </a:p>
@@ -3967,31 +3963,31 @@
               <a:buNone/>
             </a:pPr>
             <a:r>
-              <a:rPr lang="en-US" altLang="ja-JP" sz="1900" i="1" dirty="0"/>
+              <a:rPr lang="en-US" altLang="ja-JP" sz="1800" i="1" dirty="0"/>
               <a:t>In file included from include/</a:t>
             </a:r>
             <a:r>
-              <a:rPr lang="en-US" altLang="ja-JP" sz="1900" i="1" dirty="0" err="1"/>
+              <a:rPr lang="en-US" altLang="ja-JP" sz="1800" i="1" dirty="0" err="1"/>
               <a:t>daq</a:t>
             </a:r>
             <a:r>
-              <a:rPr lang="en-US" altLang="ja-JP" sz="1900" i="1" dirty="0"/>
+              <a:rPr lang="en-US" altLang="ja-JP" sz="1800" i="1" dirty="0"/>
               <a:t>/</a:t>
             </a:r>
             <a:r>
-              <a:rPr lang="en-US" altLang="ja-JP" sz="1900" i="1" dirty="0" err="1"/>
+              <a:rPr lang="en-US" altLang="ja-JP" sz="1800" i="1" dirty="0" err="1"/>
               <a:t>slc</a:t>
             </a:r>
             <a:r>
-              <a:rPr lang="en-US" altLang="ja-JP" sz="1900" i="1" dirty="0"/>
+              <a:rPr lang="en-US" altLang="ja-JP" sz="1800" i="1" dirty="0"/>
               <a:t>/</a:t>
             </a:r>
             <a:r>
-              <a:rPr lang="en-US" altLang="ja-JP" sz="1900" i="1" dirty="0" err="1"/>
+              <a:rPr lang="en-US" altLang="ja-JP" sz="1800" i="1" dirty="0" err="1"/>
               <a:t>nsm</a:t>
             </a:r>
             <a:r>
-              <a:rPr lang="en-US" altLang="ja-JP" sz="1900" i="1" dirty="0"/>
+              <a:rPr lang="en-US" altLang="ja-JP" sz="1800" i="1" dirty="0"/>
               <a:t>/NSMData.h:20:0,</a:t>
             </a:r>
           </a:p>
@@ -4000,39 +3996,39 @@
               <a:buNone/>
             </a:pPr>
             <a:r>
-              <a:rPr lang="en-US" altLang="ja-JP" sz="1900" i="1" dirty="0"/>
+              <a:rPr lang="en-US" altLang="ja-JP" sz="1800" i="1" dirty="0"/>
               <a:t>                 from </a:t>
             </a:r>
             <a:r>
-              <a:rPr lang="en-US" altLang="ja-JP" sz="1900" i="1" dirty="0" err="1"/>
+              <a:rPr lang="en-US" altLang="ja-JP" sz="1800" i="1" dirty="0" err="1"/>
               <a:t>daq</a:t>
             </a:r>
             <a:r>
-              <a:rPr lang="en-US" altLang="ja-JP" sz="1900" i="1" dirty="0"/>
+              <a:rPr lang="en-US" altLang="ja-JP" sz="1800" i="1" dirty="0"/>
               <a:t>/</a:t>
             </a:r>
             <a:r>
-              <a:rPr lang="en-US" altLang="ja-JP" sz="1900" i="1" dirty="0" err="1"/>
+              <a:rPr lang="en-US" altLang="ja-JP" sz="1800" i="1" dirty="0" err="1"/>
               <a:t>slc</a:t>
             </a:r>
             <a:r>
-              <a:rPr lang="en-US" altLang="ja-JP" sz="1900" i="1" dirty="0"/>
+              <a:rPr lang="en-US" altLang="ja-JP" sz="1800" i="1" dirty="0"/>
               <a:t>/</a:t>
             </a:r>
             <a:r>
-              <a:rPr lang="en-US" altLang="ja-JP" sz="1900" i="1" dirty="0" err="1"/>
+              <a:rPr lang="en-US" altLang="ja-JP" sz="1800" i="1" dirty="0" err="1"/>
               <a:t>nsm</a:t>
             </a:r>
             <a:r>
-              <a:rPr lang="en-US" altLang="ja-JP" sz="1900" i="1" dirty="0"/>
+              <a:rPr lang="en-US" altLang="ja-JP" sz="1800" i="1" dirty="0"/>
               <a:t>/</a:t>
             </a:r>
             <a:r>
-              <a:rPr lang="en-US" altLang="ja-JP" sz="1900" i="1" dirty="0" err="1"/>
+              <a:rPr lang="en-US" altLang="ja-JP" sz="1800" i="1" dirty="0" err="1"/>
               <a:t>src</a:t>
             </a:r>
             <a:r>
-              <a:rPr lang="en-US" altLang="ja-JP" sz="1900" i="1" dirty="0"/>
+              <a:rPr lang="en-US" altLang="ja-JP" sz="1800" i="1" dirty="0"/>
               <a:t>/NSMData.cc:1:</a:t>
             </a:r>
           </a:p>
@@ -4052,8 +4048,8 @@
         </p:nvSpPr>
         <p:spPr>
           <a:xfrm>
-            <a:off x="331075" y="746791"/>
-            <a:ext cx="2346283" cy="584775"/>
+            <a:off x="0" y="0"/>
+            <a:ext cx="1535870" cy="400110"/>
           </a:xfrm>
           <a:prstGeom prst="rect">
             <a:avLst/>
@@ -4067,14 +4063,173 @@
           <a:lstStyle/>
           <a:p>
             <a:r>
-              <a:rPr kumimoji="1" lang="en-US" altLang="ja-JP" sz="3200" dirty="0" smtClean="0">
+              <a:rPr kumimoji="1" lang="en-US" altLang="ja-JP" sz="2000" dirty="0" smtClean="0">
                 <a:solidFill>
                   <a:srgbClr val="FF0000"/>
                 </a:solidFill>
               </a:rPr>
               <a:t>IMPORTANT!</a:t>
             </a:r>
-            <a:endParaRPr kumimoji="1" lang="ja-JP" altLang="en-US" sz="3200" dirty="0">
+            <a:endParaRPr kumimoji="1" lang="ja-JP" altLang="en-US" sz="2000" dirty="0">
+              <a:solidFill>
+                <a:srgbClr val="FF0000"/>
+              </a:solidFill>
+            </a:endParaRPr>
+          </a:p>
+        </p:txBody>
+      </p:sp>
+      <p:sp>
+        <p:nvSpPr>
+          <p:cNvPr id="5" name="タイトル 1"/>
+          <p:cNvSpPr txBox="1">
+            <a:spLocks/>
+          </p:cNvSpPr>
+          <p:nvPr/>
+        </p:nvSpPr>
+        <p:spPr>
+          <a:xfrm>
+            <a:off x="381000" y="4144917"/>
+            <a:ext cx="10515600" cy="556927"/>
+          </a:xfrm>
+          <a:prstGeom prst="rect">
+            <a:avLst/>
+          </a:prstGeom>
+        </p:spPr>
+        <p:txBody>
+          <a:bodyPr vert="horz" lIns="91440" tIns="45720" rIns="91440" bIns="45720" rtlCol="0" anchor="ctr">
+            <a:normAutofit/>
+          </a:bodyPr>
+          <a:lstStyle>
+            <a:lvl1pPr algn="l" defTabSz="914400" rtl="0" eaLnBrk="1" latinLnBrk="0" hangingPunct="1">
+              <a:lnSpc>
+                <a:spcPct val="90000"/>
+              </a:lnSpc>
+              <a:spcBef>
+                <a:spcPct val="0"/>
+              </a:spcBef>
+              <a:buNone/>
+              <a:defRPr kumimoji="1" sz="4400" kern="1200">
+                <a:solidFill>
+                  <a:schemeClr val="tx1"/>
+                </a:solidFill>
+                <a:latin typeface="+mj-lt"/>
+                <a:ea typeface="+mj-ea"/>
+                <a:cs typeface="+mj-cs"/>
+              </a:defRPr>
+            </a:lvl1pPr>
+          </a:lstStyle>
+          <a:p>
+            <a:r>
+              <a:rPr lang="en-US" altLang="ja-JP" sz="2400" b="1" u="sng" dirty="0" smtClean="0"/>
+              <a:t>Edit </a:t>
+            </a:r>
+            <a:r>
+              <a:rPr lang="en-US" altLang="ja-JP" sz="2400" b="1" u="sng" dirty="0" err="1" smtClean="0"/>
+              <a:t>daq</a:t>
+            </a:r>
+            <a:r>
+              <a:rPr lang="en-US" altLang="ja-JP" sz="2400" b="1" u="sng" dirty="0" smtClean="0"/>
+              <a:t>/</a:t>
+            </a:r>
+            <a:r>
+              <a:rPr lang="en-US" altLang="ja-JP" sz="2400" b="1" u="sng" dirty="0" err="1" smtClean="0"/>
+              <a:t>rawdata</a:t>
+            </a:r>
+            <a:r>
+              <a:rPr lang="en-US" altLang="ja-JP" sz="2400" b="1" u="sng" dirty="0" smtClean="0"/>
+              <a:t>/modules/include/</a:t>
+            </a:r>
+            <a:r>
+              <a:rPr lang="en-US" altLang="ja-JP" sz="2400" b="1" u="sng" dirty="0" err="1" smtClean="0"/>
+              <a:t>DAQConsts.h</a:t>
+            </a:r>
+            <a:endParaRPr lang="ja-JP" altLang="en-US" sz="2400" b="1" u="sng" dirty="0"/>
+          </a:p>
+        </p:txBody>
+      </p:sp>
+      <p:sp>
+        <p:nvSpPr>
+          <p:cNvPr id="6" name="テキスト ボックス 5"/>
+          <p:cNvSpPr txBox="1"/>
+          <p:nvPr/>
+        </p:nvSpPr>
+        <p:spPr>
+          <a:xfrm>
+            <a:off x="1066800" y="4940300"/>
+            <a:ext cx="8133958" cy="1477328"/>
+          </a:xfrm>
+          <a:prstGeom prst="rect">
+            <a:avLst/>
+          </a:prstGeom>
+          <a:noFill/>
+        </p:spPr>
+        <p:txBody>
+          <a:bodyPr wrap="none" rtlCol="0">
+            <a:spAutoFit/>
+          </a:bodyPr>
+          <a:lstStyle/>
+          <a:p>
+            <a:r>
+              <a:rPr kumimoji="1" lang="en-US" altLang="ja-JP" dirty="0" smtClean="0"/>
+              <a:t>Comment out a nonstop </a:t>
+            </a:r>
+            <a:r>
+              <a:rPr kumimoji="1" lang="en-US" altLang="ja-JP" dirty="0" err="1" smtClean="0"/>
+              <a:t>DAQ</a:t>
+            </a:r>
+            <a:r>
+              <a:rPr kumimoji="1" lang="en-US" altLang="ja-JP" dirty="0" smtClean="0"/>
+              <a:t> </a:t>
+            </a:r>
+            <a:r>
+              <a:rPr kumimoji="1" lang="en-US" altLang="ja-JP" dirty="0" err="1" smtClean="0"/>
+              <a:t>releated</a:t>
+            </a:r>
+            <a:r>
+              <a:rPr kumimoji="1" lang="en-US" altLang="ja-JP" dirty="0" smtClean="0"/>
+              <a:t> line, which cannot be used in Pocket </a:t>
+            </a:r>
+            <a:r>
+              <a:rPr kumimoji="1" lang="en-US" altLang="ja-JP" dirty="0" err="1" smtClean="0"/>
+              <a:t>DAQ</a:t>
+            </a:r>
+            <a:r>
+              <a:rPr kumimoji="1" lang="en-US" altLang="ja-JP" dirty="0" smtClean="0"/>
+              <a:t>. </a:t>
+            </a:r>
+          </a:p>
+          <a:p>
+            <a:r>
+              <a:rPr kumimoji="1" lang="en-US" altLang="ja-JP" dirty="0" smtClean="0"/>
+              <a:t>Before)</a:t>
+            </a:r>
+          </a:p>
+          <a:p>
+            <a:r>
+              <a:rPr kumimoji="1" lang="en-US" altLang="ja-JP" dirty="0" smtClean="0">
+                <a:solidFill>
+                  <a:srgbClr val="FF0000"/>
+                </a:solidFill>
+              </a:rPr>
+              <a:t>#define NONSTOP</a:t>
+            </a:r>
+          </a:p>
+          <a:p>
+            <a:r>
+              <a:rPr kumimoji="1" lang="en-US" altLang="ja-JP" dirty="0" smtClean="0"/>
+              <a:t>After)</a:t>
+            </a:r>
+          </a:p>
+          <a:p>
+            <a:r>
+              <a:rPr lang="en-US" altLang="ja-JP" dirty="0" smtClean="0">
+                <a:solidFill>
+                  <a:srgbClr val="FF0000"/>
+                </a:solidFill>
+              </a:rPr>
+              <a:t>// #define NONSTOP</a:t>
+            </a:r>
+            <a:endParaRPr kumimoji="1" lang="ja-JP" altLang="en-US" dirty="0">
               <a:solidFill>
                 <a:srgbClr val="FF0000"/>
               </a:solidFill>
@@ -12879,11 +13034,10 @@
               <a:rPr lang="en-US" altLang="ja-JP" sz="1400" dirty="0" smtClean="0"/>
               <a:t>Add an “Edit RecvStream1.py” page  </a:t>
             </a:r>
-            <a:endParaRPr lang="en-US" altLang="ja-JP" sz="1400" dirty="0" smtClean="0"/>
-          </a:p>
-          <a:p>
-            <a:r>
-              <a:rPr lang="en-US" altLang="ja-JP" sz="1800" dirty="0" smtClean="0"/>
+          </a:p>
+          <a:p>
+            <a:r>
+              <a:rPr lang="en-US" altLang="ja-JP" sz="1400" dirty="0" smtClean="0"/>
               <a:t>2015/7/14</a:t>
             </a:r>
           </a:p>
@@ -12899,7 +13053,36 @@
             </a:r>
             <a:r>
               <a:rPr lang="en-US" altLang="ja-JP" sz="1400" dirty="0" smtClean="0"/>
-              <a:t> w/o eb0.</a:t>
+              <a:t> w/o eb0</a:t>
+            </a:r>
+            <a:r>
+              <a:rPr lang="en-US" altLang="ja-JP" sz="1400" dirty="0" smtClean="0"/>
+              <a:t>.</a:t>
+            </a:r>
+          </a:p>
+          <a:p>
+            <a:r>
+              <a:rPr lang="en-US" altLang="ja-JP" sz="1400" dirty="0" smtClean="0"/>
+              <a:t>2016/2/22</a:t>
+            </a:r>
+          </a:p>
+          <a:p>
+            <a:pPr lvl="1"/>
+            <a:r>
+              <a:rPr lang="en-US" altLang="ja-JP" sz="1400" dirty="0" smtClean="0"/>
+              <a:t>Comment out “# define NONSTOP” in </a:t>
+            </a:r>
+            <a:r>
+              <a:rPr lang="en-US" altLang="ja-JP" sz="1400" dirty="0" err="1" smtClean="0"/>
+              <a:t>DAQConsts.h</a:t>
+            </a:r>
+            <a:r>
+              <a:rPr lang="en-US" altLang="ja-JP" sz="1400" dirty="0" smtClean="0"/>
+              <a:t> for Pocket </a:t>
+            </a:r>
+            <a:r>
+              <a:rPr lang="en-US" altLang="ja-JP" sz="1400" dirty="0" err="1" smtClean="0"/>
+              <a:t>DAQ</a:t>
             </a:r>
             <a:endParaRPr lang="ja-JP" altLang="en-US" sz="1400" dirty="0"/>
           </a:p>

</xml_diff>

<commit_message>
Add comment to use v01-01-01
git-svn-id: https://belle2.cc.kek.jp/svn/trunk/software@26175 b38c6c8f-bee8-465d-8448-9abe6915d496
</commit_message>
<xml_diff>
--- a/daq/copper/doc/SetupPocketDAQ_4_DAQsoftware.pptx
+++ b/daq/copper/doc/SetupPocketDAQ_4_DAQsoftware.pptx
@@ -274,7 +274,7 @@
           <a:p>
             <a:fld id="{1A984C01-8EE0-44F4-B595-752AEE56780B}" type="datetimeFigureOut">
               <a:rPr kumimoji="1" lang="ja-JP" altLang="en-US" smtClean="0"/>
-              <a:t>2016/2/22</a:t>
+              <a:t>2016/3/10</a:t>
             </a:fld>
             <a:endParaRPr kumimoji="1" lang="ja-JP" altLang="en-US"/>
           </a:p>
@@ -476,7 +476,7 @@
           <a:p>
             <a:fld id="{1A984C01-8EE0-44F4-B595-752AEE56780B}" type="datetimeFigureOut">
               <a:rPr kumimoji="1" lang="ja-JP" altLang="en-US" smtClean="0"/>
-              <a:t>2016/2/22</a:t>
+              <a:t>2016/3/10</a:t>
             </a:fld>
             <a:endParaRPr kumimoji="1" lang="ja-JP" altLang="en-US"/>
           </a:p>
@@ -688,7 +688,7 @@
           <a:p>
             <a:fld id="{1A984C01-8EE0-44F4-B595-752AEE56780B}" type="datetimeFigureOut">
               <a:rPr kumimoji="1" lang="ja-JP" altLang="en-US" smtClean="0"/>
-              <a:t>2016/2/22</a:t>
+              <a:t>2016/3/10</a:t>
             </a:fld>
             <a:endParaRPr kumimoji="1" lang="ja-JP" altLang="en-US"/>
           </a:p>
@@ -890,7 +890,7 @@
           <a:p>
             <a:fld id="{1A984C01-8EE0-44F4-B595-752AEE56780B}" type="datetimeFigureOut">
               <a:rPr kumimoji="1" lang="ja-JP" altLang="en-US" smtClean="0"/>
-              <a:t>2016/2/22</a:t>
+              <a:t>2016/3/10</a:t>
             </a:fld>
             <a:endParaRPr kumimoji="1" lang="ja-JP" altLang="en-US"/>
           </a:p>
@@ -1136,7 +1136,7 @@
           <a:p>
             <a:fld id="{1A984C01-8EE0-44F4-B595-752AEE56780B}" type="datetimeFigureOut">
               <a:rPr kumimoji="1" lang="ja-JP" altLang="en-US" smtClean="0"/>
-              <a:t>2016/2/22</a:t>
+              <a:t>2016/3/10</a:t>
             </a:fld>
             <a:endParaRPr kumimoji="1" lang="ja-JP" altLang="en-US"/>
           </a:p>
@@ -1432,7 +1432,7 @@
           <a:p>
             <a:fld id="{1A984C01-8EE0-44F4-B595-752AEE56780B}" type="datetimeFigureOut">
               <a:rPr kumimoji="1" lang="ja-JP" altLang="en-US" smtClean="0"/>
-              <a:t>2016/2/22</a:t>
+              <a:t>2016/3/10</a:t>
             </a:fld>
             <a:endParaRPr kumimoji="1" lang="ja-JP" altLang="en-US"/>
           </a:p>
@@ -1863,7 +1863,7 @@
           <a:p>
             <a:fld id="{1A984C01-8EE0-44F4-B595-752AEE56780B}" type="datetimeFigureOut">
               <a:rPr kumimoji="1" lang="ja-JP" altLang="en-US" smtClean="0"/>
-              <a:t>2016/2/22</a:t>
+              <a:t>2016/3/10</a:t>
             </a:fld>
             <a:endParaRPr kumimoji="1" lang="ja-JP" altLang="en-US"/>
           </a:p>
@@ -1981,7 +1981,7 @@
           <a:p>
             <a:fld id="{1A984C01-8EE0-44F4-B595-752AEE56780B}" type="datetimeFigureOut">
               <a:rPr kumimoji="1" lang="ja-JP" altLang="en-US" smtClean="0"/>
-              <a:t>2016/2/22</a:t>
+              <a:t>2016/3/10</a:t>
             </a:fld>
             <a:endParaRPr kumimoji="1" lang="ja-JP" altLang="en-US"/>
           </a:p>
@@ -2076,7 +2076,7 @@
           <a:p>
             <a:fld id="{1A984C01-8EE0-44F4-B595-752AEE56780B}" type="datetimeFigureOut">
               <a:rPr kumimoji="1" lang="ja-JP" altLang="en-US" smtClean="0"/>
-              <a:t>2016/2/22</a:t>
+              <a:t>2016/3/10</a:t>
             </a:fld>
             <a:endParaRPr kumimoji="1" lang="ja-JP" altLang="en-US"/>
           </a:p>
@@ -2385,7 +2385,7 @@
           <a:p>
             <a:fld id="{1A984C01-8EE0-44F4-B595-752AEE56780B}" type="datetimeFigureOut">
               <a:rPr kumimoji="1" lang="ja-JP" altLang="en-US" smtClean="0"/>
-              <a:t>2016/2/22</a:t>
+              <a:t>2016/3/10</a:t>
             </a:fld>
             <a:endParaRPr kumimoji="1" lang="ja-JP" altLang="en-US"/>
           </a:p>
@@ -2638,7 +2638,7 @@
           <a:p>
             <a:fld id="{1A984C01-8EE0-44F4-B595-752AEE56780B}" type="datetimeFigureOut">
               <a:rPr kumimoji="1" lang="ja-JP" altLang="en-US" smtClean="0"/>
-              <a:t>2016/2/22</a:t>
+              <a:t>2016/3/10</a:t>
             </a:fld>
             <a:endParaRPr kumimoji="1" lang="ja-JP" altLang="en-US"/>
           </a:p>
@@ -2883,7 +2883,7 @@
           <a:p>
             <a:fld id="{1A984C01-8EE0-44F4-B595-752AEE56780B}" type="datetimeFigureOut">
               <a:rPr kumimoji="1" lang="ja-JP" altLang="en-US" smtClean="0"/>
-              <a:t>2016/2/22</a:t>
+              <a:t>2016/3/10</a:t>
             </a:fld>
             <a:endParaRPr kumimoji="1" lang="ja-JP" altLang="en-US"/>
           </a:p>
@@ -3312,10 +3312,6 @@
             <a:br>
               <a:rPr kumimoji="1" lang="en-US" altLang="ja-JP" dirty="0" smtClean="0"/>
             </a:br>
-            <a:r>
-              <a:rPr lang="en-US" altLang="ja-JP" dirty="0" smtClean="0"/>
-              <a:t>(rev. 17080)</a:t>
-            </a:r>
             <a:endParaRPr kumimoji="1" lang="ja-JP" altLang="en-US" dirty="0"/>
           </a:p>
         </p:txBody>
@@ -3343,16 +3339,10 @@
           <a:lstStyle/>
           <a:p>
             <a:r>
-              <a:rPr lang="en-US" altLang="ja-JP" sz="2000" dirty="0"/>
-              <a:t/>
-            </a:r>
-            <a:br>
-              <a:rPr lang="en-US" altLang="ja-JP" sz="2000" dirty="0"/>
-            </a:br>
-            <a:r>
               <a:rPr lang="en-US" altLang="ja-JP" sz="2000" dirty="0" smtClean="0"/>
-              <a:t>July 14, 2015 </a:t>
-            </a:r>
+              <a:t>Mar. 10, 2016</a:t>
+            </a:r>
+            <a:endParaRPr lang="en-US" altLang="ja-JP" sz="2000" dirty="0" smtClean="0"/>
           </a:p>
           <a:p>
             <a:r>
@@ -3440,12 +3430,14 @@
         </p:nvSpPr>
         <p:spPr>
           <a:xfrm>
-            <a:off x="457200" y="1978025"/>
+            <a:off x="420130" y="1187192"/>
             <a:ext cx="11404600" cy="4351338"/>
           </a:xfrm>
         </p:spPr>
         <p:txBody>
-          <a:bodyPr/>
+          <a:bodyPr>
+            <a:normAutofit fontScale="92500" lnSpcReduction="10000"/>
+          </a:bodyPr>
           <a:lstStyle/>
           <a:p>
             <a:r>
@@ -3485,6 +3477,10 @@
             <a:endParaRPr lang="en-US" altLang="ja-JP" dirty="0" smtClean="0"/>
           </a:p>
           <a:p>
+            <a:pPr lvl="1"/>
+            <a:endParaRPr lang="en-US" altLang="ja-JP" dirty="0" smtClean="0"/>
+          </a:p>
+          <a:p>
             <a:r>
               <a:rPr lang="en-US" altLang="ja-JP" dirty="0" smtClean="0"/>
               <a:t>Install basf2 on both COPPER CPU and Readout PC</a:t>
@@ -3612,6 +3608,54 @@
               <a:rPr lang="en-US" altLang="ja-JP" dirty="0" smtClean="0"/>
               <a:t>.</a:t>
             </a:r>
+          </a:p>
+          <a:p>
+            <a:pPr lvl="1"/>
+            <a:r>
+              <a:rPr lang="en-US" altLang="ja-JP" dirty="0" smtClean="0">
+                <a:solidFill>
+                  <a:srgbClr val="FF0000"/>
+                </a:solidFill>
+              </a:rPr>
+              <a:t>[WARNING] </a:t>
+            </a:r>
+            <a:r>
+              <a:rPr lang="en-US" altLang="ja-JP" dirty="0">
+                <a:solidFill>
+                  <a:srgbClr val="FF0000"/>
+                </a:solidFill>
+              </a:rPr>
+              <a:t>: </a:t>
+            </a:r>
+            <a:r>
+              <a:rPr lang="en-US" altLang="ja-JP" dirty="0" smtClean="0">
+                <a:solidFill>
+                  <a:srgbClr val="FF0000"/>
+                </a:solidFill>
+              </a:rPr>
+              <a:t>When installing “external” package, please choose v01-01-01. Recently, it was reported that </a:t>
+            </a:r>
+            <a:r>
+              <a:rPr lang="en-US" altLang="ja-JP" dirty="0" err="1" smtClean="0">
+                <a:solidFill>
+                  <a:srgbClr val="FF0000"/>
+                </a:solidFill>
+              </a:rPr>
+              <a:t>scons</a:t>
+            </a:r>
+            <a:r>
+              <a:rPr lang="en-US" altLang="ja-JP" dirty="0" smtClean="0">
+                <a:solidFill>
+                  <a:srgbClr val="FF0000"/>
+                </a:solidFill>
+              </a:rPr>
+              <a:t> fails with the latest external package on a readout PC.</a:t>
+            </a:r>
+            <a:endParaRPr lang="en-US" altLang="ja-JP" dirty="0">
+              <a:solidFill>
+                <a:srgbClr val="FF0000"/>
+              </a:solidFill>
+            </a:endParaRPr>
           </a:p>
           <a:p>
             <a:r>
@@ -13053,11 +13097,7 @@
             </a:r>
             <a:r>
               <a:rPr lang="en-US" altLang="ja-JP" sz="1400" dirty="0" smtClean="0"/>
-              <a:t> w/o eb0</a:t>
-            </a:r>
-            <a:r>
-              <a:rPr lang="en-US" altLang="ja-JP" sz="1400" dirty="0" smtClean="0"/>
-              <a:t>.</a:t>
+              <a:t> w/o eb0.</a:t>
             </a:r>
           </a:p>
           <a:p>
@@ -13083,6 +13123,20 @@
             <a:r>
               <a:rPr lang="en-US" altLang="ja-JP" sz="1400" dirty="0" err="1" smtClean="0"/>
               <a:t>DAQ</a:t>
+            </a:r>
+            <a:endParaRPr lang="en-US" altLang="ja-JP" sz="1400" dirty="0" smtClean="0"/>
+          </a:p>
+          <a:p>
+            <a:r>
+              <a:rPr lang="en-US" altLang="ja-JP" sz="1800" dirty="0" smtClean="0"/>
+              <a:t>2016/3/10</a:t>
+            </a:r>
+          </a:p>
+          <a:p>
+            <a:pPr lvl="1"/>
+            <a:r>
+              <a:rPr lang="en-US" altLang="ja-JP" sz="1400" dirty="0" smtClean="0"/>
+              <a:t>Add warning to use external v01-01-01.</a:t>
             </a:r>
             <a:endParaRPr lang="ja-JP" altLang="en-US" sz="1400" dirty="0"/>
           </a:p>

</xml_diff>